<commit_message>
update leetcode 41 ppt.
</commit_message>
<xml_diff>
--- a/0001-0100/LeetCode 第 41 题：“缺失的第一个正数”题解配图.pptx
+++ b/0001-0100/LeetCode 第 41 题：“缺失的第一个正数”题解配图.pptx
@@ -204,7 +204,7 @@
           <a:p>
             <a:fld id="{9B5CAE61-41EE-A04D-AAFC-15F3CF3E2075}" type="datetimeFigureOut">
               <a:rPr kumimoji="1" lang="zh-CN" altLang="en-US" smtClean="0"/>
-              <a:t>2019/6/28</a:t>
+              <a:t>2019/7/23</a:t>
             </a:fld>
             <a:endParaRPr kumimoji="1" lang="zh-CN" altLang="en-US"/>
           </a:p>
@@ -680,7 +680,7 @@
           <a:p>
             <a:fld id="{7C955CD6-C544-6447-88CB-A2D8D4C328B3}" type="datetimeFigureOut">
               <a:rPr kumimoji="1" lang="zh-CN" altLang="en-US" smtClean="0"/>
-              <a:t>2019/6/28</a:t>
+              <a:t>2019/7/23</a:t>
             </a:fld>
             <a:endParaRPr kumimoji="1" lang="zh-CN" altLang="en-US"/>
           </a:p>
@@ -1185,8 +1185,8 @@
         </p:nvSpPr>
         <p:spPr>
           <a:xfrm flipH="1">
-            <a:off x="804680" y="873508"/>
-            <a:ext cx="5011657" cy="461665"/>
+            <a:off x="804679" y="781316"/>
+            <a:ext cx="8474450" cy="461665"/>
           </a:xfrm>
           <a:prstGeom prst="rect">
             <a:avLst/>
@@ -1224,7 +1224,7 @@
                 <a:ea typeface="KaiTi_GB2312" panose="02010609030101010101" pitchFamily="49" charset="-122"/>
                 <a:cs typeface="Times New Roman" panose="02020603050405020304" pitchFamily="18" charset="0"/>
               </a:rPr>
-              <a:t>思想：桶排序，一个萝卜一个坑。</a:t>
+              <a:t>思想：桶排序（一个萝卜一个坑）、抽屉原理、鸽巢原理。</a:t>
             </a:r>
           </a:p>
         </p:txBody>
@@ -1243,8 +1243,8 @@
         </p:nvSpPr>
         <p:spPr>
           <a:xfrm>
-            <a:off x="729875" y="1536242"/>
-            <a:ext cx="3490058" cy="369332"/>
+            <a:off x="753897" y="1297746"/>
+            <a:ext cx="4578497" cy="461665"/>
           </a:xfrm>
           <a:prstGeom prst="rect">
             <a:avLst/>
@@ -1257,88 +1257,98 @@
           <a:lstStyle/>
           <a:p>
             <a:r>
-              <a:rPr lang="zh-CN" altLang="en-US" dirty="0"/>
+              <a:rPr lang="zh-CN" altLang="en-US" sz="2400" dirty="0">
+                <a:latin typeface="Times New Roman" panose="02020603050405020304" pitchFamily="18" charset="0"/>
+                <a:ea typeface="KaiTi_GB2312" panose="02010609030101010101" pitchFamily="49" charset="-122"/>
+                <a:cs typeface="Times New Roman" panose="02020603050405020304" pitchFamily="18" charset="0"/>
+              </a:rPr>
               <a:t>以示例 </a:t>
             </a:r>
             <a:r>
-              <a:rPr lang="en-US" altLang="zh-CN" dirty="0">
-                <a:latin typeface="Times New Roman" panose="02020603050405020304" pitchFamily="18" charset="0"/>
+              <a:rPr lang="en-US" altLang="zh-CN" sz="2400" dirty="0">
+                <a:latin typeface="Times New Roman" panose="02020603050405020304" pitchFamily="18" charset="0"/>
+                <a:ea typeface="KaiTi_GB2312" panose="02010609030101010101" pitchFamily="49" charset="-122"/>
                 <a:cs typeface="Times New Roman" panose="02020603050405020304" pitchFamily="18" charset="0"/>
               </a:rPr>
               <a:t>2</a:t>
             </a:r>
             <a:r>
-              <a:rPr lang="zh-CN" altLang="en-US" dirty="0"/>
-              <a:t> 输入</a:t>
-            </a:r>
-            <a:r>
-              <a:rPr lang="zh-CN" altLang="en-US" dirty="0">
-                <a:latin typeface="Times New Roman" panose="02020603050405020304" pitchFamily="18" charset="0"/>
-                <a:cs typeface="Times New Roman" panose="02020603050405020304" pitchFamily="18" charset="0"/>
-              </a:rPr>
-              <a:t>: [</a:t>
-            </a:r>
-            <a:r>
-              <a:rPr lang="en-US" altLang="zh-CN" dirty="0">
-                <a:latin typeface="Times New Roman" panose="02020603050405020304" pitchFamily="18" charset="0"/>
+              <a:rPr lang="zh-CN" altLang="en-US" sz="2400" dirty="0">
+                <a:latin typeface="Times New Roman" panose="02020603050405020304" pitchFamily="18" charset="0"/>
+                <a:ea typeface="KaiTi_GB2312" panose="02010609030101010101" pitchFamily="49" charset="-122"/>
+                <a:cs typeface="Times New Roman" panose="02020603050405020304" pitchFamily="18" charset="0"/>
+              </a:rPr>
+              <a:t> 输入: [</a:t>
+            </a:r>
+            <a:r>
+              <a:rPr lang="en-US" altLang="zh-CN" sz="2400" dirty="0">
+                <a:latin typeface="Times New Roman" panose="02020603050405020304" pitchFamily="18" charset="0"/>
+                <a:ea typeface="KaiTi_GB2312" panose="02010609030101010101" pitchFamily="49" charset="-122"/>
                 <a:cs typeface="Times New Roman" panose="02020603050405020304" pitchFamily="18" charset="0"/>
               </a:rPr>
               <a:t>3</a:t>
             </a:r>
             <a:r>
-              <a:rPr lang="zh-CN" altLang="en-US" dirty="0">
-                <a:latin typeface="Times New Roman" panose="02020603050405020304" pitchFamily="18" charset="0"/>
+              <a:rPr lang="zh-CN" altLang="en-US" sz="2400" dirty="0">
+                <a:latin typeface="Times New Roman" panose="02020603050405020304" pitchFamily="18" charset="0"/>
+                <a:ea typeface="KaiTi_GB2312" panose="02010609030101010101" pitchFamily="49" charset="-122"/>
                 <a:cs typeface="Times New Roman" panose="02020603050405020304" pitchFamily="18" charset="0"/>
               </a:rPr>
               <a:t>, </a:t>
             </a:r>
             <a:r>
-              <a:rPr lang="en-US" altLang="zh-CN" dirty="0">
-                <a:latin typeface="Times New Roman" panose="02020603050405020304" pitchFamily="18" charset="0"/>
+              <a:rPr lang="en-US" altLang="zh-CN" sz="2400" dirty="0">
+                <a:latin typeface="Times New Roman" panose="02020603050405020304" pitchFamily="18" charset="0"/>
+                <a:ea typeface="KaiTi_GB2312" panose="02010609030101010101" pitchFamily="49" charset="-122"/>
                 <a:cs typeface="Times New Roman" panose="02020603050405020304" pitchFamily="18" charset="0"/>
               </a:rPr>
               <a:t>4</a:t>
             </a:r>
             <a:r>
-              <a:rPr lang="zh-CN" altLang="en-US" dirty="0">
-                <a:latin typeface="Times New Roman" panose="02020603050405020304" pitchFamily="18" charset="0"/>
+              <a:rPr lang="zh-CN" altLang="en-US" sz="2400" dirty="0">
+                <a:latin typeface="Times New Roman" panose="02020603050405020304" pitchFamily="18" charset="0"/>
+                <a:ea typeface="KaiTi_GB2312" panose="02010609030101010101" pitchFamily="49" charset="-122"/>
                 <a:cs typeface="Times New Roman" panose="02020603050405020304" pitchFamily="18" charset="0"/>
               </a:rPr>
               <a:t>, </a:t>
             </a:r>
             <a:r>
-              <a:rPr lang="en-US" altLang="zh-CN" dirty="0">
-                <a:latin typeface="Times New Roman" panose="02020603050405020304" pitchFamily="18" charset="0"/>
+              <a:rPr lang="en-US" altLang="zh-CN" sz="2400" dirty="0">
+                <a:latin typeface="Times New Roman" panose="02020603050405020304" pitchFamily="18" charset="0"/>
+                <a:ea typeface="KaiTi_GB2312" panose="02010609030101010101" pitchFamily="49" charset="-122"/>
                 <a:cs typeface="Times New Roman" panose="02020603050405020304" pitchFamily="18" charset="0"/>
               </a:rPr>
               <a:t>-1</a:t>
             </a:r>
             <a:r>
-              <a:rPr lang="zh-CN" altLang="en-US" dirty="0">
-                <a:latin typeface="Times New Roman" panose="02020603050405020304" pitchFamily="18" charset="0"/>
+              <a:rPr lang="zh-CN" altLang="en-US" sz="2400" dirty="0">
+                <a:latin typeface="Times New Roman" panose="02020603050405020304" pitchFamily="18" charset="0"/>
+                <a:ea typeface="KaiTi_GB2312" panose="02010609030101010101" pitchFamily="49" charset="-122"/>
                 <a:cs typeface="Times New Roman" panose="02020603050405020304" pitchFamily="18" charset="0"/>
               </a:rPr>
               <a:t>, </a:t>
             </a:r>
             <a:r>
-              <a:rPr lang="en-US" altLang="zh-CN" dirty="0">
-                <a:latin typeface="Times New Roman" panose="02020603050405020304" pitchFamily="18" charset="0"/>
+              <a:rPr lang="en-US" altLang="zh-CN" sz="2400" dirty="0">
+                <a:latin typeface="Times New Roman" panose="02020603050405020304" pitchFamily="18" charset="0"/>
+                <a:ea typeface="KaiTi_GB2312" panose="02010609030101010101" pitchFamily="49" charset="-122"/>
                 <a:cs typeface="Times New Roman" panose="02020603050405020304" pitchFamily="18" charset="0"/>
               </a:rPr>
               <a:t>1</a:t>
             </a:r>
             <a:r>
-              <a:rPr lang="zh-CN" altLang="en-US" dirty="0">
-                <a:latin typeface="Times New Roman" panose="02020603050405020304" pitchFamily="18" charset="0"/>
-                <a:cs typeface="Times New Roman" panose="02020603050405020304" pitchFamily="18" charset="0"/>
-              </a:rPr>
-              <a:t>] </a:t>
-            </a:r>
-            <a:r>
-              <a:rPr lang="zh-CN" altLang="en-US" dirty="0"/>
-              <a:t>为例。</a:t>
-            </a:r>
-            <a:endParaRPr lang="en-US" altLang="zh-CN" dirty="0"/>
+              <a:rPr lang="zh-CN" altLang="en-US" sz="2400" dirty="0">
+                <a:latin typeface="Times New Roman" panose="02020603050405020304" pitchFamily="18" charset="0"/>
+                <a:ea typeface="KaiTi_GB2312" panose="02010609030101010101" pitchFamily="49" charset="-122"/>
+                <a:cs typeface="Times New Roman" panose="02020603050405020304" pitchFamily="18" charset="0"/>
+              </a:rPr>
+              <a:t>] 为例。</a:t>
+            </a:r>
+            <a:endParaRPr lang="en-US" altLang="zh-CN" sz="2400" dirty="0">
+              <a:latin typeface="Times New Roman" panose="02020603050405020304" pitchFamily="18" charset="0"/>
+              <a:ea typeface="KaiTi_GB2312" panose="02010609030101010101" pitchFamily="49" charset="-122"/>
+              <a:cs typeface="Times New Roman" panose="02020603050405020304" pitchFamily="18" charset="0"/>
+            </a:endParaRPr>
           </a:p>
         </p:txBody>
       </p:sp>
@@ -1356,8 +1366,8 @@
         </p:nvSpPr>
         <p:spPr>
           <a:xfrm>
-            <a:off x="3506223" y="2165929"/>
-            <a:ext cx="5303631" cy="369332"/>
+            <a:off x="2880000" y="1888818"/>
+            <a:ext cx="5303631" cy="400110"/>
           </a:xfrm>
           <a:prstGeom prst="rect">
             <a:avLst/>
@@ -1370,23 +1380,26 @@
           <a:lstStyle/>
           <a:p>
             <a:r>
-              <a:rPr kumimoji="1" lang="zh-CN" altLang="en-US" dirty="0">
-                <a:latin typeface="Times New Roman" charset="0"/>
-                <a:ea typeface="楷体_GB2312" panose="02010609030101010101" pitchFamily="49" charset="-122"/>
+              <a:rPr kumimoji="1" lang="zh-CN" altLang="en-US" sz="2000" dirty="0">
+                <a:latin typeface="Times New Roman" panose="02020603050405020304" pitchFamily="18" charset="0"/>
+                <a:ea typeface="楷体_GB2312" panose="02010609030101010101" pitchFamily="49" charset="-122"/>
+                <a:cs typeface="Times New Roman" panose="02020603050405020304" pitchFamily="18" charset="0"/>
               </a:rPr>
               <a:t>首先看索引 </a:t>
             </a:r>
             <a:r>
-              <a:rPr kumimoji="1" lang="en-US" altLang="zh-CN" dirty="0">
-                <a:latin typeface="Times New Roman" charset="0"/>
-                <a:ea typeface="楷体_GB2312" panose="02010609030101010101" pitchFamily="49" charset="-122"/>
+              <a:rPr kumimoji="1" lang="en-US" altLang="zh-CN" sz="2000" dirty="0">
+                <a:latin typeface="Times New Roman" panose="02020603050405020304" pitchFamily="18" charset="0"/>
+                <a:ea typeface="楷体_GB2312" panose="02010609030101010101" pitchFamily="49" charset="-122"/>
+                <a:cs typeface="Times New Roman" panose="02020603050405020304" pitchFamily="18" charset="0"/>
               </a:rPr>
               <a:t>0</a:t>
             </a:r>
             <a:r>
-              <a:rPr kumimoji="1" lang="zh-CN" altLang="en-US" dirty="0">
-                <a:latin typeface="Times New Roman" charset="0"/>
-                <a:ea typeface="楷体_GB2312" panose="02010609030101010101" pitchFamily="49" charset="-122"/>
+              <a:rPr kumimoji="1" lang="zh-CN" altLang="en-US" sz="2000" dirty="0">
+                <a:latin typeface="Times New Roman" panose="02020603050405020304" pitchFamily="18" charset="0"/>
+                <a:ea typeface="楷体_GB2312" panose="02010609030101010101" pitchFamily="49" charset="-122"/>
+                <a:cs typeface="Times New Roman" panose="02020603050405020304" pitchFamily="18" charset="0"/>
               </a:rPr>
               <a:t> 上的数字。</a:t>
             </a:r>
@@ -1407,8 +1420,8 @@
         </p:nvSpPr>
         <p:spPr>
           <a:xfrm>
-            <a:off x="4503764" y="2727664"/>
-            <a:ext cx="245470" cy="380245"/>
+            <a:off x="3169382" y="2318940"/>
+            <a:ext cx="1086096" cy="481742"/>
           </a:xfrm>
           <a:prstGeom prst="downArrow">
             <a:avLst/>
@@ -1459,8 +1472,8 @@
         </p:nvSpPr>
         <p:spPr>
           <a:xfrm>
-            <a:off x="4034006" y="5154284"/>
-            <a:ext cx="5186617" cy="646331"/>
+            <a:off x="753897" y="5991072"/>
+            <a:ext cx="10763244" cy="461665"/>
           </a:xfrm>
           <a:prstGeom prst="rect">
             <a:avLst/>
@@ -1472,8 +1485,12 @@
           </a:bodyPr>
           <a:lstStyle/>
           <a:p>
-            <a:r>
-              <a:rPr kumimoji="1" lang="zh-CN" altLang="en-US" dirty="0">
+            <a:pPr marL="342900" indent="-342900">
+              <a:buFont typeface="Wingdings" pitchFamily="2" charset="2"/>
+              <a:buChar char="l"/>
+            </a:pPr>
+            <a:r>
+              <a:rPr kumimoji="1" lang="zh-CN" altLang="en-US" sz="2400" dirty="0">
                 <a:latin typeface="Times New Roman" panose="02020603050405020304" pitchFamily="18" charset="0"/>
                 <a:ea typeface="楷体_GB2312" panose="02010609030101010101" pitchFamily="49" charset="-122"/>
                 <a:cs typeface="Times New Roman" panose="02020603050405020304" pitchFamily="18" charset="0"/>
@@ -1481,7 +1498,7 @@
               <a:t>在索引 </a:t>
             </a:r>
             <a:r>
-              <a:rPr kumimoji="1" lang="en-US" altLang="zh-CN" dirty="0">
+              <a:rPr kumimoji="1" lang="en-US" altLang="zh-CN" sz="2400" dirty="0">
                 <a:latin typeface="Times New Roman" panose="02020603050405020304" pitchFamily="18" charset="0"/>
                 <a:ea typeface="楷体_GB2312" panose="02010609030101010101" pitchFamily="49" charset="-122"/>
                 <a:cs typeface="Times New Roman" panose="02020603050405020304" pitchFamily="18" charset="0"/>
@@ -1489,7 +1506,7 @@
               <a:t>0 </a:t>
             </a:r>
             <a:r>
-              <a:rPr kumimoji="1" lang="zh-CN" altLang="en-US" dirty="0">
+              <a:rPr kumimoji="1" lang="zh-CN" altLang="en-US" sz="2400" dirty="0">
                 <a:latin typeface="Times New Roman" panose="02020603050405020304" pitchFamily="18" charset="0"/>
                 <a:ea typeface="楷体_GB2312" panose="02010609030101010101" pitchFamily="49" charset="-122"/>
                 <a:cs typeface="Times New Roman" panose="02020603050405020304" pitchFamily="18" charset="0"/>
@@ -1497,7 +1514,7 @@
               <a:t>上的是数字 </a:t>
             </a:r>
             <a:r>
-              <a:rPr kumimoji="1" lang="en-US" altLang="zh-CN" dirty="0">
+              <a:rPr kumimoji="1" lang="en-US" altLang="zh-CN" sz="2400" dirty="0">
                 <a:latin typeface="Times New Roman" panose="02020603050405020304" pitchFamily="18" charset="0"/>
                 <a:ea typeface="楷体_GB2312" panose="02010609030101010101" pitchFamily="49" charset="-122"/>
                 <a:cs typeface="Times New Roman" panose="02020603050405020304" pitchFamily="18" charset="0"/>
@@ -1505,7 +1522,7 @@
               <a:t>3 </a:t>
             </a:r>
             <a:r>
-              <a:rPr kumimoji="1" lang="zh-CN" altLang="en-US" dirty="0">
+              <a:rPr kumimoji="1" lang="zh-CN" altLang="en-US" sz="2400" dirty="0">
                 <a:latin typeface="Times New Roman" panose="02020603050405020304" pitchFamily="18" charset="0"/>
                 <a:ea typeface="楷体_GB2312" panose="02010609030101010101" pitchFamily="49" charset="-122"/>
                 <a:cs typeface="Times New Roman" panose="02020603050405020304" pitchFamily="18" charset="0"/>
@@ -1513,7 +1530,7 @@
               <a:t>，它应该放在索引 </a:t>
             </a:r>
             <a:r>
-              <a:rPr kumimoji="1" lang="en-US" altLang="zh-CN" dirty="0">
+              <a:rPr kumimoji="1" lang="en-US" altLang="zh-CN" sz="2400" dirty="0">
                 <a:latin typeface="Times New Roman" panose="02020603050405020304" pitchFamily="18" charset="0"/>
                 <a:ea typeface="楷体_GB2312" panose="02010609030101010101" pitchFamily="49" charset="-122"/>
                 <a:cs typeface="Times New Roman" panose="02020603050405020304" pitchFamily="18" charset="0"/>
@@ -1521,7 +1538,7 @@
               <a:t>2</a:t>
             </a:r>
             <a:r>
-              <a:rPr kumimoji="1" lang="zh-CN" altLang="en-US" dirty="0">
+              <a:rPr kumimoji="1" lang="zh-CN" altLang="en-US" sz="2400" dirty="0">
                 <a:latin typeface="Times New Roman" panose="02020603050405020304" pitchFamily="18" charset="0"/>
                 <a:ea typeface="楷体_GB2312" panose="02010609030101010101" pitchFamily="49" charset="-122"/>
                 <a:cs typeface="Times New Roman" panose="02020603050405020304" pitchFamily="18" charset="0"/>
@@ -1529,7 +1546,7 @@
               <a:t> 上，因此将索引 </a:t>
             </a:r>
             <a:r>
-              <a:rPr kumimoji="1" lang="en-US" altLang="zh-CN" dirty="0">
+              <a:rPr kumimoji="1" lang="en-US" altLang="zh-CN" sz="2400" dirty="0">
                 <a:latin typeface="Times New Roman" panose="02020603050405020304" pitchFamily="18" charset="0"/>
                 <a:ea typeface="楷体_GB2312" panose="02010609030101010101" pitchFamily="49" charset="-122"/>
                 <a:cs typeface="Times New Roman" panose="02020603050405020304" pitchFamily="18" charset="0"/>
@@ -1537,7 +1554,7 @@
               <a:t>0</a:t>
             </a:r>
             <a:r>
-              <a:rPr kumimoji="1" lang="zh-CN" altLang="en-US" dirty="0">
+              <a:rPr kumimoji="1" lang="zh-CN" altLang="en-US" sz="2400" dirty="0">
                 <a:latin typeface="Times New Roman" panose="02020603050405020304" pitchFamily="18" charset="0"/>
                 <a:ea typeface="楷体_GB2312" panose="02010609030101010101" pitchFamily="49" charset="-122"/>
                 <a:cs typeface="Times New Roman" panose="02020603050405020304" pitchFamily="18" charset="0"/>
@@ -1545,7 +1562,7 @@
               <a:t> 与索引 </a:t>
             </a:r>
             <a:r>
-              <a:rPr kumimoji="1" lang="en-US" altLang="zh-CN" dirty="0">
+              <a:rPr kumimoji="1" lang="en-US" altLang="zh-CN" sz="2400" dirty="0">
                 <a:latin typeface="Times New Roman" panose="02020603050405020304" pitchFamily="18" charset="0"/>
                 <a:ea typeface="楷体_GB2312" panose="02010609030101010101" pitchFamily="49" charset="-122"/>
                 <a:cs typeface="Times New Roman" panose="02020603050405020304" pitchFamily="18" charset="0"/>
@@ -1553,7 +1570,7 @@
               <a:t>2</a:t>
             </a:r>
             <a:r>
-              <a:rPr kumimoji="1" lang="zh-CN" altLang="en-US" dirty="0">
+              <a:rPr kumimoji="1" lang="zh-CN" altLang="en-US" sz="2400" dirty="0">
                 <a:latin typeface="Times New Roman" panose="02020603050405020304" pitchFamily="18" charset="0"/>
                 <a:ea typeface="楷体_GB2312" panose="02010609030101010101" pitchFamily="49" charset="-122"/>
                 <a:cs typeface="Times New Roman" panose="02020603050405020304" pitchFamily="18" charset="0"/>
@@ -1585,8 +1602,8 @@
         </p:blipFill>
         <p:spPr>
           <a:xfrm>
-            <a:off x="4034006" y="3347659"/>
-            <a:ext cx="4775848" cy="1640558"/>
+            <a:off x="2880000" y="2880000"/>
+            <a:ext cx="7336002" cy="2520000"/>
           </a:xfrm>
           <a:prstGeom prst="rect">
             <a:avLst/>
@@ -1645,8 +1662,8 @@
         </p:blipFill>
         <p:spPr>
           <a:xfrm>
-            <a:off x="4034008" y="3320946"/>
-            <a:ext cx="4775846" cy="1640558"/>
+            <a:off x="2880000" y="2880000"/>
+            <a:ext cx="7335999" cy="2520000"/>
           </a:xfrm>
           <a:prstGeom prst="rect">
             <a:avLst/>
@@ -1746,177 +1763,6 @@
                 <a:schemeClr val="bg1"/>
               </a:solidFill>
             </a:endParaRPr>
-          </a:p>
-        </p:txBody>
-      </p:sp>
-      <p:sp>
-        <p:nvSpPr>
-          <p:cNvPr id="9" name="文本框 8">
-            <a:extLst>
-              <a:ext uri="{FF2B5EF4-FFF2-40B4-BE49-F238E27FC236}">
-                <a16:creationId xmlns:a16="http://schemas.microsoft.com/office/drawing/2014/main" id="{2B26564D-CF86-FC42-A2A4-1786F6428653}"/>
-              </a:ext>
-            </a:extLst>
-          </p:cNvPr>
-          <p:cNvSpPr txBox="1"/>
-          <p:nvPr/>
-        </p:nvSpPr>
-        <p:spPr>
-          <a:xfrm flipH="1">
-            <a:off x="804680" y="873508"/>
-            <a:ext cx="5011657" cy="461665"/>
-          </a:xfrm>
-          <a:prstGeom prst="rect">
-            <a:avLst/>
-          </a:prstGeom>
-          <a:solidFill>
-            <a:srgbClr val="FF0000"/>
-          </a:solidFill>
-          <a:ln>
-            <a:noFill/>
-          </a:ln>
-          <a:effectLst>
-            <a:outerShdw blurRad="50800" dist="38100" dir="2700000" algn="tl" rotWithShape="0">
-              <a:prstClr val="black">
-                <a:alpha val="40000"/>
-              </a:prstClr>
-            </a:outerShdw>
-          </a:effectLst>
-        </p:spPr>
-        <p:txBody>
-          <a:bodyPr wrap="square" rtlCol="0">
-            <a:spAutoFit/>
-          </a:bodyPr>
-          <a:lstStyle/>
-          <a:p>
-            <a:pPr marL="342900" indent="-342900">
-              <a:buFont typeface="Wingdings" pitchFamily="2" charset="2"/>
-              <a:buChar char="Ø"/>
-            </a:pPr>
-            <a:r>
-              <a:rPr kumimoji="1" lang="zh-CN" altLang="en-US" sz="2400" b="1" dirty="0">
-                <a:solidFill>
-                  <a:schemeClr val="bg1"/>
-                </a:solidFill>
-                <a:latin typeface="Times New Roman" panose="02020603050405020304" pitchFamily="18" charset="0"/>
-                <a:ea typeface="KaiTi_GB2312" panose="02010609030101010101" pitchFamily="49" charset="-122"/>
-                <a:cs typeface="Times New Roman" panose="02020603050405020304" pitchFamily="18" charset="0"/>
-              </a:rPr>
-              <a:t>思想：桶排序，一个萝卜一个坑。</a:t>
-            </a:r>
-          </a:p>
-        </p:txBody>
-      </p:sp>
-      <p:sp>
-        <p:nvSpPr>
-          <p:cNvPr id="16" name="矩形 15">
-            <a:extLst>
-              <a:ext uri="{FF2B5EF4-FFF2-40B4-BE49-F238E27FC236}">
-                <a16:creationId xmlns:a16="http://schemas.microsoft.com/office/drawing/2014/main" id="{D1B959AC-15D3-AD44-A5D0-FD2A81887E85}"/>
-              </a:ext>
-            </a:extLst>
-          </p:cNvPr>
-          <p:cNvSpPr/>
-          <p:nvPr/>
-        </p:nvSpPr>
-        <p:spPr>
-          <a:xfrm>
-            <a:off x="729875" y="1536242"/>
-            <a:ext cx="3490058" cy="369332"/>
-          </a:xfrm>
-          <a:prstGeom prst="rect">
-            <a:avLst/>
-          </a:prstGeom>
-        </p:spPr>
-        <p:txBody>
-          <a:bodyPr wrap="none">
-            <a:spAutoFit/>
-          </a:bodyPr>
-          <a:lstStyle/>
-          <a:p>
-            <a:r>
-              <a:rPr lang="zh-CN" altLang="en-US" dirty="0"/>
-              <a:t>以示例 </a:t>
-            </a:r>
-            <a:r>
-              <a:rPr lang="en-US" altLang="zh-CN" dirty="0">
-                <a:latin typeface="Times New Roman" panose="02020603050405020304" pitchFamily="18" charset="0"/>
-                <a:cs typeface="Times New Roman" panose="02020603050405020304" pitchFamily="18" charset="0"/>
-              </a:rPr>
-              <a:t>2</a:t>
-            </a:r>
-            <a:r>
-              <a:rPr lang="zh-CN" altLang="en-US" dirty="0"/>
-              <a:t> 输入</a:t>
-            </a:r>
-            <a:r>
-              <a:rPr lang="zh-CN" altLang="en-US" dirty="0">
-                <a:latin typeface="Times New Roman" panose="02020603050405020304" pitchFamily="18" charset="0"/>
-                <a:cs typeface="Times New Roman" panose="02020603050405020304" pitchFamily="18" charset="0"/>
-              </a:rPr>
-              <a:t>: [</a:t>
-            </a:r>
-            <a:r>
-              <a:rPr lang="en-US" altLang="zh-CN" dirty="0">
-                <a:latin typeface="Times New Roman" panose="02020603050405020304" pitchFamily="18" charset="0"/>
-                <a:cs typeface="Times New Roman" panose="02020603050405020304" pitchFamily="18" charset="0"/>
-              </a:rPr>
-              <a:t>3</a:t>
-            </a:r>
-            <a:r>
-              <a:rPr lang="zh-CN" altLang="en-US" dirty="0">
-                <a:latin typeface="Times New Roman" panose="02020603050405020304" pitchFamily="18" charset="0"/>
-                <a:cs typeface="Times New Roman" panose="02020603050405020304" pitchFamily="18" charset="0"/>
-              </a:rPr>
-              <a:t>, </a:t>
-            </a:r>
-            <a:r>
-              <a:rPr lang="en-US" altLang="zh-CN" dirty="0">
-                <a:latin typeface="Times New Roman" panose="02020603050405020304" pitchFamily="18" charset="0"/>
-                <a:cs typeface="Times New Roman" panose="02020603050405020304" pitchFamily="18" charset="0"/>
-              </a:rPr>
-              <a:t>4</a:t>
-            </a:r>
-            <a:r>
-              <a:rPr lang="zh-CN" altLang="en-US" dirty="0">
-                <a:latin typeface="Times New Roman" panose="02020603050405020304" pitchFamily="18" charset="0"/>
-                <a:cs typeface="Times New Roman" panose="02020603050405020304" pitchFamily="18" charset="0"/>
-              </a:rPr>
-              <a:t>, </a:t>
-            </a:r>
-            <a:r>
-              <a:rPr lang="en-US" altLang="zh-CN" dirty="0">
-                <a:latin typeface="Times New Roman" panose="02020603050405020304" pitchFamily="18" charset="0"/>
-                <a:cs typeface="Times New Roman" panose="02020603050405020304" pitchFamily="18" charset="0"/>
-              </a:rPr>
-              <a:t>-1</a:t>
-            </a:r>
-            <a:r>
-              <a:rPr lang="zh-CN" altLang="en-US" dirty="0">
-                <a:latin typeface="Times New Roman" panose="02020603050405020304" pitchFamily="18" charset="0"/>
-                <a:cs typeface="Times New Roman" panose="02020603050405020304" pitchFamily="18" charset="0"/>
-              </a:rPr>
-              <a:t>, </a:t>
-            </a:r>
-            <a:r>
-              <a:rPr lang="en-US" altLang="zh-CN" dirty="0">
-                <a:latin typeface="Times New Roman" panose="02020603050405020304" pitchFamily="18" charset="0"/>
-                <a:cs typeface="Times New Roman" panose="02020603050405020304" pitchFamily="18" charset="0"/>
-              </a:rPr>
-              <a:t>1</a:t>
-            </a:r>
-            <a:r>
-              <a:rPr lang="zh-CN" altLang="en-US" dirty="0">
-                <a:latin typeface="Times New Roman" panose="02020603050405020304" pitchFamily="18" charset="0"/>
-                <a:cs typeface="Times New Roman" panose="02020603050405020304" pitchFamily="18" charset="0"/>
-              </a:rPr>
-              <a:t>] </a:t>
-            </a:r>
-            <a:r>
-              <a:rPr lang="zh-CN" altLang="en-US" dirty="0"/>
-              <a:t>为例。</a:t>
-            </a:r>
-            <a:endParaRPr lang="en-US" altLang="zh-CN" dirty="0"/>
           </a:p>
         </p:txBody>
       </p:sp>
@@ -1934,8 +1780,8 @@
         </p:nvSpPr>
         <p:spPr>
           <a:xfrm>
-            <a:off x="4038608" y="2191057"/>
-            <a:ext cx="5303631" cy="369332"/>
+            <a:off x="2880000" y="1861435"/>
+            <a:ext cx="5303631" cy="400110"/>
           </a:xfrm>
           <a:prstGeom prst="rect">
             <a:avLst/>
@@ -1948,23 +1794,26 @@
           <a:lstStyle/>
           <a:p>
             <a:r>
-              <a:rPr kumimoji="1" lang="zh-CN" altLang="en-US" dirty="0">
-                <a:latin typeface="Times New Roman" charset="0"/>
-                <a:ea typeface="楷体_GB2312" panose="02010609030101010101" pitchFamily="49" charset="-122"/>
+              <a:rPr kumimoji="1" lang="zh-CN" altLang="en-US" sz="2000" dirty="0">
+                <a:latin typeface="Times New Roman" panose="02020603050405020304" pitchFamily="18" charset="0"/>
+                <a:ea typeface="楷体_GB2312" panose="02010609030101010101" pitchFamily="49" charset="-122"/>
+                <a:cs typeface="Times New Roman" panose="02020603050405020304" pitchFamily="18" charset="0"/>
               </a:rPr>
               <a:t>接下来还看索引 </a:t>
             </a:r>
             <a:r>
-              <a:rPr kumimoji="1" lang="en-US" altLang="zh-CN" dirty="0">
-                <a:latin typeface="Times New Roman" charset="0"/>
-                <a:ea typeface="楷体_GB2312" panose="02010609030101010101" pitchFamily="49" charset="-122"/>
+              <a:rPr kumimoji="1" lang="en-US" altLang="zh-CN" sz="2000" dirty="0">
+                <a:latin typeface="Times New Roman" panose="02020603050405020304" pitchFamily="18" charset="0"/>
+                <a:ea typeface="楷体_GB2312" panose="02010609030101010101" pitchFamily="49" charset="-122"/>
+                <a:cs typeface="Times New Roman" panose="02020603050405020304" pitchFamily="18" charset="0"/>
               </a:rPr>
               <a:t>0</a:t>
             </a:r>
             <a:r>
-              <a:rPr kumimoji="1" lang="zh-CN" altLang="en-US" dirty="0">
-                <a:latin typeface="Times New Roman" charset="0"/>
-                <a:ea typeface="楷体_GB2312" panose="02010609030101010101" pitchFamily="49" charset="-122"/>
+              <a:rPr kumimoji="1" lang="zh-CN" altLang="en-US" sz="2000" dirty="0">
+                <a:latin typeface="Times New Roman" panose="02020603050405020304" pitchFamily="18" charset="0"/>
+                <a:ea typeface="楷体_GB2312" panose="02010609030101010101" pitchFamily="49" charset="-122"/>
+                <a:cs typeface="Times New Roman" panose="02020603050405020304" pitchFamily="18" charset="0"/>
               </a:rPr>
               <a:t> 上的数字。</a:t>
             </a:r>
@@ -1973,10 +1822,10 @@
       </p:sp>
       <p:sp>
         <p:nvSpPr>
-          <p:cNvPr id="19" name="下箭头 18">
+          <p:cNvPr id="20" name="矩形 19">
             <a:extLst>
               <a:ext uri="{FF2B5EF4-FFF2-40B4-BE49-F238E27FC236}">
-                <a16:creationId xmlns:a16="http://schemas.microsoft.com/office/drawing/2014/main" id="{B19B3BA4-4AAE-8E4C-8737-BDF2F0095AFE}"/>
+                <a16:creationId xmlns:a16="http://schemas.microsoft.com/office/drawing/2014/main" id="{58E43071-A805-2B45-BFAF-AAFB999643C6}"/>
               </a:ext>
             </a:extLst>
           </p:cNvPr>
@@ -1985,8 +1834,313 @@
         </p:nvSpPr>
         <p:spPr>
           <a:xfrm>
-            <a:off x="4602188" y="2750545"/>
-            <a:ext cx="245470" cy="380245"/>
+            <a:off x="131250" y="5233625"/>
+            <a:ext cx="11852030" cy="1569660"/>
+          </a:xfrm>
+          <a:prstGeom prst="rect">
+            <a:avLst/>
+          </a:prstGeom>
+        </p:spPr>
+        <p:txBody>
+          <a:bodyPr wrap="square">
+            <a:spAutoFit/>
+          </a:bodyPr>
+          <a:lstStyle/>
+          <a:p>
+            <a:pPr marL="342900" indent="-342900">
+              <a:buFont typeface="Wingdings" pitchFamily="2" charset="2"/>
+              <a:buChar char="l"/>
+            </a:pPr>
+            <a:r>
+              <a:rPr kumimoji="1" lang="zh-CN" altLang="en-US" sz="2400" dirty="0">
+                <a:latin typeface="Times New Roman" charset="0"/>
+                <a:ea typeface="楷体_GB2312" panose="02010609030101010101" pitchFamily="49" charset="-122"/>
+              </a:rPr>
+              <a:t>索引 </a:t>
+            </a:r>
+            <a:r>
+              <a:rPr kumimoji="1" lang="en-US" altLang="zh-CN" sz="2400" dirty="0">
+                <a:latin typeface="Times New Roman" charset="0"/>
+                <a:ea typeface="楷体_GB2312" panose="02010609030101010101" pitchFamily="49" charset="-122"/>
+              </a:rPr>
+              <a:t>2</a:t>
+            </a:r>
+            <a:r>
+              <a:rPr kumimoji="1" lang="zh-CN" altLang="en-US" sz="2400" dirty="0">
+                <a:latin typeface="Times New Roman" charset="0"/>
+                <a:ea typeface="楷体_GB2312" panose="02010609030101010101" pitchFamily="49" charset="-122"/>
+              </a:rPr>
+              <a:t> 上现在放置的数字 </a:t>
+            </a:r>
+            <a:r>
+              <a:rPr kumimoji="1" lang="en-US" altLang="zh-CN" sz="2400" dirty="0">
+                <a:latin typeface="Times New Roman" charset="0"/>
+                <a:ea typeface="楷体_GB2312" panose="02010609030101010101" pitchFamily="49" charset="-122"/>
+              </a:rPr>
+              <a:t>3</a:t>
+            </a:r>
+            <a:r>
+              <a:rPr kumimoji="1" lang="zh-CN" altLang="en-US" sz="2400" dirty="0">
+                <a:latin typeface="Times New Roman" charset="0"/>
+                <a:ea typeface="楷体_GB2312" panose="02010609030101010101" pitchFamily="49" charset="-122"/>
+              </a:rPr>
+              <a:t> 放对了，我们把它标红；</a:t>
+            </a:r>
+            <a:endParaRPr kumimoji="1" lang="en-US" altLang="zh-CN" sz="2400" dirty="0">
+              <a:latin typeface="Times New Roman" charset="0"/>
+              <a:ea typeface="楷体_GB2312" panose="02010609030101010101" pitchFamily="49" charset="-122"/>
+            </a:endParaRPr>
+          </a:p>
+          <a:p>
+            <a:pPr marL="342900" indent="-342900">
+              <a:buFont typeface="Wingdings" pitchFamily="2" charset="2"/>
+              <a:buChar char="l"/>
+            </a:pPr>
+            <a:r>
+              <a:rPr kumimoji="1" lang="zh-CN" altLang="en-US" sz="2400" dirty="0">
+                <a:latin typeface="Times New Roman" charset="0"/>
+                <a:ea typeface="楷体_GB2312" panose="02010609030101010101" pitchFamily="49" charset="-122"/>
+              </a:rPr>
+              <a:t>现在索引 </a:t>
+            </a:r>
+            <a:r>
+              <a:rPr kumimoji="1" lang="en-US" altLang="zh-CN" sz="2400" dirty="0">
+                <a:latin typeface="Times New Roman" charset="0"/>
+                <a:ea typeface="楷体_GB2312" panose="02010609030101010101" pitchFamily="49" charset="-122"/>
+              </a:rPr>
+              <a:t>0</a:t>
+            </a:r>
+            <a:r>
+              <a:rPr kumimoji="1" lang="zh-CN" altLang="en-US" sz="2400" dirty="0">
+                <a:latin typeface="Times New Roman" charset="0"/>
+                <a:ea typeface="楷体_GB2312" panose="02010609030101010101" pitchFamily="49" charset="-122"/>
+              </a:rPr>
+              <a:t> 上的数字是 </a:t>
+            </a:r>
+            <a:r>
+              <a:rPr kumimoji="1" lang="en-US" altLang="zh-CN" sz="2400" dirty="0">
+                <a:latin typeface="Times New Roman" charset="0"/>
+                <a:ea typeface="楷体_GB2312" panose="02010609030101010101" pitchFamily="49" charset="-122"/>
+              </a:rPr>
+              <a:t>-1</a:t>
+            </a:r>
+            <a:r>
+              <a:rPr kumimoji="1" lang="zh-CN" altLang="en-US" sz="2400" dirty="0">
+                <a:latin typeface="Times New Roman" charset="0"/>
+                <a:ea typeface="楷体_GB2312" panose="02010609030101010101" pitchFamily="49" charset="-122"/>
+              </a:rPr>
+              <a:t>，它不在 </a:t>
+            </a:r>
+            <a:r>
+              <a:rPr kumimoji="1" lang="en-US" altLang="zh-CN" sz="2400" dirty="0">
+                <a:latin typeface="Times New Roman" charset="0"/>
+                <a:ea typeface="楷体_GB2312" panose="02010609030101010101" pitchFamily="49" charset="-122"/>
+              </a:rPr>
+              <a:t>{1,</a:t>
+            </a:r>
+            <a:r>
+              <a:rPr kumimoji="1" lang="zh-CN" altLang="en-US" sz="2400" dirty="0">
+                <a:latin typeface="Times New Roman" charset="0"/>
+                <a:ea typeface="楷体_GB2312" panose="02010609030101010101" pitchFamily="49" charset="-122"/>
+              </a:rPr>
+              <a:t> </a:t>
+            </a:r>
+            <a:r>
+              <a:rPr kumimoji="1" lang="en-US" altLang="zh-CN" sz="2400" dirty="0">
+                <a:latin typeface="Times New Roman" charset="0"/>
+                <a:ea typeface="楷体_GB2312" panose="02010609030101010101" pitchFamily="49" charset="-122"/>
+              </a:rPr>
+              <a:t>2,</a:t>
+            </a:r>
+            <a:r>
+              <a:rPr kumimoji="1" lang="zh-CN" altLang="en-US" sz="2400" dirty="0">
+                <a:latin typeface="Times New Roman" charset="0"/>
+                <a:ea typeface="楷体_GB2312" panose="02010609030101010101" pitchFamily="49" charset="-122"/>
+              </a:rPr>
+              <a:t> </a:t>
+            </a:r>
+            <a:r>
+              <a:rPr kumimoji="1" lang="en-US" altLang="zh-CN" sz="2400" dirty="0">
+                <a:latin typeface="Times New Roman" charset="0"/>
+                <a:ea typeface="楷体_GB2312" panose="02010609030101010101" pitchFamily="49" charset="-122"/>
+              </a:rPr>
+              <a:t>3,</a:t>
+            </a:r>
+            <a:r>
+              <a:rPr kumimoji="1" lang="zh-CN" altLang="en-US" sz="2400" dirty="0">
+                <a:latin typeface="Times New Roman" charset="0"/>
+                <a:ea typeface="楷体_GB2312" panose="02010609030101010101" pitchFamily="49" charset="-122"/>
+              </a:rPr>
+              <a:t> </a:t>
+            </a:r>
+            <a:r>
+              <a:rPr kumimoji="1" lang="en-US" altLang="zh-CN" sz="2400" dirty="0">
+                <a:latin typeface="Times New Roman" charset="0"/>
+                <a:ea typeface="楷体_GB2312" panose="02010609030101010101" pitchFamily="49" charset="-122"/>
+              </a:rPr>
+              <a:t>4}</a:t>
+            </a:r>
+            <a:r>
+              <a:rPr kumimoji="1" lang="zh-CN" altLang="en-US" sz="2400" dirty="0">
+                <a:latin typeface="Times New Roman" charset="0"/>
+                <a:ea typeface="楷体_GB2312" panose="02010609030101010101" pitchFamily="49" charset="-122"/>
+              </a:rPr>
+              <a:t> 这个集合中，是“无处安放”的元素，</a:t>
+            </a:r>
+            <a:r>
+              <a:rPr kumimoji="1" lang="zh-CN" altLang="en-US" sz="2400" b="1" dirty="0">
+                <a:solidFill>
+                  <a:srgbClr val="FF0000"/>
+                </a:solidFill>
+                <a:highlight>
+                  <a:srgbClr val="FFFF00"/>
+                </a:highlight>
+                <a:latin typeface="Times New Roman" charset="0"/>
+                <a:ea typeface="楷体_GB2312" panose="02010609030101010101" pitchFamily="49" charset="-122"/>
+              </a:rPr>
+              <a:t>放在哪里都不对</a:t>
+            </a:r>
+            <a:r>
+              <a:rPr kumimoji="1" lang="zh-CN" altLang="en-US" sz="2400" dirty="0">
+                <a:latin typeface="Times New Roman" charset="0"/>
+                <a:ea typeface="楷体_GB2312" panose="02010609030101010101" pitchFamily="49" charset="-122"/>
+              </a:rPr>
+              <a:t>，</a:t>
+            </a:r>
+            <a:r>
+              <a:rPr kumimoji="1" lang="zh-CN" altLang="en-US" sz="2400" b="1" dirty="0">
+                <a:solidFill>
+                  <a:srgbClr val="FF0000"/>
+                </a:solidFill>
+                <a:latin typeface="Times New Roman" charset="0"/>
+                <a:ea typeface="楷体_GB2312" panose="02010609030101010101" pitchFamily="49" charset="-122"/>
+              </a:rPr>
+              <a:t>索引 </a:t>
+            </a:r>
+            <a:r>
+              <a:rPr kumimoji="1" lang="en-US" altLang="zh-CN" sz="2400" b="1" dirty="0">
+                <a:solidFill>
+                  <a:srgbClr val="FF0000"/>
+                </a:solidFill>
+                <a:latin typeface="Times New Roman" charset="0"/>
+                <a:ea typeface="楷体_GB2312" panose="02010609030101010101" pitchFamily="49" charset="-122"/>
+              </a:rPr>
+              <a:t>0</a:t>
+            </a:r>
+            <a:r>
+              <a:rPr kumimoji="1" lang="zh-CN" altLang="en-US" sz="2400" b="1" dirty="0">
+                <a:solidFill>
+                  <a:srgbClr val="FF0000"/>
+                </a:solidFill>
+                <a:latin typeface="Times New Roman" charset="0"/>
+                <a:ea typeface="楷体_GB2312" panose="02010609030101010101" pitchFamily="49" charset="-122"/>
+              </a:rPr>
+              <a:t> 上的元素等待后序如果有数字 </a:t>
+            </a:r>
+            <a:r>
+              <a:rPr kumimoji="1" lang="en-US" altLang="zh-CN" sz="2400" b="1" dirty="0">
+                <a:solidFill>
+                  <a:srgbClr val="FF0000"/>
+                </a:solidFill>
+                <a:latin typeface="Times New Roman" charset="0"/>
+                <a:ea typeface="楷体_GB2312" panose="02010609030101010101" pitchFamily="49" charset="-122"/>
+              </a:rPr>
+              <a:t>1</a:t>
+            </a:r>
+            <a:r>
+              <a:rPr kumimoji="1" lang="zh-CN" altLang="en-US" sz="2400" b="1" dirty="0">
+                <a:solidFill>
+                  <a:srgbClr val="FF0000"/>
+                </a:solidFill>
+                <a:latin typeface="Times New Roman" charset="0"/>
+                <a:ea typeface="楷体_GB2312" panose="02010609030101010101" pitchFamily="49" charset="-122"/>
+              </a:rPr>
+              <a:t> 会被交换过来</a:t>
+            </a:r>
+            <a:r>
+              <a:rPr kumimoji="1" lang="zh-CN" altLang="en-US" sz="2400" dirty="0">
+                <a:latin typeface="Times New Roman" charset="0"/>
+                <a:ea typeface="楷体_GB2312" panose="02010609030101010101" pitchFamily="49" charset="-122"/>
+              </a:rPr>
+              <a:t>，接下来看下一个索引。</a:t>
+            </a:r>
+          </a:p>
+        </p:txBody>
+      </p:sp>
+      <p:sp>
+        <p:nvSpPr>
+          <p:cNvPr id="10" name="文本框 9">
+            <a:extLst>
+              <a:ext uri="{FF2B5EF4-FFF2-40B4-BE49-F238E27FC236}">
+                <a16:creationId xmlns:a16="http://schemas.microsoft.com/office/drawing/2014/main" id="{CE337204-2E08-4F4D-8A28-E5B5DEF1B46D}"/>
+              </a:ext>
+            </a:extLst>
+          </p:cNvPr>
+          <p:cNvSpPr txBox="1"/>
+          <p:nvPr/>
+        </p:nvSpPr>
+        <p:spPr>
+          <a:xfrm flipH="1">
+            <a:off x="804679" y="781316"/>
+            <a:ext cx="8474450" cy="461665"/>
+          </a:xfrm>
+          <a:prstGeom prst="rect">
+            <a:avLst/>
+          </a:prstGeom>
+          <a:solidFill>
+            <a:srgbClr val="FF0000"/>
+          </a:solidFill>
+          <a:ln>
+            <a:noFill/>
+          </a:ln>
+          <a:effectLst>
+            <a:outerShdw blurRad="50800" dist="38100" dir="2700000" algn="tl" rotWithShape="0">
+              <a:prstClr val="black">
+                <a:alpha val="40000"/>
+              </a:prstClr>
+            </a:outerShdw>
+          </a:effectLst>
+        </p:spPr>
+        <p:txBody>
+          <a:bodyPr wrap="square" rtlCol="0">
+            <a:spAutoFit/>
+          </a:bodyPr>
+          <a:lstStyle/>
+          <a:p>
+            <a:pPr marL="342900" indent="-342900">
+              <a:buFont typeface="Wingdings" pitchFamily="2" charset="2"/>
+              <a:buChar char="Ø"/>
+            </a:pPr>
+            <a:r>
+              <a:rPr kumimoji="1" lang="zh-CN" altLang="en-US" sz="2400" b="1" dirty="0">
+                <a:solidFill>
+                  <a:schemeClr val="bg1"/>
+                </a:solidFill>
+                <a:latin typeface="Times New Roman" panose="02020603050405020304" pitchFamily="18" charset="0"/>
+                <a:ea typeface="KaiTi_GB2312" panose="02010609030101010101" pitchFamily="49" charset="-122"/>
+                <a:cs typeface="Times New Roman" panose="02020603050405020304" pitchFamily="18" charset="0"/>
+              </a:rPr>
+              <a:t>思想：桶排序（一个萝卜一个坑）、抽屉原理、鸽巢原理。</a:t>
+            </a:r>
+          </a:p>
+        </p:txBody>
+      </p:sp>
+      <p:sp>
+        <p:nvSpPr>
+          <p:cNvPr id="12" name="下箭头 11">
+            <a:extLst>
+              <a:ext uri="{FF2B5EF4-FFF2-40B4-BE49-F238E27FC236}">
+                <a16:creationId xmlns:a16="http://schemas.microsoft.com/office/drawing/2014/main" id="{5E681D0E-084C-B342-BAE3-BEC9D311DD4B}"/>
+              </a:ext>
+            </a:extLst>
+          </p:cNvPr>
+          <p:cNvSpPr/>
+          <p:nvPr/>
+        </p:nvSpPr>
+        <p:spPr>
+          <a:xfrm>
+            <a:off x="3169382" y="2318940"/>
+            <a:ext cx="1086096" cy="481742"/>
           </a:xfrm>
           <a:prstGeom prst="downArrow">
             <a:avLst/>
@@ -2025,10 +2179,10 @@
       </p:sp>
       <p:sp>
         <p:nvSpPr>
-          <p:cNvPr id="20" name="矩形 19">
+          <p:cNvPr id="9" name="矩形 8">
             <a:extLst>
               <a:ext uri="{FF2B5EF4-FFF2-40B4-BE49-F238E27FC236}">
-                <a16:creationId xmlns:a16="http://schemas.microsoft.com/office/drawing/2014/main" id="{58E43071-A805-2B45-BFAF-AAFB999643C6}"/>
+                <a16:creationId xmlns:a16="http://schemas.microsoft.com/office/drawing/2014/main" id="{F1BFFC87-7683-3A4A-B381-BF57E79D1689}"/>
               </a:ext>
             </a:extLst>
           </p:cNvPr>
@@ -2037,222 +2191,112 @@
         </p:nvSpPr>
         <p:spPr>
           <a:xfrm>
-            <a:off x="3878563" y="5151660"/>
-            <a:ext cx="6598958" cy="1200329"/>
+            <a:off x="753897" y="1297746"/>
+            <a:ext cx="4578497" cy="461665"/>
           </a:xfrm>
           <a:prstGeom prst="rect">
             <a:avLst/>
           </a:prstGeom>
         </p:spPr>
         <p:txBody>
-          <a:bodyPr wrap="square">
+          <a:bodyPr wrap="none">
             <a:spAutoFit/>
           </a:bodyPr>
           <a:lstStyle/>
           <a:p>
             <a:r>
-              <a:rPr kumimoji="1" lang="en-US" altLang="zh-CN" dirty="0">
-                <a:latin typeface="Times New Roman" charset="0"/>
-                <a:ea typeface="楷体_GB2312" panose="02010609030101010101" pitchFamily="49" charset="-122"/>
+              <a:rPr lang="zh-CN" altLang="en-US" sz="2400" dirty="0">
+                <a:latin typeface="Times New Roman" panose="02020603050405020304" pitchFamily="18" charset="0"/>
+                <a:ea typeface="KaiTi_GB2312" panose="02010609030101010101" pitchFamily="49" charset="-122"/>
+                <a:cs typeface="Times New Roman" panose="02020603050405020304" pitchFamily="18" charset="0"/>
+              </a:rPr>
+              <a:t>以示例 </a:t>
+            </a:r>
+            <a:r>
+              <a:rPr lang="en-US" altLang="zh-CN" sz="2400" dirty="0">
+                <a:latin typeface="Times New Roman" panose="02020603050405020304" pitchFamily="18" charset="0"/>
+                <a:ea typeface="KaiTi_GB2312" panose="02010609030101010101" pitchFamily="49" charset="-122"/>
+                <a:cs typeface="Times New Roman" panose="02020603050405020304" pitchFamily="18" charset="0"/>
+              </a:rPr>
+              <a:t>2</a:t>
+            </a:r>
+            <a:r>
+              <a:rPr lang="zh-CN" altLang="en-US" sz="2400" dirty="0">
+                <a:latin typeface="Times New Roman" panose="02020603050405020304" pitchFamily="18" charset="0"/>
+                <a:ea typeface="KaiTi_GB2312" panose="02010609030101010101" pitchFamily="49" charset="-122"/>
+                <a:cs typeface="Times New Roman" panose="02020603050405020304" pitchFamily="18" charset="0"/>
+              </a:rPr>
+              <a:t> 输入: [</a:t>
+            </a:r>
+            <a:r>
+              <a:rPr lang="en-US" altLang="zh-CN" sz="2400" dirty="0">
+                <a:latin typeface="Times New Roman" panose="02020603050405020304" pitchFamily="18" charset="0"/>
+                <a:ea typeface="KaiTi_GB2312" panose="02010609030101010101" pitchFamily="49" charset="-122"/>
+                <a:cs typeface="Times New Roman" panose="02020603050405020304" pitchFamily="18" charset="0"/>
+              </a:rPr>
+              <a:t>3</a:t>
+            </a:r>
+            <a:r>
+              <a:rPr lang="zh-CN" altLang="en-US" sz="2400" dirty="0">
+                <a:latin typeface="Times New Roman" panose="02020603050405020304" pitchFamily="18" charset="0"/>
+                <a:ea typeface="KaiTi_GB2312" panose="02010609030101010101" pitchFamily="49" charset="-122"/>
+                <a:cs typeface="Times New Roman" panose="02020603050405020304" pitchFamily="18" charset="0"/>
+              </a:rPr>
+              <a:t>, </a:t>
+            </a:r>
+            <a:r>
+              <a:rPr lang="en-US" altLang="zh-CN" sz="2400" dirty="0">
+                <a:latin typeface="Times New Roman" panose="02020603050405020304" pitchFamily="18" charset="0"/>
+                <a:ea typeface="KaiTi_GB2312" panose="02010609030101010101" pitchFamily="49" charset="-122"/>
+                <a:cs typeface="Times New Roman" panose="02020603050405020304" pitchFamily="18" charset="0"/>
+              </a:rPr>
+              <a:t>4</a:t>
+            </a:r>
+            <a:r>
+              <a:rPr lang="zh-CN" altLang="en-US" sz="2400" dirty="0">
+                <a:latin typeface="Times New Roman" panose="02020603050405020304" pitchFamily="18" charset="0"/>
+                <a:ea typeface="KaiTi_GB2312" panose="02010609030101010101" pitchFamily="49" charset="-122"/>
+                <a:cs typeface="Times New Roman" panose="02020603050405020304" pitchFamily="18" charset="0"/>
+              </a:rPr>
+              <a:t>, </a:t>
+            </a:r>
+            <a:r>
+              <a:rPr lang="en-US" altLang="zh-CN" sz="2400" dirty="0">
+                <a:latin typeface="Times New Roman" panose="02020603050405020304" pitchFamily="18" charset="0"/>
+                <a:ea typeface="KaiTi_GB2312" panose="02010609030101010101" pitchFamily="49" charset="-122"/>
+                <a:cs typeface="Times New Roman" panose="02020603050405020304" pitchFamily="18" charset="0"/>
+              </a:rPr>
+              <a:t>-1</a:t>
+            </a:r>
+            <a:r>
+              <a:rPr lang="zh-CN" altLang="en-US" sz="2400" dirty="0">
+                <a:latin typeface="Times New Roman" panose="02020603050405020304" pitchFamily="18" charset="0"/>
+                <a:ea typeface="KaiTi_GB2312" panose="02010609030101010101" pitchFamily="49" charset="-122"/>
+                <a:cs typeface="Times New Roman" panose="02020603050405020304" pitchFamily="18" charset="0"/>
+              </a:rPr>
+              <a:t>, </a:t>
+            </a:r>
+            <a:r>
+              <a:rPr lang="en-US" altLang="zh-CN" sz="2400" dirty="0">
+                <a:latin typeface="Times New Roman" panose="02020603050405020304" pitchFamily="18" charset="0"/>
+                <a:ea typeface="KaiTi_GB2312" panose="02010609030101010101" pitchFamily="49" charset="-122"/>
+                <a:cs typeface="Times New Roman" panose="02020603050405020304" pitchFamily="18" charset="0"/>
               </a:rPr>
               <a:t>1</a:t>
             </a:r>
             <a:r>
-              <a:rPr kumimoji="1" lang="zh-CN" altLang="en-US" dirty="0">
-                <a:latin typeface="Times New Roman" charset="0"/>
-                <a:ea typeface="楷体_GB2312" panose="02010609030101010101" pitchFamily="49" charset="-122"/>
-              </a:rPr>
-              <a:t>、索引 </a:t>
-            </a:r>
-            <a:r>
-              <a:rPr kumimoji="1" lang="en-US" altLang="zh-CN" dirty="0">
-                <a:latin typeface="Times New Roman" charset="0"/>
-                <a:ea typeface="楷体_GB2312" panose="02010609030101010101" pitchFamily="49" charset="-122"/>
-              </a:rPr>
-              <a:t>2</a:t>
-            </a:r>
-            <a:r>
-              <a:rPr kumimoji="1" lang="zh-CN" altLang="en-US" dirty="0">
-                <a:latin typeface="Times New Roman" charset="0"/>
-                <a:ea typeface="楷体_GB2312" panose="02010609030101010101" pitchFamily="49" charset="-122"/>
-              </a:rPr>
-              <a:t> 上现在放置的数字 </a:t>
-            </a:r>
-            <a:r>
-              <a:rPr kumimoji="1" lang="en-US" altLang="zh-CN" dirty="0">
-                <a:latin typeface="Times New Roman" charset="0"/>
-                <a:ea typeface="楷体_GB2312" panose="02010609030101010101" pitchFamily="49" charset="-122"/>
-              </a:rPr>
-              <a:t>3</a:t>
-            </a:r>
-            <a:r>
-              <a:rPr kumimoji="1" lang="zh-CN" altLang="en-US" dirty="0">
-                <a:latin typeface="Times New Roman" charset="0"/>
-                <a:ea typeface="楷体_GB2312" panose="02010609030101010101" pitchFamily="49" charset="-122"/>
-              </a:rPr>
-              <a:t> 放对了，我们把它标红；</a:t>
-            </a:r>
-            <a:endParaRPr kumimoji="1" lang="en-US" altLang="zh-CN" dirty="0">
-              <a:latin typeface="Times New Roman" charset="0"/>
-              <a:ea typeface="楷体_GB2312" panose="02010609030101010101" pitchFamily="49" charset="-122"/>
+              <a:rPr lang="zh-CN" altLang="en-US" sz="2400" dirty="0">
+                <a:latin typeface="Times New Roman" panose="02020603050405020304" pitchFamily="18" charset="0"/>
+                <a:ea typeface="KaiTi_GB2312" panose="02010609030101010101" pitchFamily="49" charset="-122"/>
+                <a:cs typeface="Times New Roman" panose="02020603050405020304" pitchFamily="18" charset="0"/>
+              </a:rPr>
+              <a:t>] 为例。</a:t>
+            </a:r>
+            <a:endParaRPr lang="en-US" altLang="zh-CN" sz="2400" dirty="0">
+              <a:latin typeface="Times New Roman" panose="02020603050405020304" pitchFamily="18" charset="0"/>
+              <a:ea typeface="KaiTi_GB2312" panose="02010609030101010101" pitchFamily="49" charset="-122"/>
+              <a:cs typeface="Times New Roman" panose="02020603050405020304" pitchFamily="18" charset="0"/>
             </a:endParaRPr>
-          </a:p>
-          <a:p>
-            <a:r>
-              <a:rPr kumimoji="1" lang="en-US" altLang="zh-CN" dirty="0">
-                <a:latin typeface="Times New Roman" charset="0"/>
-                <a:ea typeface="楷体_GB2312" panose="02010609030101010101" pitchFamily="49" charset="-122"/>
-              </a:rPr>
-              <a:t>2</a:t>
-            </a:r>
-            <a:r>
-              <a:rPr kumimoji="1" lang="zh-CN" altLang="en-US" dirty="0">
-                <a:latin typeface="Times New Roman" charset="0"/>
-                <a:ea typeface="楷体_GB2312" panose="02010609030101010101" pitchFamily="49" charset="-122"/>
-              </a:rPr>
-              <a:t>、现在索引 </a:t>
-            </a:r>
-            <a:r>
-              <a:rPr kumimoji="1" lang="en-US" altLang="zh-CN" dirty="0">
-                <a:latin typeface="Times New Roman" charset="0"/>
-                <a:ea typeface="楷体_GB2312" panose="02010609030101010101" pitchFamily="49" charset="-122"/>
-              </a:rPr>
-              <a:t>0</a:t>
-            </a:r>
-            <a:r>
-              <a:rPr kumimoji="1" lang="zh-CN" altLang="en-US" dirty="0">
-                <a:latin typeface="Times New Roman" charset="0"/>
-                <a:ea typeface="楷体_GB2312" panose="02010609030101010101" pitchFamily="49" charset="-122"/>
-              </a:rPr>
-              <a:t> 上的数字是 </a:t>
-            </a:r>
-            <a:r>
-              <a:rPr kumimoji="1" lang="en-US" altLang="zh-CN" dirty="0">
-                <a:latin typeface="Times New Roman" charset="0"/>
-                <a:ea typeface="楷体_GB2312" panose="02010609030101010101" pitchFamily="49" charset="-122"/>
-              </a:rPr>
-              <a:t>-1</a:t>
-            </a:r>
-            <a:r>
-              <a:rPr kumimoji="1" lang="zh-CN" altLang="en-US" dirty="0">
-                <a:latin typeface="Times New Roman" charset="0"/>
-                <a:ea typeface="楷体_GB2312" panose="02010609030101010101" pitchFamily="49" charset="-122"/>
-              </a:rPr>
-              <a:t>，它不在 </a:t>
-            </a:r>
-            <a:r>
-              <a:rPr kumimoji="1" lang="en-US" altLang="zh-CN" dirty="0">
-                <a:latin typeface="Times New Roman" charset="0"/>
-                <a:ea typeface="楷体_GB2312" panose="02010609030101010101" pitchFamily="49" charset="-122"/>
-              </a:rPr>
-              <a:t>{1,</a:t>
-            </a:r>
-            <a:r>
-              <a:rPr kumimoji="1" lang="zh-CN" altLang="en-US" dirty="0">
-                <a:latin typeface="Times New Roman" charset="0"/>
-                <a:ea typeface="楷体_GB2312" panose="02010609030101010101" pitchFamily="49" charset="-122"/>
-              </a:rPr>
-              <a:t> </a:t>
-            </a:r>
-            <a:r>
-              <a:rPr kumimoji="1" lang="en-US" altLang="zh-CN" dirty="0">
-                <a:latin typeface="Times New Roman" charset="0"/>
-                <a:ea typeface="楷体_GB2312" panose="02010609030101010101" pitchFamily="49" charset="-122"/>
-              </a:rPr>
-              <a:t>2,</a:t>
-            </a:r>
-            <a:r>
-              <a:rPr kumimoji="1" lang="zh-CN" altLang="en-US" dirty="0">
-                <a:latin typeface="Times New Roman" charset="0"/>
-                <a:ea typeface="楷体_GB2312" panose="02010609030101010101" pitchFamily="49" charset="-122"/>
-              </a:rPr>
-              <a:t> </a:t>
-            </a:r>
-            <a:r>
-              <a:rPr kumimoji="1" lang="en-US" altLang="zh-CN" dirty="0">
-                <a:latin typeface="Times New Roman" charset="0"/>
-                <a:ea typeface="楷体_GB2312" panose="02010609030101010101" pitchFamily="49" charset="-122"/>
-              </a:rPr>
-              <a:t>3,</a:t>
-            </a:r>
-            <a:r>
-              <a:rPr kumimoji="1" lang="zh-CN" altLang="en-US" dirty="0">
-                <a:latin typeface="Times New Roman" charset="0"/>
-                <a:ea typeface="楷体_GB2312" panose="02010609030101010101" pitchFamily="49" charset="-122"/>
-              </a:rPr>
-              <a:t> </a:t>
-            </a:r>
-            <a:r>
-              <a:rPr kumimoji="1" lang="en-US" altLang="zh-CN" dirty="0">
-                <a:latin typeface="Times New Roman" charset="0"/>
-                <a:ea typeface="楷体_GB2312" panose="02010609030101010101" pitchFamily="49" charset="-122"/>
-              </a:rPr>
-              <a:t>4}</a:t>
-            </a:r>
-            <a:r>
-              <a:rPr kumimoji="1" lang="zh-CN" altLang="en-US" dirty="0">
-                <a:latin typeface="Times New Roman" charset="0"/>
-                <a:ea typeface="楷体_GB2312" panose="02010609030101010101" pitchFamily="49" charset="-122"/>
-              </a:rPr>
-              <a:t> 这个集合中，是“无处安放”的元素，放在哪里都不对，</a:t>
-            </a:r>
-            <a:r>
-              <a:rPr kumimoji="1" lang="zh-CN" altLang="en-US" b="1" dirty="0">
-                <a:solidFill>
-                  <a:srgbClr val="FF0000"/>
-                </a:solidFill>
-                <a:latin typeface="Times New Roman" charset="0"/>
-                <a:ea typeface="楷体_GB2312" panose="02010609030101010101" pitchFamily="49" charset="-122"/>
-              </a:rPr>
-              <a:t>索引 </a:t>
-            </a:r>
-            <a:r>
-              <a:rPr kumimoji="1" lang="en-US" altLang="zh-CN" b="1" dirty="0">
-                <a:solidFill>
-                  <a:srgbClr val="FF0000"/>
-                </a:solidFill>
-                <a:latin typeface="Times New Roman" charset="0"/>
-                <a:ea typeface="楷体_GB2312" panose="02010609030101010101" pitchFamily="49" charset="-122"/>
-              </a:rPr>
-              <a:t>0</a:t>
-            </a:r>
-            <a:r>
-              <a:rPr kumimoji="1" lang="zh-CN" altLang="en-US" b="1" dirty="0">
-                <a:solidFill>
-                  <a:srgbClr val="FF0000"/>
-                </a:solidFill>
-                <a:latin typeface="Times New Roman" charset="0"/>
-                <a:ea typeface="楷体_GB2312" panose="02010609030101010101" pitchFamily="49" charset="-122"/>
-              </a:rPr>
-              <a:t> 上的元素等待后序如果有数字 </a:t>
-            </a:r>
-            <a:r>
-              <a:rPr kumimoji="1" lang="en-US" altLang="zh-CN" b="1" dirty="0">
-                <a:solidFill>
-                  <a:srgbClr val="FF0000"/>
-                </a:solidFill>
-                <a:latin typeface="Times New Roman" charset="0"/>
-                <a:ea typeface="楷体_GB2312" panose="02010609030101010101" pitchFamily="49" charset="-122"/>
-              </a:rPr>
-              <a:t>1</a:t>
-            </a:r>
-            <a:r>
-              <a:rPr kumimoji="1" lang="zh-CN" altLang="en-US" b="1" dirty="0">
-                <a:solidFill>
-                  <a:srgbClr val="FF0000"/>
-                </a:solidFill>
-                <a:latin typeface="Times New Roman" charset="0"/>
-                <a:ea typeface="楷体_GB2312" panose="02010609030101010101" pitchFamily="49" charset="-122"/>
-              </a:rPr>
-              <a:t> 会被交换过来</a:t>
-            </a:r>
-            <a:r>
-              <a:rPr kumimoji="1" lang="zh-CN" altLang="en-US" dirty="0">
-                <a:latin typeface="Times New Roman" charset="0"/>
-                <a:ea typeface="楷体_GB2312" panose="02010609030101010101" pitchFamily="49" charset="-122"/>
-              </a:rPr>
-              <a:t>，接下来看下一个索引。</a:t>
-            </a:r>
           </a:p>
         </p:txBody>
       </p:sp>
@@ -2308,8 +2352,8 @@
         </p:blipFill>
         <p:spPr>
           <a:xfrm>
-            <a:off x="4034008" y="3320946"/>
-            <a:ext cx="4775846" cy="1640558"/>
+            <a:off x="2880000" y="2880000"/>
+            <a:ext cx="7335999" cy="2520000"/>
           </a:xfrm>
           <a:prstGeom prst="rect">
             <a:avLst/>
@@ -2426,8 +2470,8 @@
         </p:nvSpPr>
         <p:spPr>
           <a:xfrm>
-            <a:off x="5099164" y="2286135"/>
-            <a:ext cx="5303631" cy="369332"/>
+            <a:off x="5041904" y="1776127"/>
+            <a:ext cx="5303631" cy="400110"/>
           </a:xfrm>
           <a:prstGeom prst="rect">
             <a:avLst/>
@@ -2440,21 +2484,21 @@
           <a:lstStyle/>
           <a:p>
             <a:r>
-              <a:rPr kumimoji="1" lang="zh-CN" altLang="en-US" dirty="0">
+              <a:rPr kumimoji="1" lang="zh-CN" altLang="en-US" sz="2000" dirty="0">
                 <a:latin typeface="Times New Roman" charset="0"/>
                 <a:ea typeface="楷体_GB2312" panose="02010609030101010101" pitchFamily="49" charset="-122"/>
               </a:rPr>
               <a:t>接下来看索引 </a:t>
             </a:r>
             <a:r>
-              <a:rPr kumimoji="1" lang="en-US" altLang="zh-CN" dirty="0">
+              <a:rPr kumimoji="1" lang="en-US" altLang="zh-CN" sz="2000" dirty="0">
                 <a:latin typeface="Times New Roman" charset="0"/>
                 <a:ea typeface="楷体_GB2312" panose="02010609030101010101" pitchFamily="49" charset="-122"/>
               </a:rPr>
               <a:t>1</a:t>
             </a:r>
             <a:r>
-              <a:rPr kumimoji="1" lang="zh-CN" altLang="en-US" dirty="0">
+              <a:rPr kumimoji="1" lang="zh-CN" altLang="en-US" sz="2000" dirty="0">
                 <a:latin typeface="Times New Roman" charset="0"/>
                 <a:ea typeface="楷体_GB2312" panose="02010609030101010101" pitchFamily="49" charset="-122"/>
               </a:rPr>
@@ -2477,8 +2521,8 @@
         </p:nvSpPr>
         <p:spPr>
           <a:xfrm>
-            <a:off x="5275010" y="5151660"/>
-            <a:ext cx="6019535" cy="646331"/>
+            <a:off x="103695" y="5495682"/>
+            <a:ext cx="12009747" cy="461665"/>
           </a:xfrm>
           <a:prstGeom prst="rect">
             <a:avLst/>
@@ -2490,84 +2534,88 @@
           </a:bodyPr>
           <a:lstStyle/>
           <a:p>
-            <a:r>
-              <a:rPr kumimoji="1" lang="zh-CN" altLang="en-US" dirty="0">
+            <a:pPr marL="342900" indent="-342900">
+              <a:buFont typeface="Wingdings" pitchFamily="2" charset="2"/>
+              <a:buChar char="l"/>
+            </a:pPr>
+            <a:r>
+              <a:rPr kumimoji="1" lang="zh-CN" altLang="en-US" sz="2400" dirty="0">
                 <a:latin typeface="Times New Roman" charset="0"/>
                 <a:ea typeface="楷体_GB2312" panose="02010609030101010101" pitchFamily="49" charset="-122"/>
               </a:rPr>
               <a:t>索引 </a:t>
             </a:r>
             <a:r>
-              <a:rPr kumimoji="1" lang="en-US" altLang="zh-CN" dirty="0">
+              <a:rPr kumimoji="1" lang="en-US" altLang="zh-CN" sz="2400" dirty="0">
                 <a:latin typeface="Times New Roman" charset="0"/>
                 <a:ea typeface="楷体_GB2312" panose="02010609030101010101" pitchFamily="49" charset="-122"/>
               </a:rPr>
               <a:t>1</a:t>
             </a:r>
             <a:r>
-              <a:rPr kumimoji="1" lang="zh-CN" altLang="en-US" dirty="0">
+              <a:rPr kumimoji="1" lang="zh-CN" altLang="en-US" sz="2400" dirty="0">
                 <a:latin typeface="Times New Roman" charset="0"/>
                 <a:ea typeface="楷体_GB2312" panose="02010609030101010101" pitchFamily="49" charset="-122"/>
               </a:rPr>
               <a:t> 上现在放置的是数字 </a:t>
             </a:r>
             <a:r>
-              <a:rPr kumimoji="1" lang="en-US" altLang="zh-CN" dirty="0">
+              <a:rPr kumimoji="1" lang="en-US" altLang="zh-CN" sz="2400" dirty="0">
                 <a:latin typeface="Times New Roman" charset="0"/>
                 <a:ea typeface="楷体_GB2312" panose="02010609030101010101" pitchFamily="49" charset="-122"/>
               </a:rPr>
               <a:t>4</a:t>
             </a:r>
             <a:r>
-              <a:rPr kumimoji="1" lang="zh-CN" altLang="en-US" dirty="0">
+              <a:rPr kumimoji="1" lang="zh-CN" altLang="en-US" sz="2400" dirty="0">
                 <a:latin typeface="Times New Roman" charset="0"/>
                 <a:ea typeface="楷体_GB2312" panose="02010609030101010101" pitchFamily="49" charset="-122"/>
               </a:rPr>
               <a:t> ，它应该被放在索引 </a:t>
             </a:r>
             <a:r>
-              <a:rPr kumimoji="1" lang="en-US" altLang="zh-CN" dirty="0">
+              <a:rPr kumimoji="1" lang="en-US" altLang="zh-CN" sz="2400" dirty="0">
                 <a:latin typeface="Times New Roman" charset="0"/>
                 <a:ea typeface="楷体_GB2312" panose="02010609030101010101" pitchFamily="49" charset="-122"/>
               </a:rPr>
               <a:t>3</a:t>
             </a:r>
             <a:r>
-              <a:rPr kumimoji="1" lang="zh-CN" altLang="en-US" dirty="0">
+              <a:rPr kumimoji="1" lang="zh-CN" altLang="en-US" sz="2400" dirty="0">
                 <a:latin typeface="Times New Roman" charset="0"/>
                 <a:ea typeface="楷体_GB2312" panose="02010609030101010101" pitchFamily="49" charset="-122"/>
               </a:rPr>
               <a:t> 处，因此将索引 </a:t>
             </a:r>
             <a:r>
-              <a:rPr kumimoji="1" lang="en-US" altLang="zh-CN" dirty="0">
+              <a:rPr kumimoji="1" lang="en-US" altLang="zh-CN" sz="2400" dirty="0">
                 <a:latin typeface="Times New Roman" charset="0"/>
                 <a:ea typeface="楷体_GB2312" panose="02010609030101010101" pitchFamily="49" charset="-122"/>
               </a:rPr>
               <a:t>1</a:t>
             </a:r>
             <a:r>
-              <a:rPr kumimoji="1" lang="zh-CN" altLang="en-US" dirty="0">
+              <a:rPr kumimoji="1" lang="zh-CN" altLang="en-US" sz="2400" dirty="0">
                 <a:latin typeface="Times New Roman" charset="0"/>
                 <a:ea typeface="楷体_GB2312" panose="02010609030101010101" pitchFamily="49" charset="-122"/>
               </a:rPr>
               <a:t> 与索引 </a:t>
             </a:r>
             <a:r>
-              <a:rPr kumimoji="1" lang="en-US" altLang="zh-CN" dirty="0">
+              <a:rPr kumimoji="1" lang="en-US" altLang="zh-CN" sz="2400" dirty="0">
                 <a:latin typeface="Times New Roman" charset="0"/>
                 <a:ea typeface="楷体_GB2312" panose="02010609030101010101" pitchFamily="49" charset="-122"/>
               </a:rPr>
               <a:t>3</a:t>
             </a:r>
             <a:r>
-              <a:rPr kumimoji="1" lang="zh-CN" altLang="en-US" dirty="0">
+              <a:rPr kumimoji="1" lang="zh-CN" altLang="en-US" sz="2400" dirty="0">
                 <a:latin typeface="Times New Roman" charset="0"/>
                 <a:ea typeface="楷体_GB2312" panose="02010609030101010101" pitchFamily="49" charset="-122"/>
               </a:rPr>
               <a:t> 交换。</a:t>
             </a:r>
-            <a:endParaRPr kumimoji="1" lang="en-US" altLang="zh-CN" dirty="0">
+            <a:endParaRPr kumimoji="1" lang="en-US" altLang="zh-CN" sz="2400" dirty="0">
               <a:latin typeface="Times New Roman" charset="0"/>
               <a:ea typeface="楷体_GB2312" panose="02010609030101010101" pitchFamily="49" charset="-122"/>
             </a:endParaRPr>
@@ -2576,10 +2624,10 @@
       </p:sp>
       <p:sp>
         <p:nvSpPr>
-          <p:cNvPr id="19" name="文本框 18">
+          <p:cNvPr id="10" name="文本框 9">
             <a:extLst>
               <a:ext uri="{FF2B5EF4-FFF2-40B4-BE49-F238E27FC236}">
-                <a16:creationId xmlns:a16="http://schemas.microsoft.com/office/drawing/2014/main" id="{930C590B-2648-3149-80C9-7C66AE123FFA}"/>
+                <a16:creationId xmlns:a16="http://schemas.microsoft.com/office/drawing/2014/main" id="{D5D0097D-764A-5C4D-A48B-D144D33A262E}"/>
               </a:ext>
             </a:extLst>
           </p:cNvPr>
@@ -2588,8 +2636,8 @@
         </p:nvSpPr>
         <p:spPr>
           <a:xfrm flipH="1">
-            <a:off x="804680" y="873508"/>
-            <a:ext cx="5011657" cy="461665"/>
+            <a:off x="804679" y="781316"/>
+            <a:ext cx="8474450" cy="461665"/>
           </a:xfrm>
           <a:prstGeom prst="rect">
             <a:avLst/>
@@ -2627,17 +2675,17 @@
                 <a:ea typeface="KaiTi_GB2312" panose="02010609030101010101" pitchFamily="49" charset="-122"/>
                 <a:cs typeface="Times New Roman" panose="02020603050405020304" pitchFamily="18" charset="0"/>
               </a:rPr>
-              <a:t>思想：桶排序，一个萝卜一个坑。</a:t>
+              <a:t>思想：桶排序（一个萝卜一个坑）、抽屉原理、鸽巢原理。</a:t>
             </a:r>
           </a:p>
         </p:txBody>
       </p:sp>
       <p:sp>
         <p:nvSpPr>
-          <p:cNvPr id="20" name="矩形 19">
+          <p:cNvPr id="12" name="下箭头 11">
             <a:extLst>
               <a:ext uri="{FF2B5EF4-FFF2-40B4-BE49-F238E27FC236}">
-                <a16:creationId xmlns:a16="http://schemas.microsoft.com/office/drawing/2014/main" id="{0160DA1F-5BDD-EE47-B81D-8799C221A362}"/>
+                <a16:creationId xmlns:a16="http://schemas.microsoft.com/office/drawing/2014/main" id="{6F4C2BDA-0F6E-B047-8C57-17721DF99BF1}"/>
               </a:ext>
             </a:extLst>
           </p:cNvPr>
@@ -2646,121 +2694,8 @@
         </p:nvSpPr>
         <p:spPr>
           <a:xfrm>
-            <a:off x="729875" y="1536242"/>
-            <a:ext cx="3490058" cy="369332"/>
-          </a:xfrm>
-          <a:prstGeom prst="rect">
-            <a:avLst/>
-          </a:prstGeom>
-        </p:spPr>
-        <p:txBody>
-          <a:bodyPr wrap="none">
-            <a:spAutoFit/>
-          </a:bodyPr>
-          <a:lstStyle/>
-          <a:p>
-            <a:r>
-              <a:rPr lang="zh-CN" altLang="en-US" dirty="0"/>
-              <a:t>以示例 </a:t>
-            </a:r>
-            <a:r>
-              <a:rPr lang="en-US" altLang="zh-CN" dirty="0">
-                <a:latin typeface="Times New Roman" panose="02020603050405020304" pitchFamily="18" charset="0"/>
-                <a:cs typeface="Times New Roman" panose="02020603050405020304" pitchFamily="18" charset="0"/>
-              </a:rPr>
-              <a:t>2</a:t>
-            </a:r>
-            <a:r>
-              <a:rPr lang="zh-CN" altLang="en-US" dirty="0"/>
-              <a:t> 输入</a:t>
-            </a:r>
-            <a:r>
-              <a:rPr lang="zh-CN" altLang="en-US" dirty="0">
-                <a:latin typeface="Times New Roman" panose="02020603050405020304" pitchFamily="18" charset="0"/>
-                <a:cs typeface="Times New Roman" panose="02020603050405020304" pitchFamily="18" charset="0"/>
-              </a:rPr>
-              <a:t>: [</a:t>
-            </a:r>
-            <a:r>
-              <a:rPr lang="en-US" altLang="zh-CN" dirty="0">
-                <a:latin typeface="Times New Roman" panose="02020603050405020304" pitchFamily="18" charset="0"/>
-                <a:cs typeface="Times New Roman" panose="02020603050405020304" pitchFamily="18" charset="0"/>
-              </a:rPr>
-              <a:t>3</a:t>
-            </a:r>
-            <a:r>
-              <a:rPr lang="zh-CN" altLang="en-US" dirty="0">
-                <a:latin typeface="Times New Roman" panose="02020603050405020304" pitchFamily="18" charset="0"/>
-                <a:cs typeface="Times New Roman" panose="02020603050405020304" pitchFamily="18" charset="0"/>
-              </a:rPr>
-              <a:t>, </a:t>
-            </a:r>
-            <a:r>
-              <a:rPr lang="en-US" altLang="zh-CN" dirty="0">
-                <a:latin typeface="Times New Roman" panose="02020603050405020304" pitchFamily="18" charset="0"/>
-                <a:cs typeface="Times New Roman" panose="02020603050405020304" pitchFamily="18" charset="0"/>
-              </a:rPr>
-              <a:t>4</a:t>
-            </a:r>
-            <a:r>
-              <a:rPr lang="zh-CN" altLang="en-US" dirty="0">
-                <a:latin typeface="Times New Roman" panose="02020603050405020304" pitchFamily="18" charset="0"/>
-                <a:cs typeface="Times New Roman" panose="02020603050405020304" pitchFamily="18" charset="0"/>
-              </a:rPr>
-              <a:t>, </a:t>
-            </a:r>
-            <a:r>
-              <a:rPr lang="en-US" altLang="zh-CN" dirty="0">
-                <a:latin typeface="Times New Roman" panose="02020603050405020304" pitchFamily="18" charset="0"/>
-                <a:cs typeface="Times New Roman" panose="02020603050405020304" pitchFamily="18" charset="0"/>
-              </a:rPr>
-              <a:t>-1</a:t>
-            </a:r>
-            <a:r>
-              <a:rPr lang="zh-CN" altLang="en-US" dirty="0">
-                <a:latin typeface="Times New Roman" panose="02020603050405020304" pitchFamily="18" charset="0"/>
-                <a:cs typeface="Times New Roman" panose="02020603050405020304" pitchFamily="18" charset="0"/>
-              </a:rPr>
-              <a:t>, </a:t>
-            </a:r>
-            <a:r>
-              <a:rPr lang="en-US" altLang="zh-CN" dirty="0">
-                <a:latin typeface="Times New Roman" panose="02020603050405020304" pitchFamily="18" charset="0"/>
-                <a:cs typeface="Times New Roman" panose="02020603050405020304" pitchFamily="18" charset="0"/>
-              </a:rPr>
-              <a:t>1</a:t>
-            </a:r>
-            <a:r>
-              <a:rPr lang="zh-CN" altLang="en-US" dirty="0">
-                <a:latin typeface="Times New Roman" panose="02020603050405020304" pitchFamily="18" charset="0"/>
-                <a:cs typeface="Times New Roman" panose="02020603050405020304" pitchFamily="18" charset="0"/>
-              </a:rPr>
-              <a:t>] </a:t>
-            </a:r>
-            <a:r>
-              <a:rPr lang="zh-CN" altLang="en-US" dirty="0"/>
-              <a:t>为例。</a:t>
-            </a:r>
-            <a:endParaRPr lang="en-US" altLang="zh-CN" dirty="0"/>
-          </a:p>
-        </p:txBody>
-      </p:sp>
-      <p:sp>
-        <p:nvSpPr>
-          <p:cNvPr id="22" name="下箭头 21">
-            <a:extLst>
-              <a:ext uri="{FF2B5EF4-FFF2-40B4-BE49-F238E27FC236}">
-                <a16:creationId xmlns:a16="http://schemas.microsoft.com/office/drawing/2014/main" id="{E051E7AC-06E8-DE4E-BB6C-9583836310EA}"/>
-              </a:ext>
-            </a:extLst>
-          </p:cNvPr>
-          <p:cNvSpPr/>
-          <p:nvPr/>
-        </p:nvSpPr>
-        <p:spPr>
-          <a:xfrm>
-            <a:off x="5696511" y="2750545"/>
-            <a:ext cx="245470" cy="380245"/>
+            <a:off x="5174028" y="2318940"/>
+            <a:ext cx="1086096" cy="481742"/>
           </a:xfrm>
           <a:prstGeom prst="downArrow">
             <a:avLst/>
@@ -2794,6 +2729,129 @@
           <a:p>
             <a:pPr algn="ctr"/>
             <a:endParaRPr kumimoji="1" lang="zh-CN" altLang="en-US"/>
+          </a:p>
+        </p:txBody>
+      </p:sp>
+      <p:sp>
+        <p:nvSpPr>
+          <p:cNvPr id="13" name="矩形 12">
+            <a:extLst>
+              <a:ext uri="{FF2B5EF4-FFF2-40B4-BE49-F238E27FC236}">
+                <a16:creationId xmlns:a16="http://schemas.microsoft.com/office/drawing/2014/main" id="{DB9E6855-C336-5842-85A9-9AAFB21C393A}"/>
+              </a:ext>
+            </a:extLst>
+          </p:cNvPr>
+          <p:cNvSpPr/>
+          <p:nvPr/>
+        </p:nvSpPr>
+        <p:spPr>
+          <a:xfrm>
+            <a:off x="753897" y="1297746"/>
+            <a:ext cx="4578497" cy="461665"/>
+          </a:xfrm>
+          <a:prstGeom prst="rect">
+            <a:avLst/>
+          </a:prstGeom>
+        </p:spPr>
+        <p:txBody>
+          <a:bodyPr wrap="none">
+            <a:spAutoFit/>
+          </a:bodyPr>
+          <a:lstStyle/>
+          <a:p>
+            <a:r>
+              <a:rPr lang="zh-CN" altLang="en-US" sz="2400" dirty="0">
+                <a:latin typeface="Times New Roman" panose="02020603050405020304" pitchFamily="18" charset="0"/>
+                <a:ea typeface="KaiTi_GB2312" panose="02010609030101010101" pitchFamily="49" charset="-122"/>
+                <a:cs typeface="Times New Roman" panose="02020603050405020304" pitchFamily="18" charset="0"/>
+              </a:rPr>
+              <a:t>以示例 </a:t>
+            </a:r>
+            <a:r>
+              <a:rPr lang="en-US" altLang="zh-CN" sz="2400" dirty="0">
+                <a:latin typeface="Times New Roman" panose="02020603050405020304" pitchFamily="18" charset="0"/>
+                <a:ea typeface="KaiTi_GB2312" panose="02010609030101010101" pitchFamily="49" charset="-122"/>
+                <a:cs typeface="Times New Roman" panose="02020603050405020304" pitchFamily="18" charset="0"/>
+              </a:rPr>
+              <a:t>2</a:t>
+            </a:r>
+            <a:r>
+              <a:rPr lang="zh-CN" altLang="en-US" sz="2400" dirty="0">
+                <a:latin typeface="Times New Roman" panose="02020603050405020304" pitchFamily="18" charset="0"/>
+                <a:ea typeface="KaiTi_GB2312" panose="02010609030101010101" pitchFamily="49" charset="-122"/>
+                <a:cs typeface="Times New Roman" panose="02020603050405020304" pitchFamily="18" charset="0"/>
+              </a:rPr>
+              <a:t> 输入: [</a:t>
+            </a:r>
+            <a:r>
+              <a:rPr lang="en-US" altLang="zh-CN" sz="2400" dirty="0">
+                <a:latin typeface="Times New Roman" panose="02020603050405020304" pitchFamily="18" charset="0"/>
+                <a:ea typeface="KaiTi_GB2312" panose="02010609030101010101" pitchFamily="49" charset="-122"/>
+                <a:cs typeface="Times New Roman" panose="02020603050405020304" pitchFamily="18" charset="0"/>
+              </a:rPr>
+              <a:t>3</a:t>
+            </a:r>
+            <a:r>
+              <a:rPr lang="zh-CN" altLang="en-US" sz="2400" dirty="0">
+                <a:latin typeface="Times New Roman" panose="02020603050405020304" pitchFamily="18" charset="0"/>
+                <a:ea typeface="KaiTi_GB2312" panose="02010609030101010101" pitchFamily="49" charset="-122"/>
+                <a:cs typeface="Times New Roman" panose="02020603050405020304" pitchFamily="18" charset="0"/>
+              </a:rPr>
+              <a:t>, </a:t>
+            </a:r>
+            <a:r>
+              <a:rPr lang="en-US" altLang="zh-CN" sz="2400" dirty="0">
+                <a:latin typeface="Times New Roman" panose="02020603050405020304" pitchFamily="18" charset="0"/>
+                <a:ea typeface="KaiTi_GB2312" panose="02010609030101010101" pitchFamily="49" charset="-122"/>
+                <a:cs typeface="Times New Roman" panose="02020603050405020304" pitchFamily="18" charset="0"/>
+              </a:rPr>
+              <a:t>4</a:t>
+            </a:r>
+            <a:r>
+              <a:rPr lang="zh-CN" altLang="en-US" sz="2400" dirty="0">
+                <a:latin typeface="Times New Roman" panose="02020603050405020304" pitchFamily="18" charset="0"/>
+                <a:ea typeface="KaiTi_GB2312" panose="02010609030101010101" pitchFamily="49" charset="-122"/>
+                <a:cs typeface="Times New Roman" panose="02020603050405020304" pitchFamily="18" charset="0"/>
+              </a:rPr>
+              <a:t>, </a:t>
+            </a:r>
+            <a:r>
+              <a:rPr lang="en-US" altLang="zh-CN" sz="2400" dirty="0">
+                <a:latin typeface="Times New Roman" panose="02020603050405020304" pitchFamily="18" charset="0"/>
+                <a:ea typeface="KaiTi_GB2312" panose="02010609030101010101" pitchFamily="49" charset="-122"/>
+                <a:cs typeface="Times New Roman" panose="02020603050405020304" pitchFamily="18" charset="0"/>
+              </a:rPr>
+              <a:t>-1</a:t>
+            </a:r>
+            <a:r>
+              <a:rPr lang="zh-CN" altLang="en-US" sz="2400" dirty="0">
+                <a:latin typeface="Times New Roman" panose="02020603050405020304" pitchFamily="18" charset="0"/>
+                <a:ea typeface="KaiTi_GB2312" panose="02010609030101010101" pitchFamily="49" charset="-122"/>
+                <a:cs typeface="Times New Roman" panose="02020603050405020304" pitchFamily="18" charset="0"/>
+              </a:rPr>
+              <a:t>, </a:t>
+            </a:r>
+            <a:r>
+              <a:rPr lang="en-US" altLang="zh-CN" sz="2400" dirty="0">
+                <a:latin typeface="Times New Roman" panose="02020603050405020304" pitchFamily="18" charset="0"/>
+                <a:ea typeface="KaiTi_GB2312" panose="02010609030101010101" pitchFamily="49" charset="-122"/>
+                <a:cs typeface="Times New Roman" panose="02020603050405020304" pitchFamily="18" charset="0"/>
+              </a:rPr>
+              <a:t>1</a:t>
+            </a:r>
+            <a:r>
+              <a:rPr lang="zh-CN" altLang="en-US" sz="2400" dirty="0">
+                <a:latin typeface="Times New Roman" panose="02020603050405020304" pitchFamily="18" charset="0"/>
+                <a:ea typeface="KaiTi_GB2312" panose="02010609030101010101" pitchFamily="49" charset="-122"/>
+                <a:cs typeface="Times New Roman" panose="02020603050405020304" pitchFamily="18" charset="0"/>
+              </a:rPr>
+              <a:t>] 为例。</a:t>
+            </a:r>
+            <a:endParaRPr lang="en-US" altLang="zh-CN" sz="2400" dirty="0">
+              <a:latin typeface="Times New Roman" panose="02020603050405020304" pitchFamily="18" charset="0"/>
+              <a:ea typeface="KaiTi_GB2312" panose="02010609030101010101" pitchFamily="49" charset="-122"/>
+              <a:cs typeface="Times New Roman" panose="02020603050405020304" pitchFamily="18" charset="0"/>
+            </a:endParaRPr>
           </a:p>
         </p:txBody>
       </p:sp>
@@ -2849,8 +2907,8 @@
         </p:blipFill>
         <p:spPr>
           <a:xfrm>
-            <a:off x="4034008" y="3337766"/>
-            <a:ext cx="4775846" cy="1640558"/>
+            <a:off x="2880000" y="2880000"/>
+            <a:ext cx="7335999" cy="2520000"/>
           </a:xfrm>
           <a:prstGeom prst="rect">
             <a:avLst/>
@@ -2967,8 +3025,8 @@
         </p:nvSpPr>
         <p:spPr>
           <a:xfrm>
-            <a:off x="4034008" y="4997786"/>
-            <a:ext cx="6019535" cy="923330"/>
+            <a:off x="87985" y="5468332"/>
+            <a:ext cx="12104015" cy="830997"/>
           </a:xfrm>
           <a:prstGeom prst="rect">
             <a:avLst/>
@@ -2980,139 +3038,133 @@
           </a:bodyPr>
           <a:lstStyle/>
           <a:p>
-            <a:r>
-              <a:rPr kumimoji="1" lang="en-US" altLang="zh-CN" dirty="0">
-                <a:latin typeface="Times New Roman" charset="0"/>
-                <a:ea typeface="楷体_GB2312" panose="02010609030101010101" pitchFamily="49" charset="-122"/>
-              </a:rPr>
-              <a:t>1</a:t>
-            </a:r>
-            <a:r>
-              <a:rPr kumimoji="1" lang="zh-CN" altLang="en-US" dirty="0">
-                <a:latin typeface="Times New Roman" charset="0"/>
-                <a:ea typeface="楷体_GB2312" panose="02010609030101010101" pitchFamily="49" charset="-122"/>
-              </a:rPr>
-              <a:t>、索引 </a:t>
-            </a:r>
-            <a:r>
-              <a:rPr kumimoji="1" lang="en-US" altLang="zh-CN" dirty="0">
+            <a:pPr marL="342900" indent="-342900">
+              <a:buFont typeface="Wingdings" pitchFamily="2" charset="2"/>
+              <a:buChar char="l"/>
+            </a:pPr>
+            <a:r>
+              <a:rPr kumimoji="1" lang="zh-CN" altLang="en-US" sz="2400" dirty="0">
+                <a:latin typeface="Times New Roman" charset="0"/>
+                <a:ea typeface="楷体_GB2312" panose="02010609030101010101" pitchFamily="49" charset="-122"/>
+              </a:rPr>
+              <a:t>索引 </a:t>
+            </a:r>
+            <a:r>
+              <a:rPr kumimoji="1" lang="en-US" altLang="zh-CN" sz="2400" dirty="0">
                 <a:latin typeface="Times New Roman" charset="0"/>
                 <a:ea typeface="楷体_GB2312" panose="02010609030101010101" pitchFamily="49" charset="-122"/>
               </a:rPr>
               <a:t>3</a:t>
             </a:r>
             <a:r>
-              <a:rPr kumimoji="1" lang="zh-CN" altLang="en-US" dirty="0">
+              <a:rPr kumimoji="1" lang="zh-CN" altLang="en-US" sz="2400" dirty="0">
                 <a:latin typeface="Times New Roman" charset="0"/>
                 <a:ea typeface="楷体_GB2312" panose="02010609030101010101" pitchFamily="49" charset="-122"/>
               </a:rPr>
               <a:t> 上现在放置的数字 </a:t>
             </a:r>
             <a:r>
-              <a:rPr kumimoji="1" lang="en-US" altLang="zh-CN" dirty="0">
+              <a:rPr kumimoji="1" lang="en-US" altLang="zh-CN" sz="2400" dirty="0">
                 <a:latin typeface="Times New Roman" charset="0"/>
                 <a:ea typeface="楷体_GB2312" panose="02010609030101010101" pitchFamily="49" charset="-122"/>
               </a:rPr>
               <a:t>4</a:t>
             </a:r>
             <a:r>
-              <a:rPr kumimoji="1" lang="zh-CN" altLang="en-US" dirty="0">
+              <a:rPr kumimoji="1" lang="zh-CN" altLang="en-US" sz="2400" dirty="0">
                 <a:latin typeface="Times New Roman" charset="0"/>
                 <a:ea typeface="楷体_GB2312" panose="02010609030101010101" pitchFamily="49" charset="-122"/>
               </a:rPr>
               <a:t> 放对了，我们把它标红；</a:t>
             </a:r>
-            <a:endParaRPr kumimoji="1" lang="en-US" altLang="zh-CN" dirty="0">
+            <a:endParaRPr kumimoji="1" lang="en-US" altLang="zh-CN" sz="2400" dirty="0">
               <a:latin typeface="Times New Roman" charset="0"/>
               <a:ea typeface="楷体_GB2312" panose="02010609030101010101" pitchFamily="49" charset="-122"/>
             </a:endParaRPr>
           </a:p>
           <a:p>
-            <a:r>
-              <a:rPr kumimoji="1" lang="en-US" altLang="zh-CN" dirty="0">
-                <a:latin typeface="Times New Roman" charset="0"/>
-                <a:ea typeface="楷体_GB2312" panose="02010609030101010101" pitchFamily="49" charset="-122"/>
-              </a:rPr>
-              <a:t>2</a:t>
-            </a:r>
-            <a:r>
-              <a:rPr kumimoji="1" lang="zh-CN" altLang="en-US" dirty="0">
-                <a:latin typeface="Times New Roman" charset="0"/>
-                <a:ea typeface="楷体_GB2312" panose="02010609030101010101" pitchFamily="49" charset="-122"/>
-              </a:rPr>
-              <a:t>、索引 </a:t>
-            </a:r>
-            <a:r>
-              <a:rPr kumimoji="1" lang="en-US" altLang="zh-CN" dirty="0">
+            <a:pPr marL="342900" indent="-342900">
+              <a:buFont typeface="Wingdings" pitchFamily="2" charset="2"/>
+              <a:buChar char="l"/>
+            </a:pPr>
+            <a:r>
+              <a:rPr kumimoji="1" lang="zh-CN" altLang="en-US" sz="2400" dirty="0">
+                <a:latin typeface="Times New Roman" charset="0"/>
+                <a:ea typeface="楷体_GB2312" panose="02010609030101010101" pitchFamily="49" charset="-122"/>
+              </a:rPr>
+              <a:t>索引 </a:t>
+            </a:r>
+            <a:r>
+              <a:rPr kumimoji="1" lang="en-US" altLang="zh-CN" sz="2400" dirty="0">
                 <a:latin typeface="Times New Roman" charset="0"/>
                 <a:ea typeface="楷体_GB2312" panose="02010609030101010101" pitchFamily="49" charset="-122"/>
               </a:rPr>
               <a:t>1</a:t>
             </a:r>
             <a:r>
-              <a:rPr kumimoji="1" lang="zh-CN" altLang="en-US" dirty="0">
+              <a:rPr kumimoji="1" lang="zh-CN" altLang="en-US" sz="2400" dirty="0">
                 <a:latin typeface="Times New Roman" charset="0"/>
                 <a:ea typeface="楷体_GB2312" panose="02010609030101010101" pitchFamily="49" charset="-122"/>
               </a:rPr>
               <a:t> 上现在放置的是数字 </a:t>
             </a:r>
             <a:r>
-              <a:rPr kumimoji="1" lang="en-US" altLang="zh-CN" dirty="0">
+              <a:rPr kumimoji="1" lang="en-US" altLang="zh-CN" sz="2400" dirty="0">
                 <a:latin typeface="Times New Roman" charset="0"/>
                 <a:ea typeface="楷体_GB2312" panose="02010609030101010101" pitchFamily="49" charset="-122"/>
               </a:rPr>
               <a:t>1</a:t>
             </a:r>
             <a:r>
-              <a:rPr kumimoji="1" lang="zh-CN" altLang="en-US" dirty="0">
+              <a:rPr kumimoji="1" lang="zh-CN" altLang="en-US" sz="2400" dirty="0">
                 <a:latin typeface="Times New Roman" charset="0"/>
                 <a:ea typeface="楷体_GB2312" panose="02010609030101010101" pitchFamily="49" charset="-122"/>
               </a:rPr>
               <a:t> ，它应该被放在索引 </a:t>
             </a:r>
             <a:r>
-              <a:rPr kumimoji="1" lang="en-US" altLang="zh-CN" dirty="0">
+              <a:rPr kumimoji="1" lang="en-US" altLang="zh-CN" sz="2400" dirty="0">
                 <a:latin typeface="Times New Roman" charset="0"/>
                 <a:ea typeface="楷体_GB2312" panose="02010609030101010101" pitchFamily="49" charset="-122"/>
               </a:rPr>
               <a:t>0</a:t>
             </a:r>
             <a:r>
-              <a:rPr kumimoji="1" lang="zh-CN" altLang="en-US" dirty="0">
+              <a:rPr kumimoji="1" lang="zh-CN" altLang="en-US" sz="2400" dirty="0">
                 <a:latin typeface="Times New Roman" charset="0"/>
                 <a:ea typeface="楷体_GB2312" panose="02010609030101010101" pitchFamily="49" charset="-122"/>
               </a:rPr>
               <a:t> 处，因此将索引 </a:t>
             </a:r>
             <a:r>
-              <a:rPr kumimoji="1" lang="en-US" altLang="zh-CN" dirty="0">
+              <a:rPr kumimoji="1" lang="en-US" altLang="zh-CN" sz="2400" dirty="0">
                 <a:latin typeface="Times New Roman" charset="0"/>
                 <a:ea typeface="楷体_GB2312" panose="02010609030101010101" pitchFamily="49" charset="-122"/>
               </a:rPr>
               <a:t>0</a:t>
             </a:r>
             <a:r>
-              <a:rPr kumimoji="1" lang="zh-CN" altLang="en-US" dirty="0">
+              <a:rPr kumimoji="1" lang="zh-CN" altLang="en-US" sz="2400" dirty="0">
                 <a:latin typeface="Times New Roman" charset="0"/>
                 <a:ea typeface="楷体_GB2312" panose="02010609030101010101" pitchFamily="49" charset="-122"/>
               </a:rPr>
               <a:t> 与索引 </a:t>
             </a:r>
             <a:r>
-              <a:rPr kumimoji="1" lang="en-US" altLang="zh-CN" dirty="0">
+              <a:rPr kumimoji="1" lang="en-US" altLang="zh-CN" sz="2400" dirty="0">
                 <a:latin typeface="Times New Roman" charset="0"/>
                 <a:ea typeface="楷体_GB2312" panose="02010609030101010101" pitchFamily="49" charset="-122"/>
               </a:rPr>
               <a:t>1</a:t>
             </a:r>
             <a:r>
-              <a:rPr kumimoji="1" lang="zh-CN" altLang="en-US" dirty="0">
+              <a:rPr kumimoji="1" lang="zh-CN" altLang="en-US" sz="2400" dirty="0">
                 <a:latin typeface="Times New Roman" charset="0"/>
                 <a:ea typeface="楷体_GB2312" panose="02010609030101010101" pitchFamily="49" charset="-122"/>
               </a:rPr>
               <a:t> 交换。</a:t>
             </a:r>
-            <a:endParaRPr kumimoji="1" lang="en-US" altLang="zh-CN" dirty="0">
+            <a:endParaRPr kumimoji="1" lang="en-US" altLang="zh-CN" sz="2400" dirty="0">
               <a:latin typeface="Times New Roman" charset="0"/>
               <a:ea typeface="楷体_GB2312" panose="02010609030101010101" pitchFamily="49" charset="-122"/>
             </a:endParaRPr>
@@ -3121,10 +3173,10 @@
       </p:sp>
       <p:sp>
         <p:nvSpPr>
-          <p:cNvPr id="12" name="文本框 11">
+          <p:cNvPr id="9" name="文本框 8">
             <a:extLst>
               <a:ext uri="{FF2B5EF4-FFF2-40B4-BE49-F238E27FC236}">
-                <a16:creationId xmlns:a16="http://schemas.microsoft.com/office/drawing/2014/main" id="{D3D2DFAF-2521-5B47-8B4B-9D11CBBB56A8}"/>
+                <a16:creationId xmlns:a16="http://schemas.microsoft.com/office/drawing/2014/main" id="{4BBDB06E-46B9-B649-B094-D87894E3317A}"/>
               </a:ext>
             </a:extLst>
           </p:cNvPr>
@@ -3133,8 +3185,8 @@
         </p:nvSpPr>
         <p:spPr>
           <a:xfrm flipH="1">
-            <a:off x="804680" y="873508"/>
-            <a:ext cx="5011657" cy="461665"/>
+            <a:off x="804679" y="781316"/>
+            <a:ext cx="8474450" cy="461665"/>
           </a:xfrm>
           <a:prstGeom prst="rect">
             <a:avLst/>
@@ -3172,17 +3224,17 @@
                 <a:ea typeface="KaiTi_GB2312" panose="02010609030101010101" pitchFamily="49" charset="-122"/>
                 <a:cs typeface="Times New Roman" panose="02020603050405020304" pitchFamily="18" charset="0"/>
               </a:rPr>
-              <a:t>思想：桶排序，一个萝卜一个坑。</a:t>
+              <a:t>思想：桶排序（一个萝卜一个坑）、抽屉原理、鸽巢原理。</a:t>
             </a:r>
           </a:p>
         </p:txBody>
       </p:sp>
       <p:sp>
         <p:nvSpPr>
-          <p:cNvPr id="13" name="矩形 12">
+          <p:cNvPr id="11" name="下箭头 10">
             <a:extLst>
               <a:ext uri="{FF2B5EF4-FFF2-40B4-BE49-F238E27FC236}">
-                <a16:creationId xmlns:a16="http://schemas.microsoft.com/office/drawing/2014/main" id="{CEFED7D6-B5EA-7241-A408-837D3F4B7098}"/>
+                <a16:creationId xmlns:a16="http://schemas.microsoft.com/office/drawing/2014/main" id="{32949AD7-4FD4-674A-AA8E-2239356A5D18}"/>
               </a:ext>
             </a:extLst>
           </p:cNvPr>
@@ -3191,172 +3243,8 @@
         </p:nvSpPr>
         <p:spPr>
           <a:xfrm>
-            <a:off x="729875" y="1536242"/>
-            <a:ext cx="3490058" cy="369332"/>
-          </a:xfrm>
-          <a:prstGeom prst="rect">
-            <a:avLst/>
-          </a:prstGeom>
-        </p:spPr>
-        <p:txBody>
-          <a:bodyPr wrap="none">
-            <a:spAutoFit/>
-          </a:bodyPr>
-          <a:lstStyle/>
-          <a:p>
-            <a:r>
-              <a:rPr lang="zh-CN" altLang="en-US" dirty="0"/>
-              <a:t>以示例 </a:t>
-            </a:r>
-            <a:r>
-              <a:rPr lang="en-US" altLang="zh-CN" dirty="0">
-                <a:latin typeface="Times New Roman" panose="02020603050405020304" pitchFamily="18" charset="0"/>
-                <a:cs typeface="Times New Roman" panose="02020603050405020304" pitchFamily="18" charset="0"/>
-              </a:rPr>
-              <a:t>2</a:t>
-            </a:r>
-            <a:r>
-              <a:rPr lang="zh-CN" altLang="en-US" dirty="0"/>
-              <a:t> 输入</a:t>
-            </a:r>
-            <a:r>
-              <a:rPr lang="zh-CN" altLang="en-US" dirty="0">
-                <a:latin typeface="Times New Roman" panose="02020603050405020304" pitchFamily="18" charset="0"/>
-                <a:cs typeface="Times New Roman" panose="02020603050405020304" pitchFamily="18" charset="0"/>
-              </a:rPr>
-              <a:t>: [</a:t>
-            </a:r>
-            <a:r>
-              <a:rPr lang="en-US" altLang="zh-CN" dirty="0">
-                <a:latin typeface="Times New Roman" panose="02020603050405020304" pitchFamily="18" charset="0"/>
-                <a:cs typeface="Times New Roman" panose="02020603050405020304" pitchFamily="18" charset="0"/>
-              </a:rPr>
-              <a:t>3</a:t>
-            </a:r>
-            <a:r>
-              <a:rPr lang="zh-CN" altLang="en-US" dirty="0">
-                <a:latin typeface="Times New Roman" panose="02020603050405020304" pitchFamily="18" charset="0"/>
-                <a:cs typeface="Times New Roman" panose="02020603050405020304" pitchFamily="18" charset="0"/>
-              </a:rPr>
-              <a:t>, </a:t>
-            </a:r>
-            <a:r>
-              <a:rPr lang="en-US" altLang="zh-CN" dirty="0">
-                <a:latin typeface="Times New Roman" panose="02020603050405020304" pitchFamily="18" charset="0"/>
-                <a:cs typeface="Times New Roman" panose="02020603050405020304" pitchFamily="18" charset="0"/>
-              </a:rPr>
-              <a:t>4</a:t>
-            </a:r>
-            <a:r>
-              <a:rPr lang="zh-CN" altLang="en-US" dirty="0">
-                <a:latin typeface="Times New Roman" panose="02020603050405020304" pitchFamily="18" charset="0"/>
-                <a:cs typeface="Times New Roman" panose="02020603050405020304" pitchFamily="18" charset="0"/>
-              </a:rPr>
-              <a:t>, </a:t>
-            </a:r>
-            <a:r>
-              <a:rPr lang="en-US" altLang="zh-CN" dirty="0">
-                <a:latin typeface="Times New Roman" panose="02020603050405020304" pitchFamily="18" charset="0"/>
-                <a:cs typeface="Times New Roman" panose="02020603050405020304" pitchFamily="18" charset="0"/>
-              </a:rPr>
-              <a:t>-1</a:t>
-            </a:r>
-            <a:r>
-              <a:rPr lang="zh-CN" altLang="en-US" dirty="0">
-                <a:latin typeface="Times New Roman" panose="02020603050405020304" pitchFamily="18" charset="0"/>
-                <a:cs typeface="Times New Roman" panose="02020603050405020304" pitchFamily="18" charset="0"/>
-              </a:rPr>
-              <a:t>, </a:t>
-            </a:r>
-            <a:r>
-              <a:rPr lang="en-US" altLang="zh-CN" dirty="0">
-                <a:latin typeface="Times New Roman" panose="02020603050405020304" pitchFamily="18" charset="0"/>
-                <a:cs typeface="Times New Roman" panose="02020603050405020304" pitchFamily="18" charset="0"/>
-              </a:rPr>
-              <a:t>1</a:t>
-            </a:r>
-            <a:r>
-              <a:rPr lang="zh-CN" altLang="en-US" dirty="0">
-                <a:latin typeface="Times New Roman" panose="02020603050405020304" pitchFamily="18" charset="0"/>
-                <a:cs typeface="Times New Roman" panose="02020603050405020304" pitchFamily="18" charset="0"/>
-              </a:rPr>
-              <a:t>] </a:t>
-            </a:r>
-            <a:r>
-              <a:rPr lang="zh-CN" altLang="en-US" dirty="0"/>
-              <a:t>为例。</a:t>
-            </a:r>
-            <a:endParaRPr lang="en-US" altLang="zh-CN" dirty="0"/>
-          </a:p>
-        </p:txBody>
-      </p:sp>
-      <p:sp>
-        <p:nvSpPr>
-          <p:cNvPr id="15" name="矩形 14">
-            <a:extLst>
-              <a:ext uri="{FF2B5EF4-FFF2-40B4-BE49-F238E27FC236}">
-                <a16:creationId xmlns:a16="http://schemas.microsoft.com/office/drawing/2014/main" id="{0C9C5BA5-93FA-2F40-9ACA-4762D72BCA17}"/>
-              </a:ext>
-            </a:extLst>
-          </p:cNvPr>
-          <p:cNvSpPr/>
-          <p:nvPr/>
-        </p:nvSpPr>
-        <p:spPr>
-          <a:xfrm>
-            <a:off x="5134333" y="2286135"/>
-            <a:ext cx="5303631" cy="369332"/>
-          </a:xfrm>
-          <a:prstGeom prst="rect">
-            <a:avLst/>
-          </a:prstGeom>
-        </p:spPr>
-        <p:txBody>
-          <a:bodyPr wrap="square">
-            <a:spAutoFit/>
-          </a:bodyPr>
-          <a:lstStyle/>
-          <a:p>
-            <a:r>
-              <a:rPr kumimoji="1" lang="zh-CN" altLang="en-US" dirty="0">
-                <a:latin typeface="Times New Roman" charset="0"/>
-                <a:ea typeface="楷体_GB2312" panose="02010609030101010101" pitchFamily="49" charset="-122"/>
-              </a:rPr>
-              <a:t>接下来还看索引 </a:t>
-            </a:r>
-            <a:r>
-              <a:rPr kumimoji="1" lang="en-US" altLang="zh-CN" dirty="0">
-                <a:latin typeface="Times New Roman" charset="0"/>
-                <a:ea typeface="楷体_GB2312" panose="02010609030101010101" pitchFamily="49" charset="-122"/>
-              </a:rPr>
-              <a:t>1</a:t>
-            </a:r>
-            <a:r>
-              <a:rPr kumimoji="1" lang="zh-CN" altLang="en-US" dirty="0">
-                <a:latin typeface="Times New Roman" charset="0"/>
-                <a:ea typeface="楷体_GB2312" panose="02010609030101010101" pitchFamily="49" charset="-122"/>
-              </a:rPr>
-              <a:t> 上的数字。</a:t>
-            </a:r>
-          </a:p>
-        </p:txBody>
-      </p:sp>
-      <p:sp>
-        <p:nvSpPr>
-          <p:cNvPr id="16" name="下箭头 15">
-            <a:extLst>
-              <a:ext uri="{FF2B5EF4-FFF2-40B4-BE49-F238E27FC236}">
-                <a16:creationId xmlns:a16="http://schemas.microsoft.com/office/drawing/2014/main" id="{E813EFD3-4163-4042-A2EF-568A7FACE05A}"/>
-              </a:ext>
-            </a:extLst>
-          </p:cNvPr>
-          <p:cNvSpPr/>
-          <p:nvPr/>
-        </p:nvSpPr>
-        <p:spPr>
-          <a:xfrm>
-            <a:off x="5731680" y="2750545"/>
-            <a:ext cx="245470" cy="380245"/>
+            <a:off x="5174028" y="2318940"/>
+            <a:ext cx="1086096" cy="481742"/>
           </a:xfrm>
           <a:prstGeom prst="downArrow">
             <a:avLst/>
@@ -3390,6 +3278,180 @@
           <a:p>
             <a:pPr algn="ctr"/>
             <a:endParaRPr kumimoji="1" lang="zh-CN" altLang="en-US"/>
+          </a:p>
+        </p:txBody>
+      </p:sp>
+      <p:sp>
+        <p:nvSpPr>
+          <p:cNvPr id="14" name="矩形 13">
+            <a:extLst>
+              <a:ext uri="{FF2B5EF4-FFF2-40B4-BE49-F238E27FC236}">
+                <a16:creationId xmlns:a16="http://schemas.microsoft.com/office/drawing/2014/main" id="{58AA3D83-FCCA-CE4D-AAE5-9966BAD43F64}"/>
+              </a:ext>
+            </a:extLst>
+          </p:cNvPr>
+          <p:cNvSpPr/>
+          <p:nvPr/>
+        </p:nvSpPr>
+        <p:spPr>
+          <a:xfrm>
+            <a:off x="5041904" y="1776127"/>
+            <a:ext cx="5303631" cy="400110"/>
+          </a:xfrm>
+          <a:prstGeom prst="rect">
+            <a:avLst/>
+          </a:prstGeom>
+        </p:spPr>
+        <p:txBody>
+          <a:bodyPr wrap="square">
+            <a:spAutoFit/>
+          </a:bodyPr>
+          <a:lstStyle/>
+          <a:p>
+            <a:r>
+              <a:rPr kumimoji="1" lang="zh-CN" altLang="en-US" sz="2000" dirty="0">
+                <a:latin typeface="Times New Roman" charset="0"/>
+                <a:ea typeface="楷体_GB2312" panose="02010609030101010101" pitchFamily="49" charset="-122"/>
+              </a:rPr>
+              <a:t>接下来还看索引 </a:t>
+            </a:r>
+            <a:r>
+              <a:rPr kumimoji="1" lang="en-US" altLang="zh-CN" sz="2000" dirty="0">
+                <a:latin typeface="Times New Roman" charset="0"/>
+                <a:ea typeface="楷体_GB2312" panose="02010609030101010101" pitchFamily="49" charset="-122"/>
+              </a:rPr>
+              <a:t>1</a:t>
+            </a:r>
+            <a:r>
+              <a:rPr kumimoji="1" lang="zh-CN" altLang="en-US" sz="2000" dirty="0">
+                <a:latin typeface="Times New Roman" charset="0"/>
+                <a:ea typeface="楷体_GB2312" panose="02010609030101010101" pitchFamily="49" charset="-122"/>
+              </a:rPr>
+              <a:t> 上的数字。</a:t>
+            </a:r>
+          </a:p>
+        </p:txBody>
+      </p:sp>
+      <p:sp>
+        <p:nvSpPr>
+          <p:cNvPr id="12" name="矩形 11">
+            <a:extLst>
+              <a:ext uri="{FF2B5EF4-FFF2-40B4-BE49-F238E27FC236}">
+                <a16:creationId xmlns:a16="http://schemas.microsoft.com/office/drawing/2014/main" id="{2F915677-F602-204F-A786-0BE43E88F48F}"/>
+              </a:ext>
+            </a:extLst>
+          </p:cNvPr>
+          <p:cNvSpPr/>
+          <p:nvPr/>
+        </p:nvSpPr>
+        <p:spPr>
+          <a:xfrm>
+            <a:off x="753897" y="1297746"/>
+            <a:ext cx="4578497" cy="461665"/>
+          </a:xfrm>
+          <a:prstGeom prst="rect">
+            <a:avLst/>
+          </a:prstGeom>
+        </p:spPr>
+        <p:txBody>
+          <a:bodyPr wrap="none">
+            <a:spAutoFit/>
+          </a:bodyPr>
+          <a:lstStyle/>
+          <a:p>
+            <a:r>
+              <a:rPr lang="zh-CN" altLang="en-US" sz="2400" dirty="0">
+                <a:latin typeface="Times New Roman" panose="02020603050405020304" pitchFamily="18" charset="0"/>
+                <a:ea typeface="KaiTi_GB2312" panose="02010609030101010101" pitchFamily="49" charset="-122"/>
+                <a:cs typeface="Times New Roman" panose="02020603050405020304" pitchFamily="18" charset="0"/>
+              </a:rPr>
+              <a:t>以示例 </a:t>
+            </a:r>
+            <a:r>
+              <a:rPr lang="en-US" altLang="zh-CN" sz="2400" dirty="0">
+                <a:latin typeface="Times New Roman" panose="02020603050405020304" pitchFamily="18" charset="0"/>
+                <a:ea typeface="KaiTi_GB2312" panose="02010609030101010101" pitchFamily="49" charset="-122"/>
+                <a:cs typeface="Times New Roman" panose="02020603050405020304" pitchFamily="18" charset="0"/>
+              </a:rPr>
+              <a:t>2</a:t>
+            </a:r>
+            <a:r>
+              <a:rPr lang="zh-CN" altLang="en-US" sz="2400" dirty="0">
+                <a:latin typeface="Times New Roman" panose="02020603050405020304" pitchFamily="18" charset="0"/>
+                <a:ea typeface="KaiTi_GB2312" panose="02010609030101010101" pitchFamily="49" charset="-122"/>
+                <a:cs typeface="Times New Roman" panose="02020603050405020304" pitchFamily="18" charset="0"/>
+              </a:rPr>
+              <a:t> 输入: [</a:t>
+            </a:r>
+            <a:r>
+              <a:rPr lang="en-US" altLang="zh-CN" sz="2400" dirty="0">
+                <a:latin typeface="Times New Roman" panose="02020603050405020304" pitchFamily="18" charset="0"/>
+                <a:ea typeface="KaiTi_GB2312" panose="02010609030101010101" pitchFamily="49" charset="-122"/>
+                <a:cs typeface="Times New Roman" panose="02020603050405020304" pitchFamily="18" charset="0"/>
+              </a:rPr>
+              <a:t>3</a:t>
+            </a:r>
+            <a:r>
+              <a:rPr lang="zh-CN" altLang="en-US" sz="2400" dirty="0">
+                <a:latin typeface="Times New Roman" panose="02020603050405020304" pitchFamily="18" charset="0"/>
+                <a:ea typeface="KaiTi_GB2312" panose="02010609030101010101" pitchFamily="49" charset="-122"/>
+                <a:cs typeface="Times New Roman" panose="02020603050405020304" pitchFamily="18" charset="0"/>
+              </a:rPr>
+              <a:t>, </a:t>
+            </a:r>
+            <a:r>
+              <a:rPr lang="en-US" altLang="zh-CN" sz="2400" dirty="0">
+                <a:latin typeface="Times New Roman" panose="02020603050405020304" pitchFamily="18" charset="0"/>
+                <a:ea typeface="KaiTi_GB2312" panose="02010609030101010101" pitchFamily="49" charset="-122"/>
+                <a:cs typeface="Times New Roman" panose="02020603050405020304" pitchFamily="18" charset="0"/>
+              </a:rPr>
+              <a:t>4</a:t>
+            </a:r>
+            <a:r>
+              <a:rPr lang="zh-CN" altLang="en-US" sz="2400" dirty="0">
+                <a:latin typeface="Times New Roman" panose="02020603050405020304" pitchFamily="18" charset="0"/>
+                <a:ea typeface="KaiTi_GB2312" panose="02010609030101010101" pitchFamily="49" charset="-122"/>
+                <a:cs typeface="Times New Roman" panose="02020603050405020304" pitchFamily="18" charset="0"/>
+              </a:rPr>
+              <a:t>, </a:t>
+            </a:r>
+            <a:r>
+              <a:rPr lang="en-US" altLang="zh-CN" sz="2400" dirty="0">
+                <a:latin typeface="Times New Roman" panose="02020603050405020304" pitchFamily="18" charset="0"/>
+                <a:ea typeface="KaiTi_GB2312" panose="02010609030101010101" pitchFamily="49" charset="-122"/>
+                <a:cs typeface="Times New Roman" panose="02020603050405020304" pitchFamily="18" charset="0"/>
+              </a:rPr>
+              <a:t>-1</a:t>
+            </a:r>
+            <a:r>
+              <a:rPr lang="zh-CN" altLang="en-US" sz="2400" dirty="0">
+                <a:latin typeface="Times New Roman" panose="02020603050405020304" pitchFamily="18" charset="0"/>
+                <a:ea typeface="KaiTi_GB2312" panose="02010609030101010101" pitchFamily="49" charset="-122"/>
+                <a:cs typeface="Times New Roman" panose="02020603050405020304" pitchFamily="18" charset="0"/>
+              </a:rPr>
+              <a:t>, </a:t>
+            </a:r>
+            <a:r>
+              <a:rPr lang="en-US" altLang="zh-CN" sz="2400" dirty="0">
+                <a:latin typeface="Times New Roman" panose="02020603050405020304" pitchFamily="18" charset="0"/>
+                <a:ea typeface="KaiTi_GB2312" panose="02010609030101010101" pitchFamily="49" charset="-122"/>
+                <a:cs typeface="Times New Roman" panose="02020603050405020304" pitchFamily="18" charset="0"/>
+              </a:rPr>
+              <a:t>1</a:t>
+            </a:r>
+            <a:r>
+              <a:rPr lang="zh-CN" altLang="en-US" sz="2400" dirty="0">
+                <a:latin typeface="Times New Roman" panose="02020603050405020304" pitchFamily="18" charset="0"/>
+                <a:ea typeface="KaiTi_GB2312" panose="02010609030101010101" pitchFamily="49" charset="-122"/>
+                <a:cs typeface="Times New Roman" panose="02020603050405020304" pitchFamily="18" charset="0"/>
+              </a:rPr>
+              <a:t>] 为例。</a:t>
+            </a:r>
+            <a:endParaRPr lang="en-US" altLang="zh-CN" sz="2400" dirty="0">
+              <a:latin typeface="Times New Roman" panose="02020603050405020304" pitchFamily="18" charset="0"/>
+              <a:ea typeface="KaiTi_GB2312" panose="02010609030101010101" pitchFamily="49" charset="-122"/>
+              <a:cs typeface="Times New Roman" panose="02020603050405020304" pitchFamily="18" charset="0"/>
+            </a:endParaRPr>
           </a:p>
         </p:txBody>
       </p:sp>
@@ -3445,8 +3507,8 @@
         </p:blipFill>
         <p:spPr>
           <a:xfrm>
-            <a:off x="4034008" y="3337766"/>
-            <a:ext cx="4775846" cy="1640558"/>
+            <a:off x="2880000" y="2880000"/>
+            <a:ext cx="7335999" cy="2520000"/>
           </a:xfrm>
           <a:prstGeom prst="rect">
             <a:avLst/>
@@ -3563,8 +3625,8 @@
         </p:nvSpPr>
         <p:spPr>
           <a:xfrm>
-            <a:off x="4034008" y="5210187"/>
-            <a:ext cx="7612945" cy="1200329"/>
+            <a:off x="251019" y="5192611"/>
+            <a:ext cx="11532487" cy="1569660"/>
           </a:xfrm>
           <a:prstGeom prst="rect">
             <a:avLst/>
@@ -3576,222 +3638,253 @@
           </a:bodyPr>
           <a:lstStyle/>
           <a:p>
-            <a:r>
-              <a:rPr kumimoji="1" lang="en-US" altLang="zh-CN" dirty="0">
-                <a:latin typeface="Times New Roman" charset="0"/>
-                <a:ea typeface="楷体_GB2312" panose="02010609030101010101" pitchFamily="49" charset="-122"/>
+            <a:pPr marL="342900" indent="-342900">
+              <a:buFont typeface="Wingdings" pitchFamily="2" charset="2"/>
+              <a:buChar char="l"/>
+            </a:pPr>
+            <a:r>
+              <a:rPr kumimoji="1" lang="zh-CN" altLang="en-US" sz="2400" dirty="0">
+                <a:latin typeface="Times New Roman" panose="02020603050405020304" pitchFamily="18" charset="0"/>
+                <a:ea typeface="楷体_GB2312" panose="02010609030101010101" pitchFamily="49" charset="-122"/>
+                <a:cs typeface="Times New Roman" panose="02020603050405020304" pitchFamily="18" charset="0"/>
+              </a:rPr>
+              <a:t>索引 </a:t>
+            </a:r>
+            <a:r>
+              <a:rPr kumimoji="1" lang="en-US" altLang="zh-CN" sz="2400" dirty="0">
+                <a:latin typeface="Times New Roman" panose="02020603050405020304" pitchFamily="18" charset="0"/>
+                <a:ea typeface="楷体_GB2312" panose="02010609030101010101" pitchFamily="49" charset="-122"/>
+                <a:cs typeface="Times New Roman" panose="02020603050405020304" pitchFamily="18" charset="0"/>
+              </a:rPr>
+              <a:t>0</a:t>
+            </a:r>
+            <a:r>
+              <a:rPr kumimoji="1" lang="zh-CN" altLang="en-US" sz="2400" dirty="0">
+                <a:latin typeface="Times New Roman" panose="02020603050405020304" pitchFamily="18" charset="0"/>
+                <a:ea typeface="楷体_GB2312" panose="02010609030101010101" pitchFamily="49" charset="-122"/>
+                <a:cs typeface="Times New Roman" panose="02020603050405020304" pitchFamily="18" charset="0"/>
+              </a:rPr>
+              <a:t> 上现在放置的数字 </a:t>
+            </a:r>
+            <a:r>
+              <a:rPr kumimoji="1" lang="en-US" altLang="zh-CN" sz="2400" dirty="0">
+                <a:latin typeface="Times New Roman" panose="02020603050405020304" pitchFamily="18" charset="0"/>
+                <a:ea typeface="楷体_GB2312" panose="02010609030101010101" pitchFamily="49" charset="-122"/>
+                <a:cs typeface="Times New Roman" panose="02020603050405020304" pitchFamily="18" charset="0"/>
               </a:rPr>
               <a:t>1</a:t>
             </a:r>
             <a:r>
-              <a:rPr kumimoji="1" lang="zh-CN" altLang="en-US" dirty="0">
-                <a:latin typeface="Times New Roman" charset="0"/>
-                <a:ea typeface="楷体_GB2312" panose="02010609030101010101" pitchFamily="49" charset="-122"/>
-              </a:rPr>
-              <a:t>、索引 </a:t>
-            </a:r>
-            <a:r>
-              <a:rPr kumimoji="1" lang="en-US" altLang="zh-CN" dirty="0">
-                <a:latin typeface="Times New Roman" charset="0"/>
-                <a:ea typeface="楷体_GB2312" panose="02010609030101010101" pitchFamily="49" charset="-122"/>
-              </a:rPr>
-              <a:t>0</a:t>
-            </a:r>
-            <a:r>
-              <a:rPr kumimoji="1" lang="zh-CN" altLang="en-US" dirty="0">
-                <a:latin typeface="Times New Roman" charset="0"/>
-                <a:ea typeface="楷体_GB2312" panose="02010609030101010101" pitchFamily="49" charset="-122"/>
-              </a:rPr>
-              <a:t> 上现在放置的数字 </a:t>
-            </a:r>
-            <a:r>
-              <a:rPr kumimoji="1" lang="en-US" altLang="zh-CN" dirty="0">
-                <a:latin typeface="Times New Roman" charset="0"/>
-                <a:ea typeface="楷体_GB2312" panose="02010609030101010101" pitchFamily="49" charset="-122"/>
-              </a:rPr>
-              <a:t>1</a:t>
-            </a:r>
-            <a:r>
-              <a:rPr kumimoji="1" lang="zh-CN" altLang="en-US" dirty="0">
-                <a:latin typeface="Times New Roman" charset="0"/>
-                <a:ea typeface="楷体_GB2312" panose="02010609030101010101" pitchFamily="49" charset="-122"/>
+              <a:rPr kumimoji="1" lang="zh-CN" altLang="en-US" sz="2400" dirty="0">
+                <a:latin typeface="Times New Roman" panose="02020603050405020304" pitchFamily="18" charset="0"/>
+                <a:ea typeface="楷体_GB2312" panose="02010609030101010101" pitchFamily="49" charset="-122"/>
+                <a:cs typeface="Times New Roman" panose="02020603050405020304" pitchFamily="18" charset="0"/>
               </a:rPr>
               <a:t> 放对了，我们把它标红；</a:t>
             </a:r>
-            <a:endParaRPr kumimoji="1" lang="en-US" altLang="zh-CN" dirty="0">
-              <a:latin typeface="Times New Roman" charset="0"/>
+            <a:endParaRPr kumimoji="1" lang="en-US" altLang="zh-CN" sz="2400" dirty="0">
+              <a:latin typeface="Times New Roman" panose="02020603050405020304" pitchFamily="18" charset="0"/>
               <a:ea typeface="楷体_GB2312" panose="02010609030101010101" pitchFamily="49" charset="-122"/>
+              <a:cs typeface="Times New Roman" panose="02020603050405020304" pitchFamily="18" charset="0"/>
             </a:endParaRPr>
           </a:p>
           <a:p>
-            <a:r>
-              <a:rPr kumimoji="1" lang="en-US" altLang="zh-CN" dirty="0">
-                <a:latin typeface="Times New Roman" charset="0"/>
-                <a:ea typeface="楷体_GB2312" panose="02010609030101010101" pitchFamily="49" charset="-122"/>
+            <a:pPr marL="342900" indent="-342900">
+              <a:buFont typeface="Wingdings" pitchFamily="2" charset="2"/>
+              <a:buChar char="l"/>
+            </a:pPr>
+            <a:r>
+              <a:rPr kumimoji="1" lang="zh-CN" altLang="en-US" sz="2400" dirty="0">
+                <a:latin typeface="Times New Roman" panose="02020603050405020304" pitchFamily="18" charset="0"/>
+                <a:ea typeface="楷体_GB2312" panose="02010609030101010101" pitchFamily="49" charset="-122"/>
+                <a:cs typeface="Times New Roman" panose="02020603050405020304" pitchFamily="18" charset="0"/>
+              </a:rPr>
+              <a:t>索引 </a:t>
+            </a:r>
+            <a:r>
+              <a:rPr kumimoji="1" lang="en-US" altLang="zh-CN" sz="2400" dirty="0">
+                <a:latin typeface="Times New Roman" panose="02020603050405020304" pitchFamily="18" charset="0"/>
+                <a:ea typeface="楷体_GB2312" panose="02010609030101010101" pitchFamily="49" charset="-122"/>
+                <a:cs typeface="Times New Roman" panose="02020603050405020304" pitchFamily="18" charset="0"/>
+              </a:rPr>
+              <a:t>1</a:t>
+            </a:r>
+            <a:r>
+              <a:rPr kumimoji="1" lang="zh-CN" altLang="en-US" sz="2400" dirty="0">
+                <a:latin typeface="Times New Roman" panose="02020603050405020304" pitchFamily="18" charset="0"/>
+                <a:ea typeface="楷体_GB2312" panose="02010609030101010101" pitchFamily="49" charset="-122"/>
+                <a:cs typeface="Times New Roman" panose="02020603050405020304" pitchFamily="18" charset="0"/>
+              </a:rPr>
+              <a:t> 上现在放置的是数字 </a:t>
+            </a:r>
+            <a:r>
+              <a:rPr kumimoji="1" lang="en-US" altLang="zh-CN" sz="2400" dirty="0">
+                <a:latin typeface="Times New Roman" panose="02020603050405020304" pitchFamily="18" charset="0"/>
+                <a:ea typeface="楷体_GB2312" panose="02010609030101010101" pitchFamily="49" charset="-122"/>
+                <a:cs typeface="Times New Roman" panose="02020603050405020304" pitchFamily="18" charset="0"/>
+              </a:rPr>
+              <a:t>-1</a:t>
+            </a:r>
+            <a:r>
+              <a:rPr kumimoji="1" lang="zh-CN" altLang="en-US" sz="2400" dirty="0">
+                <a:latin typeface="Times New Roman" panose="02020603050405020304" pitchFamily="18" charset="0"/>
+                <a:ea typeface="楷体_GB2312" panose="02010609030101010101" pitchFamily="49" charset="-122"/>
+                <a:cs typeface="Times New Roman" panose="02020603050405020304" pitchFamily="18" charset="0"/>
+              </a:rPr>
+              <a:t> ，按照之前的分析，它不在 </a:t>
+            </a:r>
+            <a:r>
+              <a:rPr kumimoji="1" lang="en-US" altLang="zh-CN" sz="2400" dirty="0">
+                <a:latin typeface="Times New Roman" panose="02020603050405020304" pitchFamily="18" charset="0"/>
+                <a:ea typeface="楷体_GB2312" panose="02010609030101010101" pitchFamily="49" charset="-122"/>
+                <a:cs typeface="Times New Roman" panose="02020603050405020304" pitchFamily="18" charset="0"/>
+              </a:rPr>
+              <a:t>{1,</a:t>
+            </a:r>
+            <a:r>
+              <a:rPr kumimoji="1" lang="zh-CN" altLang="en-US" sz="2400" dirty="0">
+                <a:latin typeface="Times New Roman" panose="02020603050405020304" pitchFamily="18" charset="0"/>
+                <a:ea typeface="楷体_GB2312" panose="02010609030101010101" pitchFamily="49" charset="-122"/>
+                <a:cs typeface="Times New Roman" panose="02020603050405020304" pitchFamily="18" charset="0"/>
+              </a:rPr>
+              <a:t> </a:t>
+            </a:r>
+            <a:r>
+              <a:rPr kumimoji="1" lang="en-US" altLang="zh-CN" sz="2400" dirty="0">
+                <a:latin typeface="Times New Roman" panose="02020603050405020304" pitchFamily="18" charset="0"/>
+                <a:ea typeface="楷体_GB2312" panose="02010609030101010101" pitchFamily="49" charset="-122"/>
+                <a:cs typeface="Times New Roman" panose="02020603050405020304" pitchFamily="18" charset="0"/>
+              </a:rPr>
+              <a:t>2,</a:t>
+            </a:r>
+            <a:r>
+              <a:rPr kumimoji="1" lang="zh-CN" altLang="en-US" sz="2400" dirty="0">
+                <a:latin typeface="Times New Roman" panose="02020603050405020304" pitchFamily="18" charset="0"/>
+                <a:ea typeface="楷体_GB2312" panose="02010609030101010101" pitchFamily="49" charset="-122"/>
+                <a:cs typeface="Times New Roman" panose="02020603050405020304" pitchFamily="18" charset="0"/>
+              </a:rPr>
+              <a:t> </a:t>
+            </a:r>
+            <a:r>
+              <a:rPr kumimoji="1" lang="en-US" altLang="zh-CN" sz="2400" dirty="0">
+                <a:latin typeface="Times New Roman" panose="02020603050405020304" pitchFamily="18" charset="0"/>
+                <a:ea typeface="楷体_GB2312" panose="02010609030101010101" pitchFamily="49" charset="-122"/>
+                <a:cs typeface="Times New Roman" panose="02020603050405020304" pitchFamily="18" charset="0"/>
+              </a:rPr>
+              <a:t>3,</a:t>
+            </a:r>
+            <a:r>
+              <a:rPr kumimoji="1" lang="zh-CN" altLang="en-US" sz="2400" dirty="0">
+                <a:latin typeface="Times New Roman" panose="02020603050405020304" pitchFamily="18" charset="0"/>
+                <a:ea typeface="楷体_GB2312" panose="02010609030101010101" pitchFamily="49" charset="-122"/>
+                <a:cs typeface="Times New Roman" panose="02020603050405020304" pitchFamily="18" charset="0"/>
+              </a:rPr>
+              <a:t> </a:t>
+            </a:r>
+            <a:r>
+              <a:rPr kumimoji="1" lang="en-US" altLang="zh-CN" sz="2400" dirty="0">
+                <a:latin typeface="Times New Roman" panose="02020603050405020304" pitchFamily="18" charset="0"/>
+                <a:ea typeface="楷体_GB2312" panose="02010609030101010101" pitchFamily="49" charset="-122"/>
+                <a:cs typeface="Times New Roman" panose="02020603050405020304" pitchFamily="18" charset="0"/>
+              </a:rPr>
+              <a:t>4}</a:t>
+            </a:r>
+            <a:r>
+              <a:rPr kumimoji="1" lang="zh-CN" altLang="en-US" sz="2400" dirty="0">
+                <a:latin typeface="Times New Roman" panose="02020603050405020304" pitchFamily="18" charset="0"/>
+                <a:ea typeface="楷体_GB2312" panose="02010609030101010101" pitchFamily="49" charset="-122"/>
+                <a:cs typeface="Times New Roman" panose="02020603050405020304" pitchFamily="18" charset="0"/>
+              </a:rPr>
+              <a:t> 这个集合中，是“无处安放”的元素，放在哪里都不对。</a:t>
+            </a:r>
+            <a:endParaRPr kumimoji="1" lang="en-US" altLang="zh-CN" sz="2400" dirty="0">
+              <a:latin typeface="Times New Roman" panose="02020603050405020304" pitchFamily="18" charset="0"/>
+              <a:ea typeface="楷体_GB2312" panose="02010609030101010101" pitchFamily="49" charset="-122"/>
+              <a:cs typeface="Times New Roman" panose="02020603050405020304" pitchFamily="18" charset="0"/>
+            </a:endParaRPr>
+          </a:p>
+          <a:p>
+            <a:pPr marL="342900" indent="-342900">
+              <a:buFont typeface="Wingdings" pitchFamily="2" charset="2"/>
+              <a:buChar char="l"/>
+            </a:pPr>
+            <a:r>
+              <a:rPr kumimoji="1" lang="zh-CN" altLang="en-US" sz="2400" b="1" dirty="0">
+                <a:solidFill>
+                  <a:srgbClr val="FF0000"/>
+                </a:solidFill>
+                <a:latin typeface="Times New Roman" panose="02020603050405020304" pitchFamily="18" charset="0"/>
+                <a:ea typeface="楷体_GB2312" panose="02010609030101010101" pitchFamily="49" charset="-122"/>
+                <a:cs typeface="Times New Roman" panose="02020603050405020304" pitchFamily="18" charset="0"/>
+              </a:rPr>
+              <a:t>索引 </a:t>
+            </a:r>
+            <a:r>
+              <a:rPr kumimoji="1" lang="en-US" altLang="zh-CN" sz="2400" b="1" dirty="0">
+                <a:solidFill>
+                  <a:srgbClr val="FF0000"/>
+                </a:solidFill>
+                <a:latin typeface="Times New Roman" panose="02020603050405020304" pitchFamily="18" charset="0"/>
+                <a:ea typeface="楷体_GB2312" panose="02010609030101010101" pitchFamily="49" charset="-122"/>
+                <a:cs typeface="Times New Roman" panose="02020603050405020304" pitchFamily="18" charset="0"/>
+              </a:rPr>
+              <a:t>1</a:t>
+            </a:r>
+            <a:r>
+              <a:rPr kumimoji="1" lang="zh-CN" altLang="en-US" sz="2400" b="1" dirty="0">
+                <a:solidFill>
+                  <a:srgbClr val="FF0000"/>
+                </a:solidFill>
+                <a:latin typeface="Times New Roman" panose="02020603050405020304" pitchFamily="18" charset="0"/>
+                <a:ea typeface="楷体_GB2312" panose="02010609030101010101" pitchFamily="49" charset="-122"/>
+                <a:cs typeface="Times New Roman" panose="02020603050405020304" pitchFamily="18" charset="0"/>
+              </a:rPr>
+              <a:t> 上的元素等待后序如果有数字 </a:t>
+            </a:r>
+            <a:r>
+              <a:rPr kumimoji="1" lang="en-US" altLang="zh-CN" sz="2400" b="1" dirty="0">
+                <a:solidFill>
+                  <a:srgbClr val="FF0000"/>
+                </a:solidFill>
+                <a:latin typeface="Times New Roman" panose="02020603050405020304" pitchFamily="18" charset="0"/>
+                <a:ea typeface="楷体_GB2312" panose="02010609030101010101" pitchFamily="49" charset="-122"/>
+                <a:cs typeface="Times New Roman" panose="02020603050405020304" pitchFamily="18" charset="0"/>
               </a:rPr>
               <a:t>2</a:t>
             </a:r>
             <a:r>
-              <a:rPr kumimoji="1" lang="zh-CN" altLang="en-US" dirty="0">
-                <a:latin typeface="Times New Roman" charset="0"/>
-                <a:ea typeface="楷体_GB2312" panose="02010609030101010101" pitchFamily="49" charset="-122"/>
-              </a:rPr>
-              <a:t>、索引 </a:t>
-            </a:r>
-            <a:r>
-              <a:rPr kumimoji="1" lang="en-US" altLang="zh-CN" dirty="0">
-                <a:latin typeface="Times New Roman" charset="0"/>
-                <a:ea typeface="楷体_GB2312" panose="02010609030101010101" pitchFamily="49" charset="-122"/>
-              </a:rPr>
-              <a:t>1</a:t>
-            </a:r>
-            <a:r>
-              <a:rPr kumimoji="1" lang="zh-CN" altLang="en-US" dirty="0">
-                <a:latin typeface="Times New Roman" charset="0"/>
-                <a:ea typeface="楷体_GB2312" panose="02010609030101010101" pitchFamily="49" charset="-122"/>
-              </a:rPr>
-              <a:t> 上现在放置的是数字 </a:t>
-            </a:r>
-            <a:r>
-              <a:rPr kumimoji="1" lang="en-US" altLang="zh-CN" dirty="0">
-                <a:latin typeface="Times New Roman" charset="0"/>
-                <a:ea typeface="楷体_GB2312" panose="02010609030101010101" pitchFamily="49" charset="-122"/>
-              </a:rPr>
-              <a:t>-1</a:t>
-            </a:r>
-            <a:r>
-              <a:rPr kumimoji="1" lang="zh-CN" altLang="en-US" dirty="0">
-                <a:latin typeface="Times New Roman" charset="0"/>
-                <a:ea typeface="楷体_GB2312" panose="02010609030101010101" pitchFamily="49" charset="-122"/>
-              </a:rPr>
-              <a:t> ，按照之前的分析，它不在 </a:t>
-            </a:r>
-            <a:r>
-              <a:rPr kumimoji="1" lang="en-US" altLang="zh-CN" dirty="0">
-                <a:latin typeface="Times New Roman" charset="0"/>
-                <a:ea typeface="楷体_GB2312" panose="02010609030101010101" pitchFamily="49" charset="-122"/>
-              </a:rPr>
-              <a:t>{1,</a:t>
-            </a:r>
-            <a:r>
-              <a:rPr kumimoji="1" lang="zh-CN" altLang="en-US" dirty="0">
-                <a:latin typeface="Times New Roman" charset="0"/>
-                <a:ea typeface="楷体_GB2312" panose="02010609030101010101" pitchFamily="49" charset="-122"/>
-              </a:rPr>
-              <a:t> </a:t>
-            </a:r>
-            <a:r>
-              <a:rPr kumimoji="1" lang="en-US" altLang="zh-CN" dirty="0">
-                <a:latin typeface="Times New Roman" charset="0"/>
-                <a:ea typeface="楷体_GB2312" panose="02010609030101010101" pitchFamily="49" charset="-122"/>
-              </a:rPr>
-              <a:t>2,</a:t>
-            </a:r>
-            <a:r>
-              <a:rPr kumimoji="1" lang="zh-CN" altLang="en-US" dirty="0">
-                <a:latin typeface="Times New Roman" charset="0"/>
-                <a:ea typeface="楷体_GB2312" panose="02010609030101010101" pitchFamily="49" charset="-122"/>
-              </a:rPr>
-              <a:t> </a:t>
-            </a:r>
-            <a:r>
-              <a:rPr kumimoji="1" lang="en-US" altLang="zh-CN" dirty="0">
-                <a:latin typeface="Times New Roman" charset="0"/>
-                <a:ea typeface="楷体_GB2312" panose="02010609030101010101" pitchFamily="49" charset="-122"/>
-              </a:rPr>
-              <a:t>3,</a:t>
-            </a:r>
-            <a:r>
-              <a:rPr kumimoji="1" lang="zh-CN" altLang="en-US" dirty="0">
-                <a:latin typeface="Times New Roman" charset="0"/>
-                <a:ea typeface="楷体_GB2312" panose="02010609030101010101" pitchFamily="49" charset="-122"/>
-              </a:rPr>
-              <a:t> </a:t>
-            </a:r>
-            <a:r>
-              <a:rPr kumimoji="1" lang="en-US" altLang="zh-CN" dirty="0">
-                <a:latin typeface="Times New Roman" charset="0"/>
-                <a:ea typeface="楷体_GB2312" panose="02010609030101010101" pitchFamily="49" charset="-122"/>
-              </a:rPr>
-              <a:t>4}</a:t>
-            </a:r>
-            <a:r>
-              <a:rPr kumimoji="1" lang="zh-CN" altLang="en-US" dirty="0">
-                <a:latin typeface="Times New Roman" charset="0"/>
-                <a:ea typeface="楷体_GB2312" panose="02010609030101010101" pitchFamily="49" charset="-122"/>
-              </a:rPr>
-              <a:t> 这个集合中，是“无处安放”的元素，放在哪里都不对。</a:t>
-            </a:r>
-            <a:r>
-              <a:rPr kumimoji="1" lang="zh-CN" altLang="en-US" b="1" dirty="0">
+              <a:rPr kumimoji="1" lang="zh-CN" altLang="en-US" sz="2400" b="1" dirty="0">
                 <a:solidFill>
                   <a:srgbClr val="FF0000"/>
                 </a:solidFill>
-                <a:latin typeface="Times New Roman" charset="0"/>
-                <a:ea typeface="楷体_GB2312" panose="02010609030101010101" pitchFamily="49" charset="-122"/>
-              </a:rPr>
-              <a:t>索引 </a:t>
-            </a:r>
-            <a:r>
-              <a:rPr kumimoji="1" lang="en-US" altLang="zh-CN" b="1" dirty="0">
-                <a:solidFill>
-                  <a:srgbClr val="FF0000"/>
-                </a:solidFill>
-                <a:latin typeface="Times New Roman" charset="0"/>
-                <a:ea typeface="楷体_GB2312" panose="02010609030101010101" pitchFamily="49" charset="-122"/>
-              </a:rPr>
-              <a:t>1</a:t>
-            </a:r>
-            <a:r>
-              <a:rPr kumimoji="1" lang="zh-CN" altLang="en-US" b="1" dirty="0">
-                <a:solidFill>
-                  <a:srgbClr val="FF0000"/>
-                </a:solidFill>
-                <a:latin typeface="Times New Roman" charset="0"/>
-                <a:ea typeface="楷体_GB2312" panose="02010609030101010101" pitchFamily="49" charset="-122"/>
-              </a:rPr>
-              <a:t> 上的元素等待后序如果有数字 </a:t>
-            </a:r>
-            <a:r>
-              <a:rPr kumimoji="1" lang="en-US" altLang="zh-CN" b="1" dirty="0">
-                <a:solidFill>
-                  <a:srgbClr val="FF0000"/>
-                </a:solidFill>
-                <a:latin typeface="Times New Roman" charset="0"/>
-                <a:ea typeface="楷体_GB2312" panose="02010609030101010101" pitchFamily="49" charset="-122"/>
-              </a:rPr>
-              <a:t>2</a:t>
-            </a:r>
-            <a:r>
-              <a:rPr kumimoji="1" lang="zh-CN" altLang="en-US" b="1" dirty="0">
-                <a:solidFill>
-                  <a:srgbClr val="FF0000"/>
-                </a:solidFill>
-                <a:latin typeface="Times New Roman" charset="0"/>
-                <a:ea typeface="楷体_GB2312" panose="02010609030101010101" pitchFamily="49" charset="-122"/>
+                <a:latin typeface="Times New Roman" panose="02020603050405020304" pitchFamily="18" charset="0"/>
+                <a:ea typeface="楷体_GB2312" panose="02010609030101010101" pitchFamily="49" charset="-122"/>
+                <a:cs typeface="Times New Roman" panose="02020603050405020304" pitchFamily="18" charset="0"/>
               </a:rPr>
               <a:t> 会被交换过来</a:t>
             </a:r>
             <a:r>
-              <a:rPr kumimoji="1" lang="zh-CN" altLang="en-US" dirty="0">
-                <a:latin typeface="Times New Roman" charset="0"/>
-                <a:ea typeface="楷体_GB2312" panose="02010609030101010101" pitchFamily="49" charset="-122"/>
+              <a:rPr kumimoji="1" lang="zh-CN" altLang="en-US" sz="2400" dirty="0">
+                <a:latin typeface="Times New Roman" panose="02020603050405020304" pitchFamily="18" charset="0"/>
+                <a:ea typeface="楷体_GB2312" panose="02010609030101010101" pitchFamily="49" charset="-122"/>
+                <a:cs typeface="Times New Roman" panose="02020603050405020304" pitchFamily="18" charset="0"/>
               </a:rPr>
               <a:t>，接下来看下一个索引。</a:t>
             </a:r>
-            <a:endParaRPr kumimoji="1" lang="en-US" altLang="zh-CN" dirty="0">
-              <a:latin typeface="Times New Roman" charset="0"/>
+            <a:endParaRPr kumimoji="1" lang="en-US" altLang="zh-CN" sz="2400" dirty="0">
+              <a:latin typeface="Times New Roman" panose="02020603050405020304" pitchFamily="18" charset="0"/>
               <a:ea typeface="楷体_GB2312" panose="02010609030101010101" pitchFamily="49" charset="-122"/>
+              <a:cs typeface="Times New Roman" panose="02020603050405020304" pitchFamily="18" charset="0"/>
             </a:endParaRPr>
           </a:p>
         </p:txBody>
       </p:sp>
       <p:sp>
         <p:nvSpPr>
-          <p:cNvPr id="8" name="文本框 7">
+          <p:cNvPr id="11" name="文本框 10">
             <a:extLst>
               <a:ext uri="{FF2B5EF4-FFF2-40B4-BE49-F238E27FC236}">
-                <a16:creationId xmlns:a16="http://schemas.microsoft.com/office/drawing/2014/main" id="{F272CB81-B192-BE45-B1A4-5C6CDA737F97}"/>
+                <a16:creationId xmlns:a16="http://schemas.microsoft.com/office/drawing/2014/main" id="{2B6385E6-9B19-154A-BD53-A8C69A226D9F}"/>
               </a:ext>
             </a:extLst>
           </p:cNvPr>
@@ -3800,8 +3893,8 @@
         </p:nvSpPr>
         <p:spPr>
           <a:xfrm flipH="1">
-            <a:off x="804680" y="873508"/>
-            <a:ext cx="5011657" cy="461665"/>
+            <a:off x="804679" y="781316"/>
+            <a:ext cx="8474450" cy="461665"/>
           </a:xfrm>
           <a:prstGeom prst="rect">
             <a:avLst/>
@@ -3839,17 +3932,17 @@
                 <a:ea typeface="KaiTi_GB2312" panose="02010609030101010101" pitchFamily="49" charset="-122"/>
                 <a:cs typeface="Times New Roman" panose="02020603050405020304" pitchFamily="18" charset="0"/>
               </a:rPr>
-              <a:t>思想：桶排序，一个萝卜一个坑。</a:t>
+              <a:t>思想：桶排序（一个萝卜一个坑）、抽屉原理、鸽巢原理。</a:t>
             </a:r>
           </a:p>
         </p:txBody>
       </p:sp>
       <p:sp>
         <p:nvSpPr>
-          <p:cNvPr id="9" name="矩形 8">
+          <p:cNvPr id="15" name="下箭头 14">
             <a:extLst>
               <a:ext uri="{FF2B5EF4-FFF2-40B4-BE49-F238E27FC236}">
-                <a16:creationId xmlns:a16="http://schemas.microsoft.com/office/drawing/2014/main" id="{C5AD9748-2CA5-0E46-8A7D-0165D1CDB766}"/>
+                <a16:creationId xmlns:a16="http://schemas.microsoft.com/office/drawing/2014/main" id="{FEAB2EFA-B728-9647-8376-C9ADDE6B53A9}"/>
               </a:ext>
             </a:extLst>
           </p:cNvPr>
@@ -3858,172 +3951,8 @@
         </p:nvSpPr>
         <p:spPr>
           <a:xfrm>
-            <a:off x="729875" y="1536242"/>
-            <a:ext cx="3490058" cy="369332"/>
-          </a:xfrm>
-          <a:prstGeom prst="rect">
-            <a:avLst/>
-          </a:prstGeom>
-        </p:spPr>
-        <p:txBody>
-          <a:bodyPr wrap="none">
-            <a:spAutoFit/>
-          </a:bodyPr>
-          <a:lstStyle/>
-          <a:p>
-            <a:r>
-              <a:rPr lang="zh-CN" altLang="en-US" dirty="0"/>
-              <a:t>以示例 </a:t>
-            </a:r>
-            <a:r>
-              <a:rPr lang="en-US" altLang="zh-CN" dirty="0">
-                <a:latin typeface="Times New Roman" panose="02020603050405020304" pitchFamily="18" charset="0"/>
-                <a:cs typeface="Times New Roman" panose="02020603050405020304" pitchFamily="18" charset="0"/>
-              </a:rPr>
-              <a:t>2</a:t>
-            </a:r>
-            <a:r>
-              <a:rPr lang="zh-CN" altLang="en-US" dirty="0"/>
-              <a:t> 输入</a:t>
-            </a:r>
-            <a:r>
-              <a:rPr lang="zh-CN" altLang="en-US" dirty="0">
-                <a:latin typeface="Times New Roman" panose="02020603050405020304" pitchFamily="18" charset="0"/>
-                <a:cs typeface="Times New Roman" panose="02020603050405020304" pitchFamily="18" charset="0"/>
-              </a:rPr>
-              <a:t>: [</a:t>
-            </a:r>
-            <a:r>
-              <a:rPr lang="en-US" altLang="zh-CN" dirty="0">
-                <a:latin typeface="Times New Roman" panose="02020603050405020304" pitchFamily="18" charset="0"/>
-                <a:cs typeface="Times New Roman" panose="02020603050405020304" pitchFamily="18" charset="0"/>
-              </a:rPr>
-              <a:t>3</a:t>
-            </a:r>
-            <a:r>
-              <a:rPr lang="zh-CN" altLang="en-US" dirty="0">
-                <a:latin typeface="Times New Roman" panose="02020603050405020304" pitchFamily="18" charset="0"/>
-                <a:cs typeface="Times New Roman" panose="02020603050405020304" pitchFamily="18" charset="0"/>
-              </a:rPr>
-              <a:t>, </a:t>
-            </a:r>
-            <a:r>
-              <a:rPr lang="en-US" altLang="zh-CN" dirty="0">
-                <a:latin typeface="Times New Roman" panose="02020603050405020304" pitchFamily="18" charset="0"/>
-                <a:cs typeface="Times New Roman" panose="02020603050405020304" pitchFamily="18" charset="0"/>
-              </a:rPr>
-              <a:t>4</a:t>
-            </a:r>
-            <a:r>
-              <a:rPr lang="zh-CN" altLang="en-US" dirty="0">
-                <a:latin typeface="Times New Roman" panose="02020603050405020304" pitchFamily="18" charset="0"/>
-                <a:cs typeface="Times New Roman" panose="02020603050405020304" pitchFamily="18" charset="0"/>
-              </a:rPr>
-              <a:t>, </a:t>
-            </a:r>
-            <a:r>
-              <a:rPr lang="en-US" altLang="zh-CN" dirty="0">
-                <a:latin typeface="Times New Roman" panose="02020603050405020304" pitchFamily="18" charset="0"/>
-                <a:cs typeface="Times New Roman" panose="02020603050405020304" pitchFamily="18" charset="0"/>
-              </a:rPr>
-              <a:t>-1</a:t>
-            </a:r>
-            <a:r>
-              <a:rPr lang="zh-CN" altLang="en-US" dirty="0">
-                <a:latin typeface="Times New Roman" panose="02020603050405020304" pitchFamily="18" charset="0"/>
-                <a:cs typeface="Times New Roman" panose="02020603050405020304" pitchFamily="18" charset="0"/>
-              </a:rPr>
-              <a:t>, </a:t>
-            </a:r>
-            <a:r>
-              <a:rPr lang="en-US" altLang="zh-CN" dirty="0">
-                <a:latin typeface="Times New Roman" panose="02020603050405020304" pitchFamily="18" charset="0"/>
-                <a:cs typeface="Times New Roman" panose="02020603050405020304" pitchFamily="18" charset="0"/>
-              </a:rPr>
-              <a:t>1</a:t>
-            </a:r>
-            <a:r>
-              <a:rPr lang="zh-CN" altLang="en-US" dirty="0">
-                <a:latin typeface="Times New Roman" panose="02020603050405020304" pitchFamily="18" charset="0"/>
-                <a:cs typeface="Times New Roman" panose="02020603050405020304" pitchFamily="18" charset="0"/>
-              </a:rPr>
-              <a:t>] </a:t>
-            </a:r>
-            <a:r>
-              <a:rPr lang="zh-CN" altLang="en-US" dirty="0"/>
-              <a:t>为例。</a:t>
-            </a:r>
-            <a:endParaRPr lang="en-US" altLang="zh-CN" dirty="0"/>
-          </a:p>
-        </p:txBody>
-      </p:sp>
-      <p:sp>
-        <p:nvSpPr>
-          <p:cNvPr id="12" name="矩形 11">
-            <a:extLst>
-              <a:ext uri="{FF2B5EF4-FFF2-40B4-BE49-F238E27FC236}">
-                <a16:creationId xmlns:a16="http://schemas.microsoft.com/office/drawing/2014/main" id="{30248138-64FA-8C48-90C0-224D229792C0}"/>
-              </a:ext>
-            </a:extLst>
-          </p:cNvPr>
-          <p:cNvSpPr/>
-          <p:nvPr/>
-        </p:nvSpPr>
-        <p:spPr>
-          <a:xfrm>
-            <a:off x="5134333" y="2286135"/>
-            <a:ext cx="5303631" cy="369332"/>
-          </a:xfrm>
-          <a:prstGeom prst="rect">
-            <a:avLst/>
-          </a:prstGeom>
-        </p:spPr>
-        <p:txBody>
-          <a:bodyPr wrap="square">
-            <a:spAutoFit/>
-          </a:bodyPr>
-          <a:lstStyle/>
-          <a:p>
-            <a:r>
-              <a:rPr kumimoji="1" lang="zh-CN" altLang="en-US" dirty="0">
-                <a:latin typeface="Times New Roman" charset="0"/>
-                <a:ea typeface="楷体_GB2312" panose="02010609030101010101" pitchFamily="49" charset="-122"/>
-              </a:rPr>
-              <a:t>接下来还看索引 </a:t>
-            </a:r>
-            <a:r>
-              <a:rPr kumimoji="1" lang="en-US" altLang="zh-CN" dirty="0">
-                <a:latin typeface="Times New Roman" charset="0"/>
-                <a:ea typeface="楷体_GB2312" panose="02010609030101010101" pitchFamily="49" charset="-122"/>
-              </a:rPr>
-              <a:t>1</a:t>
-            </a:r>
-            <a:r>
-              <a:rPr kumimoji="1" lang="zh-CN" altLang="en-US" dirty="0">
-                <a:latin typeface="Times New Roman" charset="0"/>
-                <a:ea typeface="楷体_GB2312" panose="02010609030101010101" pitchFamily="49" charset="-122"/>
-              </a:rPr>
-              <a:t> 上的数字。</a:t>
-            </a:r>
-          </a:p>
-        </p:txBody>
-      </p:sp>
-      <p:sp>
-        <p:nvSpPr>
-          <p:cNvPr id="13" name="下箭头 12">
-            <a:extLst>
-              <a:ext uri="{FF2B5EF4-FFF2-40B4-BE49-F238E27FC236}">
-                <a16:creationId xmlns:a16="http://schemas.microsoft.com/office/drawing/2014/main" id="{5D989D88-E870-BD4C-9F7C-00D7452AA52E}"/>
-              </a:ext>
-            </a:extLst>
-          </p:cNvPr>
-          <p:cNvSpPr/>
-          <p:nvPr/>
-        </p:nvSpPr>
-        <p:spPr>
-          <a:xfrm>
-            <a:off x="5731680" y="2750545"/>
-            <a:ext cx="245470" cy="380245"/>
+            <a:off x="5174028" y="2318940"/>
+            <a:ext cx="1086096" cy="481742"/>
           </a:xfrm>
           <a:prstGeom prst="downArrow">
             <a:avLst/>
@@ -4057,6 +3986,180 @@
           <a:p>
             <a:pPr algn="ctr"/>
             <a:endParaRPr kumimoji="1" lang="zh-CN" altLang="en-US"/>
+          </a:p>
+        </p:txBody>
+      </p:sp>
+      <p:sp>
+        <p:nvSpPr>
+          <p:cNvPr id="16" name="矩形 15">
+            <a:extLst>
+              <a:ext uri="{FF2B5EF4-FFF2-40B4-BE49-F238E27FC236}">
+                <a16:creationId xmlns:a16="http://schemas.microsoft.com/office/drawing/2014/main" id="{AB3D0B29-AC83-664C-BA4A-D697D35879DE}"/>
+              </a:ext>
+            </a:extLst>
+          </p:cNvPr>
+          <p:cNvSpPr/>
+          <p:nvPr/>
+        </p:nvSpPr>
+        <p:spPr>
+          <a:xfrm>
+            <a:off x="5041904" y="1776127"/>
+            <a:ext cx="5303631" cy="400110"/>
+          </a:xfrm>
+          <a:prstGeom prst="rect">
+            <a:avLst/>
+          </a:prstGeom>
+        </p:spPr>
+        <p:txBody>
+          <a:bodyPr wrap="square">
+            <a:spAutoFit/>
+          </a:bodyPr>
+          <a:lstStyle/>
+          <a:p>
+            <a:r>
+              <a:rPr kumimoji="1" lang="zh-CN" altLang="en-US" sz="2000" dirty="0">
+                <a:latin typeface="Times New Roman" charset="0"/>
+                <a:ea typeface="楷体_GB2312" panose="02010609030101010101" pitchFamily="49" charset="-122"/>
+              </a:rPr>
+              <a:t>接下来还看索引 </a:t>
+            </a:r>
+            <a:r>
+              <a:rPr kumimoji="1" lang="en-US" altLang="zh-CN" sz="2000" dirty="0">
+                <a:latin typeface="Times New Roman" charset="0"/>
+                <a:ea typeface="楷体_GB2312" panose="02010609030101010101" pitchFamily="49" charset="-122"/>
+              </a:rPr>
+              <a:t>1</a:t>
+            </a:r>
+            <a:r>
+              <a:rPr kumimoji="1" lang="zh-CN" altLang="en-US" sz="2000" dirty="0">
+                <a:latin typeface="Times New Roman" charset="0"/>
+                <a:ea typeface="楷体_GB2312" panose="02010609030101010101" pitchFamily="49" charset="-122"/>
+              </a:rPr>
+              <a:t> 上的数字。</a:t>
+            </a:r>
+          </a:p>
+        </p:txBody>
+      </p:sp>
+      <p:sp>
+        <p:nvSpPr>
+          <p:cNvPr id="9" name="矩形 8">
+            <a:extLst>
+              <a:ext uri="{FF2B5EF4-FFF2-40B4-BE49-F238E27FC236}">
+                <a16:creationId xmlns:a16="http://schemas.microsoft.com/office/drawing/2014/main" id="{A9EEF644-30EF-5449-BDB9-1034BEDE12A7}"/>
+              </a:ext>
+            </a:extLst>
+          </p:cNvPr>
+          <p:cNvSpPr/>
+          <p:nvPr/>
+        </p:nvSpPr>
+        <p:spPr>
+          <a:xfrm>
+            <a:off x="753897" y="1297746"/>
+            <a:ext cx="4578497" cy="461665"/>
+          </a:xfrm>
+          <a:prstGeom prst="rect">
+            <a:avLst/>
+          </a:prstGeom>
+        </p:spPr>
+        <p:txBody>
+          <a:bodyPr wrap="none">
+            <a:spAutoFit/>
+          </a:bodyPr>
+          <a:lstStyle/>
+          <a:p>
+            <a:r>
+              <a:rPr lang="zh-CN" altLang="en-US" sz="2400" dirty="0">
+                <a:latin typeface="Times New Roman" panose="02020603050405020304" pitchFamily="18" charset="0"/>
+                <a:ea typeface="KaiTi_GB2312" panose="02010609030101010101" pitchFamily="49" charset="-122"/>
+                <a:cs typeface="Times New Roman" panose="02020603050405020304" pitchFamily="18" charset="0"/>
+              </a:rPr>
+              <a:t>以示例 </a:t>
+            </a:r>
+            <a:r>
+              <a:rPr lang="en-US" altLang="zh-CN" sz="2400" dirty="0">
+                <a:latin typeface="Times New Roman" panose="02020603050405020304" pitchFamily="18" charset="0"/>
+                <a:ea typeface="KaiTi_GB2312" panose="02010609030101010101" pitchFamily="49" charset="-122"/>
+                <a:cs typeface="Times New Roman" panose="02020603050405020304" pitchFamily="18" charset="0"/>
+              </a:rPr>
+              <a:t>2</a:t>
+            </a:r>
+            <a:r>
+              <a:rPr lang="zh-CN" altLang="en-US" sz="2400" dirty="0">
+                <a:latin typeface="Times New Roman" panose="02020603050405020304" pitchFamily="18" charset="0"/>
+                <a:ea typeface="KaiTi_GB2312" panose="02010609030101010101" pitchFamily="49" charset="-122"/>
+                <a:cs typeface="Times New Roman" panose="02020603050405020304" pitchFamily="18" charset="0"/>
+              </a:rPr>
+              <a:t> 输入: [</a:t>
+            </a:r>
+            <a:r>
+              <a:rPr lang="en-US" altLang="zh-CN" sz="2400" dirty="0">
+                <a:latin typeface="Times New Roman" panose="02020603050405020304" pitchFamily="18" charset="0"/>
+                <a:ea typeface="KaiTi_GB2312" panose="02010609030101010101" pitchFamily="49" charset="-122"/>
+                <a:cs typeface="Times New Roman" panose="02020603050405020304" pitchFamily="18" charset="0"/>
+              </a:rPr>
+              <a:t>3</a:t>
+            </a:r>
+            <a:r>
+              <a:rPr lang="zh-CN" altLang="en-US" sz="2400" dirty="0">
+                <a:latin typeface="Times New Roman" panose="02020603050405020304" pitchFamily="18" charset="0"/>
+                <a:ea typeface="KaiTi_GB2312" panose="02010609030101010101" pitchFamily="49" charset="-122"/>
+                <a:cs typeface="Times New Roman" panose="02020603050405020304" pitchFamily="18" charset="0"/>
+              </a:rPr>
+              <a:t>, </a:t>
+            </a:r>
+            <a:r>
+              <a:rPr lang="en-US" altLang="zh-CN" sz="2400" dirty="0">
+                <a:latin typeface="Times New Roman" panose="02020603050405020304" pitchFamily="18" charset="0"/>
+                <a:ea typeface="KaiTi_GB2312" panose="02010609030101010101" pitchFamily="49" charset="-122"/>
+                <a:cs typeface="Times New Roman" panose="02020603050405020304" pitchFamily="18" charset="0"/>
+              </a:rPr>
+              <a:t>4</a:t>
+            </a:r>
+            <a:r>
+              <a:rPr lang="zh-CN" altLang="en-US" sz="2400" dirty="0">
+                <a:latin typeface="Times New Roman" panose="02020603050405020304" pitchFamily="18" charset="0"/>
+                <a:ea typeface="KaiTi_GB2312" panose="02010609030101010101" pitchFamily="49" charset="-122"/>
+                <a:cs typeface="Times New Roman" panose="02020603050405020304" pitchFamily="18" charset="0"/>
+              </a:rPr>
+              <a:t>, </a:t>
+            </a:r>
+            <a:r>
+              <a:rPr lang="en-US" altLang="zh-CN" sz="2400" dirty="0">
+                <a:latin typeface="Times New Roman" panose="02020603050405020304" pitchFamily="18" charset="0"/>
+                <a:ea typeface="KaiTi_GB2312" panose="02010609030101010101" pitchFamily="49" charset="-122"/>
+                <a:cs typeface="Times New Roman" panose="02020603050405020304" pitchFamily="18" charset="0"/>
+              </a:rPr>
+              <a:t>-1</a:t>
+            </a:r>
+            <a:r>
+              <a:rPr lang="zh-CN" altLang="en-US" sz="2400" dirty="0">
+                <a:latin typeface="Times New Roman" panose="02020603050405020304" pitchFamily="18" charset="0"/>
+                <a:ea typeface="KaiTi_GB2312" panose="02010609030101010101" pitchFamily="49" charset="-122"/>
+                <a:cs typeface="Times New Roman" panose="02020603050405020304" pitchFamily="18" charset="0"/>
+              </a:rPr>
+              <a:t>, </a:t>
+            </a:r>
+            <a:r>
+              <a:rPr lang="en-US" altLang="zh-CN" sz="2400" dirty="0">
+                <a:latin typeface="Times New Roman" panose="02020603050405020304" pitchFamily="18" charset="0"/>
+                <a:ea typeface="KaiTi_GB2312" panose="02010609030101010101" pitchFamily="49" charset="-122"/>
+                <a:cs typeface="Times New Roman" panose="02020603050405020304" pitchFamily="18" charset="0"/>
+              </a:rPr>
+              <a:t>1</a:t>
+            </a:r>
+            <a:r>
+              <a:rPr lang="zh-CN" altLang="en-US" sz="2400" dirty="0">
+                <a:latin typeface="Times New Roman" panose="02020603050405020304" pitchFamily="18" charset="0"/>
+                <a:ea typeface="KaiTi_GB2312" panose="02010609030101010101" pitchFamily="49" charset="-122"/>
+                <a:cs typeface="Times New Roman" panose="02020603050405020304" pitchFamily="18" charset="0"/>
+              </a:rPr>
+              <a:t>] 为例。</a:t>
+            </a:r>
+            <a:endParaRPr lang="en-US" altLang="zh-CN" sz="2400" dirty="0">
+              <a:latin typeface="Times New Roman" panose="02020603050405020304" pitchFamily="18" charset="0"/>
+              <a:ea typeface="KaiTi_GB2312" panose="02010609030101010101" pitchFamily="49" charset="-122"/>
+              <a:cs typeface="Times New Roman" panose="02020603050405020304" pitchFamily="18" charset="0"/>
+            </a:endParaRPr>
           </a:p>
         </p:txBody>
       </p:sp>
@@ -4200,8 +4303,8 @@
         </p:nvSpPr>
         <p:spPr>
           <a:xfrm>
-            <a:off x="6539162" y="5133383"/>
-            <a:ext cx="3437177" cy="923330"/>
+            <a:off x="348793" y="5967603"/>
+            <a:ext cx="11617568" cy="461665"/>
           </a:xfrm>
           <a:prstGeom prst="rect">
             <a:avLst/>
@@ -4213,216 +4316,49 @@
           </a:bodyPr>
           <a:lstStyle/>
           <a:p>
-            <a:r>
-              <a:rPr kumimoji="1" lang="zh-CN" altLang="en-US" dirty="0">
+            <a:pPr marL="342900" indent="-342900">
+              <a:buFont typeface="Wingdings" pitchFamily="2" charset="2"/>
+              <a:buChar char="l"/>
+            </a:pPr>
+            <a:r>
+              <a:rPr kumimoji="1" lang="zh-CN" altLang="en-US" sz="2400" dirty="0">
                 <a:latin typeface="Times New Roman" charset="0"/>
                 <a:ea typeface="楷体_GB2312" panose="02010609030101010101" pitchFamily="49" charset="-122"/>
               </a:rPr>
               <a:t>因为之前交换的操作，索引 </a:t>
             </a:r>
             <a:r>
-              <a:rPr kumimoji="1" lang="en-US" altLang="zh-CN" dirty="0">
+              <a:rPr kumimoji="1" lang="en-US" altLang="zh-CN" sz="2400" dirty="0">
                 <a:latin typeface="Times New Roman" charset="0"/>
                 <a:ea typeface="楷体_GB2312" panose="02010609030101010101" pitchFamily="49" charset="-122"/>
               </a:rPr>
               <a:t>2</a:t>
             </a:r>
             <a:r>
-              <a:rPr kumimoji="1" lang="zh-CN" altLang="en-US" dirty="0">
+              <a:rPr kumimoji="1" lang="zh-CN" altLang="en-US" sz="2400" dirty="0">
                 <a:latin typeface="Times New Roman" charset="0"/>
                 <a:ea typeface="楷体_GB2312" panose="02010609030101010101" pitchFamily="49" charset="-122"/>
               </a:rPr>
               <a:t> 上现在放置的数字 </a:t>
             </a:r>
             <a:r>
-              <a:rPr kumimoji="1" lang="en-US" altLang="zh-CN" dirty="0">
+              <a:rPr kumimoji="1" lang="en-US" altLang="zh-CN" sz="2400" dirty="0">
                 <a:latin typeface="Times New Roman" charset="0"/>
                 <a:ea typeface="楷体_GB2312" panose="02010609030101010101" pitchFamily="49" charset="-122"/>
               </a:rPr>
               <a:t>3</a:t>
             </a:r>
             <a:r>
-              <a:rPr kumimoji="1" lang="zh-CN" altLang="en-US" dirty="0">
+              <a:rPr kumimoji="1" lang="zh-CN" altLang="en-US" sz="2400" dirty="0">
                 <a:latin typeface="Times New Roman" charset="0"/>
                 <a:ea typeface="楷体_GB2312" panose="02010609030101010101" pitchFamily="49" charset="-122"/>
               </a:rPr>
               <a:t> 放对了，接下来看下一个索引。</a:t>
             </a:r>
-            <a:endParaRPr kumimoji="1" lang="en-US" altLang="zh-CN" dirty="0">
+            <a:endParaRPr kumimoji="1" lang="en-US" altLang="zh-CN" sz="2400" dirty="0">
               <a:latin typeface="Times New Roman" charset="0"/>
               <a:ea typeface="楷体_GB2312" panose="02010609030101010101" pitchFamily="49" charset="-122"/>
             </a:endParaRPr>
-          </a:p>
-        </p:txBody>
-      </p:sp>
-      <p:sp>
-        <p:nvSpPr>
-          <p:cNvPr id="8" name="文本框 7">
-            <a:extLst>
-              <a:ext uri="{FF2B5EF4-FFF2-40B4-BE49-F238E27FC236}">
-                <a16:creationId xmlns:a16="http://schemas.microsoft.com/office/drawing/2014/main" id="{5E099540-E4D0-994C-B852-E4710C717369}"/>
-              </a:ext>
-            </a:extLst>
-          </p:cNvPr>
-          <p:cNvSpPr txBox="1"/>
-          <p:nvPr/>
-        </p:nvSpPr>
-        <p:spPr>
-          <a:xfrm flipH="1">
-            <a:off x="804680" y="873508"/>
-            <a:ext cx="5011657" cy="461665"/>
-          </a:xfrm>
-          <a:prstGeom prst="rect">
-            <a:avLst/>
-          </a:prstGeom>
-          <a:solidFill>
-            <a:srgbClr val="FF0000"/>
-          </a:solidFill>
-          <a:ln>
-            <a:noFill/>
-          </a:ln>
-          <a:effectLst>
-            <a:outerShdw blurRad="50800" dist="38100" dir="2700000" algn="tl" rotWithShape="0">
-              <a:prstClr val="black">
-                <a:alpha val="40000"/>
-              </a:prstClr>
-            </a:outerShdw>
-          </a:effectLst>
-        </p:spPr>
-        <p:txBody>
-          <a:bodyPr wrap="square" rtlCol="0">
-            <a:spAutoFit/>
-          </a:bodyPr>
-          <a:lstStyle/>
-          <a:p>
-            <a:pPr marL="342900" indent="-342900">
-              <a:buFont typeface="Wingdings" pitchFamily="2" charset="2"/>
-              <a:buChar char="Ø"/>
-            </a:pPr>
-            <a:r>
-              <a:rPr kumimoji="1" lang="zh-CN" altLang="en-US" sz="2400" b="1" dirty="0">
-                <a:solidFill>
-                  <a:schemeClr val="bg1"/>
-                </a:solidFill>
-                <a:latin typeface="Times New Roman" panose="02020603050405020304" pitchFamily="18" charset="0"/>
-                <a:ea typeface="KaiTi_GB2312" panose="02010609030101010101" pitchFamily="49" charset="-122"/>
-                <a:cs typeface="Times New Roman" panose="02020603050405020304" pitchFamily="18" charset="0"/>
-              </a:rPr>
-              <a:t>思想：桶排序，一个萝卜一个坑。</a:t>
-            </a:r>
-          </a:p>
-        </p:txBody>
-      </p:sp>
-      <p:sp>
-        <p:nvSpPr>
-          <p:cNvPr id="9" name="矩形 8">
-            <a:extLst>
-              <a:ext uri="{FF2B5EF4-FFF2-40B4-BE49-F238E27FC236}">
-                <a16:creationId xmlns:a16="http://schemas.microsoft.com/office/drawing/2014/main" id="{9D3778D1-2D98-0543-B260-29412CDAD275}"/>
-              </a:ext>
-            </a:extLst>
-          </p:cNvPr>
-          <p:cNvSpPr/>
-          <p:nvPr/>
-        </p:nvSpPr>
-        <p:spPr>
-          <a:xfrm>
-            <a:off x="729875" y="1536242"/>
-            <a:ext cx="3490058" cy="369332"/>
-          </a:xfrm>
-          <a:prstGeom prst="rect">
-            <a:avLst/>
-          </a:prstGeom>
-        </p:spPr>
-        <p:txBody>
-          <a:bodyPr wrap="none">
-            <a:spAutoFit/>
-          </a:bodyPr>
-          <a:lstStyle/>
-          <a:p>
-            <a:r>
-              <a:rPr lang="zh-CN" altLang="en-US" dirty="0"/>
-              <a:t>以示例 </a:t>
-            </a:r>
-            <a:r>
-              <a:rPr lang="en-US" altLang="zh-CN" dirty="0">
-                <a:latin typeface="Times New Roman" panose="02020603050405020304" pitchFamily="18" charset="0"/>
-                <a:cs typeface="Times New Roman" panose="02020603050405020304" pitchFamily="18" charset="0"/>
-              </a:rPr>
-              <a:t>2</a:t>
-            </a:r>
-            <a:r>
-              <a:rPr lang="zh-CN" altLang="en-US" dirty="0"/>
-              <a:t> 输入</a:t>
-            </a:r>
-            <a:r>
-              <a:rPr lang="zh-CN" altLang="en-US" dirty="0">
-                <a:latin typeface="Times New Roman" panose="02020603050405020304" pitchFamily="18" charset="0"/>
-                <a:cs typeface="Times New Roman" panose="02020603050405020304" pitchFamily="18" charset="0"/>
-              </a:rPr>
-              <a:t>: [</a:t>
-            </a:r>
-            <a:r>
-              <a:rPr lang="en-US" altLang="zh-CN" dirty="0">
-                <a:latin typeface="Times New Roman" panose="02020603050405020304" pitchFamily="18" charset="0"/>
-                <a:cs typeface="Times New Roman" panose="02020603050405020304" pitchFamily="18" charset="0"/>
-              </a:rPr>
-              <a:t>3</a:t>
-            </a:r>
-            <a:r>
-              <a:rPr lang="zh-CN" altLang="en-US" dirty="0">
-                <a:latin typeface="Times New Roman" panose="02020603050405020304" pitchFamily="18" charset="0"/>
-                <a:cs typeface="Times New Roman" panose="02020603050405020304" pitchFamily="18" charset="0"/>
-              </a:rPr>
-              <a:t>, </a:t>
-            </a:r>
-            <a:r>
-              <a:rPr lang="en-US" altLang="zh-CN" dirty="0">
-                <a:latin typeface="Times New Roman" panose="02020603050405020304" pitchFamily="18" charset="0"/>
-                <a:cs typeface="Times New Roman" panose="02020603050405020304" pitchFamily="18" charset="0"/>
-              </a:rPr>
-              <a:t>4</a:t>
-            </a:r>
-            <a:r>
-              <a:rPr lang="zh-CN" altLang="en-US" dirty="0">
-                <a:latin typeface="Times New Roman" panose="02020603050405020304" pitchFamily="18" charset="0"/>
-                <a:cs typeface="Times New Roman" panose="02020603050405020304" pitchFamily="18" charset="0"/>
-              </a:rPr>
-              <a:t>, </a:t>
-            </a:r>
-            <a:r>
-              <a:rPr lang="en-US" altLang="zh-CN" dirty="0">
-                <a:latin typeface="Times New Roman" panose="02020603050405020304" pitchFamily="18" charset="0"/>
-                <a:cs typeface="Times New Roman" panose="02020603050405020304" pitchFamily="18" charset="0"/>
-              </a:rPr>
-              <a:t>-1</a:t>
-            </a:r>
-            <a:r>
-              <a:rPr lang="zh-CN" altLang="en-US" dirty="0">
-                <a:latin typeface="Times New Roman" panose="02020603050405020304" pitchFamily="18" charset="0"/>
-                <a:cs typeface="Times New Roman" panose="02020603050405020304" pitchFamily="18" charset="0"/>
-              </a:rPr>
-              <a:t>, </a:t>
-            </a:r>
-            <a:r>
-              <a:rPr lang="en-US" altLang="zh-CN" dirty="0">
-                <a:latin typeface="Times New Roman" panose="02020603050405020304" pitchFamily="18" charset="0"/>
-                <a:cs typeface="Times New Roman" panose="02020603050405020304" pitchFamily="18" charset="0"/>
-              </a:rPr>
-              <a:t>1</a:t>
-            </a:r>
-            <a:r>
-              <a:rPr lang="zh-CN" altLang="en-US" dirty="0">
-                <a:latin typeface="Times New Roman" panose="02020603050405020304" pitchFamily="18" charset="0"/>
-                <a:cs typeface="Times New Roman" panose="02020603050405020304" pitchFamily="18" charset="0"/>
-              </a:rPr>
-              <a:t>] </a:t>
-            </a:r>
-            <a:r>
-              <a:rPr lang="zh-CN" altLang="en-US" dirty="0"/>
-              <a:t>为例。</a:t>
-            </a:r>
-            <a:endParaRPr lang="en-US" altLang="zh-CN" dirty="0"/>
           </a:p>
         </p:txBody>
       </p:sp>
@@ -4448,8 +4384,8 @@
         </p:blipFill>
         <p:spPr>
           <a:xfrm>
-            <a:off x="4034008" y="3337766"/>
-            <a:ext cx="4775846" cy="1640558"/>
+            <a:off x="2880000" y="2880000"/>
+            <a:ext cx="7335999" cy="2520000"/>
           </a:xfrm>
           <a:prstGeom prst="rect">
             <a:avLst/>
@@ -4458,10 +4394,68 @@
       </p:pic>
       <p:sp>
         <p:nvSpPr>
-          <p:cNvPr id="11" name="矩形 10">
+          <p:cNvPr id="13" name="文本框 12">
             <a:extLst>
               <a:ext uri="{FF2B5EF4-FFF2-40B4-BE49-F238E27FC236}">
-                <a16:creationId xmlns:a16="http://schemas.microsoft.com/office/drawing/2014/main" id="{246987C5-8E7F-E740-8E6E-279D5DD334AA}"/>
+                <a16:creationId xmlns:a16="http://schemas.microsoft.com/office/drawing/2014/main" id="{AD83F5AB-7431-EE45-BE8C-D8B45B8CABB9}"/>
+              </a:ext>
+            </a:extLst>
+          </p:cNvPr>
+          <p:cNvSpPr txBox="1"/>
+          <p:nvPr/>
+        </p:nvSpPr>
+        <p:spPr>
+          <a:xfrm flipH="1">
+            <a:off x="804679" y="781316"/>
+            <a:ext cx="8474450" cy="461665"/>
+          </a:xfrm>
+          <a:prstGeom prst="rect">
+            <a:avLst/>
+          </a:prstGeom>
+          <a:solidFill>
+            <a:srgbClr val="FF0000"/>
+          </a:solidFill>
+          <a:ln>
+            <a:noFill/>
+          </a:ln>
+          <a:effectLst>
+            <a:outerShdw blurRad="50800" dist="38100" dir="2700000" algn="tl" rotWithShape="0">
+              <a:prstClr val="black">
+                <a:alpha val="40000"/>
+              </a:prstClr>
+            </a:outerShdw>
+          </a:effectLst>
+        </p:spPr>
+        <p:txBody>
+          <a:bodyPr wrap="square" rtlCol="0">
+            <a:spAutoFit/>
+          </a:bodyPr>
+          <a:lstStyle/>
+          <a:p>
+            <a:pPr marL="342900" indent="-342900">
+              <a:buFont typeface="Wingdings" pitchFamily="2" charset="2"/>
+              <a:buChar char="Ø"/>
+            </a:pPr>
+            <a:r>
+              <a:rPr kumimoji="1" lang="zh-CN" altLang="en-US" sz="2400" b="1" dirty="0">
+                <a:solidFill>
+                  <a:schemeClr val="bg1"/>
+                </a:solidFill>
+                <a:latin typeface="Times New Roman" panose="02020603050405020304" pitchFamily="18" charset="0"/>
+                <a:ea typeface="KaiTi_GB2312" panose="02010609030101010101" pitchFamily="49" charset="-122"/>
+                <a:cs typeface="Times New Roman" panose="02020603050405020304" pitchFamily="18" charset="0"/>
+              </a:rPr>
+              <a:t>思想：桶排序（一个萝卜一个坑）、抽屉原理、鸽巢原理。</a:t>
+            </a:r>
+          </a:p>
+        </p:txBody>
+      </p:sp>
+      <p:sp>
+        <p:nvSpPr>
+          <p:cNvPr id="15" name="下箭头 14">
+            <a:extLst>
+              <a:ext uri="{FF2B5EF4-FFF2-40B4-BE49-F238E27FC236}">
+                <a16:creationId xmlns:a16="http://schemas.microsoft.com/office/drawing/2014/main" id="{8E141227-53AF-B849-B0E1-D1319EFE47EE}"/>
               </a:ext>
             </a:extLst>
           </p:cNvPr>
@@ -4470,59 +4464,8 @@
         </p:nvSpPr>
         <p:spPr>
           <a:xfrm>
-            <a:off x="6283195" y="2286135"/>
-            <a:ext cx="5303631" cy="369332"/>
-          </a:xfrm>
-          <a:prstGeom prst="rect">
-            <a:avLst/>
-          </a:prstGeom>
-        </p:spPr>
-        <p:txBody>
-          <a:bodyPr wrap="square">
-            <a:spAutoFit/>
-          </a:bodyPr>
-          <a:lstStyle/>
-          <a:p>
-            <a:r>
-              <a:rPr kumimoji="1" lang="zh-CN" altLang="en-US" dirty="0">
-                <a:latin typeface="Times New Roman" charset="0"/>
-                <a:ea typeface="楷体_GB2312" panose="02010609030101010101" pitchFamily="49" charset="-122"/>
-              </a:rPr>
-              <a:t>接下来还看索引 </a:t>
-            </a:r>
-            <a:r>
-              <a:rPr kumimoji="1" lang="en-US" altLang="zh-CN" dirty="0">
-                <a:latin typeface="Times New Roman" charset="0"/>
-                <a:ea typeface="楷体_GB2312" panose="02010609030101010101" pitchFamily="49" charset="-122"/>
-              </a:rPr>
-              <a:t>2</a:t>
-            </a:r>
-            <a:r>
-              <a:rPr kumimoji="1" lang="zh-CN" altLang="en-US" dirty="0">
-                <a:latin typeface="Times New Roman" charset="0"/>
-                <a:ea typeface="楷体_GB2312" panose="02010609030101010101" pitchFamily="49" charset="-122"/>
-              </a:rPr>
-              <a:t> 上的数字。</a:t>
-            </a:r>
-          </a:p>
-        </p:txBody>
-      </p:sp>
-      <p:sp>
-        <p:nvSpPr>
-          <p:cNvPr id="12" name="下箭头 11">
-            <a:extLst>
-              <a:ext uri="{FF2B5EF4-FFF2-40B4-BE49-F238E27FC236}">
-                <a16:creationId xmlns:a16="http://schemas.microsoft.com/office/drawing/2014/main" id="{1733AD5E-0231-5A49-A819-988DE4C0873D}"/>
-              </a:ext>
-            </a:extLst>
-          </p:cNvPr>
-          <p:cNvSpPr/>
-          <p:nvPr/>
-        </p:nvSpPr>
-        <p:spPr>
-          <a:xfrm>
-            <a:off x="6880542" y="2750545"/>
-            <a:ext cx="245470" cy="380245"/>
+            <a:off x="6920766" y="2318940"/>
+            <a:ext cx="1086096" cy="481742"/>
           </a:xfrm>
           <a:prstGeom prst="downArrow">
             <a:avLst/>
@@ -4556,6 +4499,180 @@
           <a:p>
             <a:pPr algn="ctr"/>
             <a:endParaRPr kumimoji="1" lang="zh-CN" altLang="en-US"/>
+          </a:p>
+        </p:txBody>
+      </p:sp>
+      <p:sp>
+        <p:nvSpPr>
+          <p:cNvPr id="16" name="矩形 15">
+            <a:extLst>
+              <a:ext uri="{FF2B5EF4-FFF2-40B4-BE49-F238E27FC236}">
+                <a16:creationId xmlns:a16="http://schemas.microsoft.com/office/drawing/2014/main" id="{C17F0536-5D6E-AE4B-8A85-49AB50EDC996}"/>
+              </a:ext>
+            </a:extLst>
+          </p:cNvPr>
+          <p:cNvSpPr/>
+          <p:nvPr/>
+        </p:nvSpPr>
+        <p:spPr>
+          <a:xfrm>
+            <a:off x="6788642" y="1776127"/>
+            <a:ext cx="5303631" cy="400110"/>
+          </a:xfrm>
+          <a:prstGeom prst="rect">
+            <a:avLst/>
+          </a:prstGeom>
+        </p:spPr>
+        <p:txBody>
+          <a:bodyPr wrap="square">
+            <a:spAutoFit/>
+          </a:bodyPr>
+          <a:lstStyle/>
+          <a:p>
+            <a:r>
+              <a:rPr kumimoji="1" lang="zh-CN" altLang="en-US" sz="2000" dirty="0">
+                <a:latin typeface="Times New Roman" charset="0"/>
+                <a:ea typeface="楷体_GB2312" panose="02010609030101010101" pitchFamily="49" charset="-122"/>
+              </a:rPr>
+              <a:t>接下来看索引 </a:t>
+            </a:r>
+            <a:r>
+              <a:rPr kumimoji="1" lang="en-US" altLang="zh-CN" sz="2000" dirty="0">
+                <a:latin typeface="Times New Roman" charset="0"/>
+                <a:ea typeface="楷体_GB2312" panose="02010609030101010101" pitchFamily="49" charset="-122"/>
+              </a:rPr>
+              <a:t>2</a:t>
+            </a:r>
+            <a:r>
+              <a:rPr kumimoji="1" lang="zh-CN" altLang="en-US" sz="2000" dirty="0">
+                <a:latin typeface="Times New Roman" charset="0"/>
+                <a:ea typeface="楷体_GB2312" panose="02010609030101010101" pitchFamily="49" charset="-122"/>
+              </a:rPr>
+              <a:t> 上的数字。</a:t>
+            </a:r>
+          </a:p>
+        </p:txBody>
+      </p:sp>
+      <p:sp>
+        <p:nvSpPr>
+          <p:cNvPr id="9" name="矩形 8">
+            <a:extLst>
+              <a:ext uri="{FF2B5EF4-FFF2-40B4-BE49-F238E27FC236}">
+                <a16:creationId xmlns:a16="http://schemas.microsoft.com/office/drawing/2014/main" id="{C0D7FAE6-274E-0D46-A276-32D23B4BA91D}"/>
+              </a:ext>
+            </a:extLst>
+          </p:cNvPr>
+          <p:cNvSpPr/>
+          <p:nvPr/>
+        </p:nvSpPr>
+        <p:spPr>
+          <a:xfrm>
+            <a:off x="753897" y="1297746"/>
+            <a:ext cx="4578497" cy="461665"/>
+          </a:xfrm>
+          <a:prstGeom prst="rect">
+            <a:avLst/>
+          </a:prstGeom>
+        </p:spPr>
+        <p:txBody>
+          <a:bodyPr wrap="none">
+            <a:spAutoFit/>
+          </a:bodyPr>
+          <a:lstStyle/>
+          <a:p>
+            <a:r>
+              <a:rPr lang="zh-CN" altLang="en-US" sz="2400" dirty="0">
+                <a:latin typeface="Times New Roman" panose="02020603050405020304" pitchFamily="18" charset="0"/>
+                <a:ea typeface="KaiTi_GB2312" panose="02010609030101010101" pitchFamily="49" charset="-122"/>
+                <a:cs typeface="Times New Roman" panose="02020603050405020304" pitchFamily="18" charset="0"/>
+              </a:rPr>
+              <a:t>以示例 </a:t>
+            </a:r>
+            <a:r>
+              <a:rPr lang="en-US" altLang="zh-CN" sz="2400" dirty="0">
+                <a:latin typeface="Times New Roman" panose="02020603050405020304" pitchFamily="18" charset="0"/>
+                <a:ea typeface="KaiTi_GB2312" panose="02010609030101010101" pitchFamily="49" charset="-122"/>
+                <a:cs typeface="Times New Roman" panose="02020603050405020304" pitchFamily="18" charset="0"/>
+              </a:rPr>
+              <a:t>2</a:t>
+            </a:r>
+            <a:r>
+              <a:rPr lang="zh-CN" altLang="en-US" sz="2400" dirty="0">
+                <a:latin typeface="Times New Roman" panose="02020603050405020304" pitchFamily="18" charset="0"/>
+                <a:ea typeface="KaiTi_GB2312" panose="02010609030101010101" pitchFamily="49" charset="-122"/>
+                <a:cs typeface="Times New Roman" panose="02020603050405020304" pitchFamily="18" charset="0"/>
+              </a:rPr>
+              <a:t> 输入: [</a:t>
+            </a:r>
+            <a:r>
+              <a:rPr lang="en-US" altLang="zh-CN" sz="2400" dirty="0">
+                <a:latin typeface="Times New Roman" panose="02020603050405020304" pitchFamily="18" charset="0"/>
+                <a:ea typeface="KaiTi_GB2312" panose="02010609030101010101" pitchFamily="49" charset="-122"/>
+                <a:cs typeface="Times New Roman" panose="02020603050405020304" pitchFamily="18" charset="0"/>
+              </a:rPr>
+              <a:t>3</a:t>
+            </a:r>
+            <a:r>
+              <a:rPr lang="zh-CN" altLang="en-US" sz="2400" dirty="0">
+                <a:latin typeface="Times New Roman" panose="02020603050405020304" pitchFamily="18" charset="0"/>
+                <a:ea typeface="KaiTi_GB2312" panose="02010609030101010101" pitchFamily="49" charset="-122"/>
+                <a:cs typeface="Times New Roman" panose="02020603050405020304" pitchFamily="18" charset="0"/>
+              </a:rPr>
+              <a:t>, </a:t>
+            </a:r>
+            <a:r>
+              <a:rPr lang="en-US" altLang="zh-CN" sz="2400" dirty="0">
+                <a:latin typeface="Times New Roman" panose="02020603050405020304" pitchFamily="18" charset="0"/>
+                <a:ea typeface="KaiTi_GB2312" panose="02010609030101010101" pitchFamily="49" charset="-122"/>
+                <a:cs typeface="Times New Roman" panose="02020603050405020304" pitchFamily="18" charset="0"/>
+              </a:rPr>
+              <a:t>4</a:t>
+            </a:r>
+            <a:r>
+              <a:rPr lang="zh-CN" altLang="en-US" sz="2400" dirty="0">
+                <a:latin typeface="Times New Roman" panose="02020603050405020304" pitchFamily="18" charset="0"/>
+                <a:ea typeface="KaiTi_GB2312" panose="02010609030101010101" pitchFamily="49" charset="-122"/>
+                <a:cs typeface="Times New Roman" panose="02020603050405020304" pitchFamily="18" charset="0"/>
+              </a:rPr>
+              <a:t>, </a:t>
+            </a:r>
+            <a:r>
+              <a:rPr lang="en-US" altLang="zh-CN" sz="2400" dirty="0">
+                <a:latin typeface="Times New Roman" panose="02020603050405020304" pitchFamily="18" charset="0"/>
+                <a:ea typeface="KaiTi_GB2312" panose="02010609030101010101" pitchFamily="49" charset="-122"/>
+                <a:cs typeface="Times New Roman" panose="02020603050405020304" pitchFamily="18" charset="0"/>
+              </a:rPr>
+              <a:t>-1</a:t>
+            </a:r>
+            <a:r>
+              <a:rPr lang="zh-CN" altLang="en-US" sz="2400" dirty="0">
+                <a:latin typeface="Times New Roman" panose="02020603050405020304" pitchFamily="18" charset="0"/>
+                <a:ea typeface="KaiTi_GB2312" panose="02010609030101010101" pitchFamily="49" charset="-122"/>
+                <a:cs typeface="Times New Roman" panose="02020603050405020304" pitchFamily="18" charset="0"/>
+              </a:rPr>
+              <a:t>, </a:t>
+            </a:r>
+            <a:r>
+              <a:rPr lang="en-US" altLang="zh-CN" sz="2400" dirty="0">
+                <a:latin typeface="Times New Roman" panose="02020603050405020304" pitchFamily="18" charset="0"/>
+                <a:ea typeface="KaiTi_GB2312" panose="02010609030101010101" pitchFamily="49" charset="-122"/>
+                <a:cs typeface="Times New Roman" panose="02020603050405020304" pitchFamily="18" charset="0"/>
+              </a:rPr>
+              <a:t>1</a:t>
+            </a:r>
+            <a:r>
+              <a:rPr lang="zh-CN" altLang="en-US" sz="2400" dirty="0">
+                <a:latin typeface="Times New Roman" panose="02020603050405020304" pitchFamily="18" charset="0"/>
+                <a:ea typeface="KaiTi_GB2312" panose="02010609030101010101" pitchFamily="49" charset="-122"/>
+                <a:cs typeface="Times New Roman" panose="02020603050405020304" pitchFamily="18" charset="0"/>
+              </a:rPr>
+              <a:t>] 为例。</a:t>
+            </a:r>
+            <a:endParaRPr lang="en-US" altLang="zh-CN" sz="2400" dirty="0">
+              <a:latin typeface="Times New Roman" panose="02020603050405020304" pitchFamily="18" charset="0"/>
+              <a:ea typeface="KaiTi_GB2312" panose="02010609030101010101" pitchFamily="49" charset="-122"/>
+              <a:cs typeface="Times New Roman" panose="02020603050405020304" pitchFamily="18" charset="0"/>
+            </a:endParaRPr>
           </a:p>
         </p:txBody>
       </p:sp>
@@ -4699,8 +4816,8 @@
         </p:nvSpPr>
         <p:spPr>
           <a:xfrm>
-            <a:off x="4034008" y="5133383"/>
-            <a:ext cx="6245872" cy="923330"/>
+            <a:off x="172825" y="5503598"/>
+            <a:ext cx="12019175" cy="1200329"/>
           </a:xfrm>
           <a:prstGeom prst="rect">
             <a:avLst/>
@@ -4712,293 +4829,149 @@
           </a:bodyPr>
           <a:lstStyle/>
           <a:p>
-            <a:r>
-              <a:rPr kumimoji="1" lang="zh-CN" altLang="en-US" dirty="0">
+            <a:pPr marL="285750" indent="-285750">
+              <a:buFont typeface="Wingdings" pitchFamily="2" charset="2"/>
+              <a:buChar char="l"/>
+            </a:pPr>
+            <a:r>
+              <a:rPr kumimoji="1" lang="zh-CN" altLang="en-US" sz="2400" dirty="0">
                 <a:latin typeface="Times New Roman" charset="0"/>
                 <a:ea typeface="楷体_GB2312" panose="02010609030101010101" pitchFamily="49" charset="-122"/>
               </a:rPr>
               <a:t>因为之前交换的操作，索引 </a:t>
             </a:r>
             <a:r>
-              <a:rPr kumimoji="1" lang="en-US" altLang="zh-CN" dirty="0">
+              <a:rPr kumimoji="1" lang="en-US" altLang="zh-CN" sz="2400" dirty="0">
                 <a:latin typeface="Times New Roman" charset="0"/>
                 <a:ea typeface="楷体_GB2312" panose="02010609030101010101" pitchFamily="49" charset="-122"/>
               </a:rPr>
               <a:t>3</a:t>
             </a:r>
             <a:r>
-              <a:rPr kumimoji="1" lang="zh-CN" altLang="en-US" dirty="0">
+              <a:rPr kumimoji="1" lang="zh-CN" altLang="en-US" sz="2400" dirty="0">
                 <a:latin typeface="Times New Roman" charset="0"/>
                 <a:ea typeface="楷体_GB2312" panose="02010609030101010101" pitchFamily="49" charset="-122"/>
               </a:rPr>
               <a:t> 上现在放置的数字 </a:t>
             </a:r>
             <a:r>
-              <a:rPr kumimoji="1" lang="en-US" altLang="zh-CN" dirty="0">
+              <a:rPr kumimoji="1" lang="en-US" altLang="zh-CN" sz="2400" dirty="0">
                 <a:latin typeface="Times New Roman" charset="0"/>
                 <a:ea typeface="楷体_GB2312" panose="02010609030101010101" pitchFamily="49" charset="-122"/>
               </a:rPr>
               <a:t>4</a:t>
             </a:r>
             <a:r>
-              <a:rPr kumimoji="1" lang="zh-CN" altLang="en-US" dirty="0">
+              <a:rPr kumimoji="1" lang="zh-CN" altLang="en-US" sz="2400" dirty="0">
                 <a:latin typeface="Times New Roman" charset="0"/>
                 <a:ea typeface="楷体_GB2312" panose="02010609030101010101" pitchFamily="49" charset="-122"/>
               </a:rPr>
               <a:t> 放对了。</a:t>
             </a:r>
             <a:r>
-              <a:rPr kumimoji="1" lang="zh-CN" altLang="en-US" b="1" dirty="0">
+              <a:rPr kumimoji="1" lang="zh-CN" altLang="en-US" sz="2400" b="1" dirty="0">
                 <a:solidFill>
                   <a:srgbClr val="FF0000"/>
                 </a:solidFill>
                 <a:latin typeface="Times New Roman" charset="0"/>
                 <a:ea typeface="楷体_GB2312" panose="02010609030101010101" pitchFamily="49" charset="-122"/>
               </a:rPr>
-              <a:t>此时认为“桶排序”已经完成，现在需要从头到尾看一遍，找出第 </a:t>
-            </a:r>
-            <a:r>
-              <a:rPr kumimoji="1" lang="en-US" altLang="zh-CN" b="1" dirty="0">
-                <a:solidFill>
-                  <a:srgbClr val="FF0000"/>
-                </a:solidFill>
-                <a:latin typeface="Times New Roman" charset="0"/>
-                <a:ea typeface="楷体_GB2312" panose="02010609030101010101" pitchFamily="49" charset="-122"/>
-              </a:rPr>
-              <a:t>1</a:t>
-            </a:r>
-            <a:r>
-              <a:rPr kumimoji="1" lang="zh-CN" altLang="en-US" b="1" dirty="0">
-                <a:solidFill>
-                  <a:srgbClr val="FF0000"/>
-                </a:solidFill>
-                <a:latin typeface="Times New Roman" charset="0"/>
-                <a:ea typeface="楷体_GB2312" panose="02010609030101010101" pitchFamily="49" charset="-122"/>
-              </a:rPr>
-              <a:t> 个“最不和谐”的元素的索引值 </a:t>
-            </a:r>
-            <a:r>
-              <a:rPr kumimoji="1" lang="en-US" altLang="zh-CN" b="1" dirty="0">
-                <a:solidFill>
-                  <a:srgbClr val="FF0000"/>
-                </a:solidFill>
-                <a:latin typeface="Times New Roman" charset="0"/>
-                <a:ea typeface="楷体_GB2312" panose="02010609030101010101" pitchFamily="49" charset="-122"/>
-              </a:rPr>
-              <a:t>+</a:t>
-            </a:r>
-            <a:r>
-              <a:rPr kumimoji="1" lang="zh-CN" altLang="en-US" b="1" dirty="0">
-                <a:solidFill>
-                  <a:srgbClr val="FF0000"/>
-                </a:solidFill>
-                <a:latin typeface="Times New Roman" charset="0"/>
-                <a:ea typeface="楷体_GB2312" panose="02010609030101010101" pitchFamily="49" charset="-122"/>
-              </a:rPr>
-              <a:t> </a:t>
-            </a:r>
-            <a:r>
-              <a:rPr kumimoji="1" lang="en-US" altLang="zh-CN" b="1" dirty="0">
-                <a:solidFill>
-                  <a:srgbClr val="FF0000"/>
-                </a:solidFill>
-                <a:latin typeface="Times New Roman" charset="0"/>
-                <a:ea typeface="楷体_GB2312" panose="02010609030101010101" pitchFamily="49" charset="-122"/>
-              </a:rPr>
-              <a:t>1</a:t>
-            </a:r>
-            <a:r>
-              <a:rPr kumimoji="1" lang="zh-CN" altLang="en-US" b="1" dirty="0">
-                <a:solidFill>
-                  <a:srgbClr val="FF0000"/>
-                </a:solidFill>
-                <a:latin typeface="Times New Roman" charset="0"/>
-                <a:ea typeface="楷体_GB2312" panose="02010609030101010101" pitchFamily="49" charset="-122"/>
-              </a:rPr>
-              <a:t> ，返回即可</a:t>
-            </a:r>
-            <a:r>
-              <a:rPr kumimoji="1" lang="zh-CN" altLang="en-US" dirty="0">
-                <a:latin typeface="Times New Roman" charset="0"/>
-                <a:ea typeface="楷体_GB2312" panose="02010609030101010101" pitchFamily="49" charset="-122"/>
-              </a:rPr>
-              <a:t>。</a:t>
-            </a:r>
-            <a:endParaRPr kumimoji="1" lang="en-US" altLang="zh-CN" dirty="0">
+              <a:t>此时认为“桶排序”已经完成。</a:t>
+            </a:r>
+            <a:endParaRPr kumimoji="1" lang="en-US" altLang="zh-CN" sz="2400" b="1" dirty="0">
+              <a:solidFill>
+                <a:srgbClr val="FF0000"/>
+              </a:solidFill>
               <a:latin typeface="Times New Roman" charset="0"/>
               <a:ea typeface="楷体_GB2312" panose="02010609030101010101" pitchFamily="49" charset="-122"/>
             </a:endParaRPr>
           </a:p>
-        </p:txBody>
-      </p:sp>
-      <p:sp>
-        <p:nvSpPr>
-          <p:cNvPr id="8" name="文本框 7">
-            <a:extLst>
-              <a:ext uri="{FF2B5EF4-FFF2-40B4-BE49-F238E27FC236}">
-                <a16:creationId xmlns:a16="http://schemas.microsoft.com/office/drawing/2014/main" id="{CD9FF852-5608-B540-AFAB-CD308A98A722}"/>
-              </a:ext>
-            </a:extLst>
-          </p:cNvPr>
-          <p:cNvSpPr txBox="1"/>
-          <p:nvPr/>
-        </p:nvSpPr>
-        <p:spPr>
-          <a:xfrm flipH="1">
-            <a:off x="804680" y="873508"/>
-            <a:ext cx="5011657" cy="461665"/>
-          </a:xfrm>
-          <a:prstGeom prst="rect">
-            <a:avLst/>
-          </a:prstGeom>
-          <a:solidFill>
-            <a:srgbClr val="FF0000"/>
-          </a:solidFill>
-          <a:ln>
-            <a:noFill/>
-          </a:ln>
-          <a:effectLst>
-            <a:outerShdw blurRad="50800" dist="38100" dir="2700000" algn="tl" rotWithShape="0">
-              <a:prstClr val="black">
-                <a:alpha val="40000"/>
-              </a:prstClr>
-            </a:outerShdw>
-          </a:effectLst>
-        </p:spPr>
-        <p:txBody>
-          <a:bodyPr wrap="square" rtlCol="0">
-            <a:spAutoFit/>
-          </a:bodyPr>
-          <a:lstStyle/>
           <a:p>
-            <a:pPr marL="342900" indent="-342900">
+            <a:pPr marL="285750" indent="-285750">
               <a:buFont typeface="Wingdings" pitchFamily="2" charset="2"/>
-              <a:buChar char="Ø"/>
+              <a:buChar char="l"/>
             </a:pPr>
             <a:r>
               <a:rPr kumimoji="1" lang="zh-CN" altLang="en-US" sz="2400" b="1" dirty="0">
                 <a:solidFill>
-                  <a:schemeClr val="bg1"/>
-                </a:solidFill>
-                <a:latin typeface="Times New Roman" panose="02020603050405020304" pitchFamily="18" charset="0"/>
-                <a:ea typeface="KaiTi_GB2312" panose="02010609030101010101" pitchFamily="49" charset="-122"/>
-                <a:cs typeface="Times New Roman" panose="02020603050405020304" pitchFamily="18" charset="0"/>
-              </a:rPr>
-              <a:t>思想：桶排序，一个萝卜一个坑。</a:t>
-            </a:r>
-          </a:p>
-        </p:txBody>
-      </p:sp>
-      <p:sp>
-        <p:nvSpPr>
-          <p:cNvPr id="9" name="矩形 8">
-            <a:extLst>
-              <a:ext uri="{FF2B5EF4-FFF2-40B4-BE49-F238E27FC236}">
-                <a16:creationId xmlns:a16="http://schemas.microsoft.com/office/drawing/2014/main" id="{28633166-C023-A547-9206-D78230D85E85}"/>
-              </a:ext>
-            </a:extLst>
-          </p:cNvPr>
-          <p:cNvSpPr/>
-          <p:nvPr/>
-        </p:nvSpPr>
-        <p:spPr>
-          <a:xfrm>
-            <a:off x="729875" y="1536242"/>
-            <a:ext cx="3490058" cy="369332"/>
-          </a:xfrm>
-          <a:prstGeom prst="rect">
-            <a:avLst/>
-          </a:prstGeom>
-        </p:spPr>
-        <p:txBody>
-          <a:bodyPr wrap="none">
-            <a:spAutoFit/>
-          </a:bodyPr>
-          <a:lstStyle/>
-          <a:p>
-            <a:r>
-              <a:rPr lang="zh-CN" altLang="en-US" dirty="0"/>
-              <a:t>以示例 </a:t>
-            </a:r>
-            <a:r>
-              <a:rPr lang="en-US" altLang="zh-CN" dirty="0">
-                <a:latin typeface="Times New Roman" panose="02020603050405020304" pitchFamily="18" charset="0"/>
-                <a:cs typeface="Times New Roman" panose="02020603050405020304" pitchFamily="18" charset="0"/>
-              </a:rPr>
-              <a:t>2</a:t>
-            </a:r>
-            <a:r>
-              <a:rPr lang="zh-CN" altLang="en-US" dirty="0"/>
-              <a:t> 输入</a:t>
-            </a:r>
-            <a:r>
-              <a:rPr lang="zh-CN" altLang="en-US" dirty="0">
-                <a:latin typeface="Times New Roman" panose="02020603050405020304" pitchFamily="18" charset="0"/>
-                <a:cs typeface="Times New Roman" panose="02020603050405020304" pitchFamily="18" charset="0"/>
-              </a:rPr>
-              <a:t>: [</a:t>
-            </a:r>
-            <a:r>
-              <a:rPr lang="en-US" altLang="zh-CN" dirty="0">
-                <a:latin typeface="Times New Roman" panose="02020603050405020304" pitchFamily="18" charset="0"/>
-                <a:cs typeface="Times New Roman" panose="02020603050405020304" pitchFamily="18" charset="0"/>
-              </a:rPr>
-              <a:t>3</a:t>
-            </a:r>
-            <a:r>
-              <a:rPr lang="zh-CN" altLang="en-US" dirty="0">
-                <a:latin typeface="Times New Roman" panose="02020603050405020304" pitchFamily="18" charset="0"/>
-                <a:cs typeface="Times New Roman" panose="02020603050405020304" pitchFamily="18" charset="0"/>
-              </a:rPr>
-              <a:t>, </a:t>
-            </a:r>
-            <a:r>
-              <a:rPr lang="en-US" altLang="zh-CN" dirty="0">
-                <a:latin typeface="Times New Roman" panose="02020603050405020304" pitchFamily="18" charset="0"/>
-                <a:cs typeface="Times New Roman" panose="02020603050405020304" pitchFamily="18" charset="0"/>
-              </a:rPr>
-              <a:t>4</a:t>
-            </a:r>
-            <a:r>
-              <a:rPr lang="zh-CN" altLang="en-US" dirty="0">
-                <a:latin typeface="Times New Roman" panose="02020603050405020304" pitchFamily="18" charset="0"/>
-                <a:cs typeface="Times New Roman" panose="02020603050405020304" pitchFamily="18" charset="0"/>
-              </a:rPr>
-              <a:t>, </a:t>
-            </a:r>
-            <a:r>
-              <a:rPr lang="en-US" altLang="zh-CN" dirty="0">
-                <a:latin typeface="Times New Roman" panose="02020603050405020304" pitchFamily="18" charset="0"/>
-                <a:cs typeface="Times New Roman" panose="02020603050405020304" pitchFamily="18" charset="0"/>
-              </a:rPr>
-              <a:t>-1</a:t>
-            </a:r>
-            <a:r>
-              <a:rPr lang="zh-CN" altLang="en-US" dirty="0">
-                <a:latin typeface="Times New Roman" panose="02020603050405020304" pitchFamily="18" charset="0"/>
-                <a:cs typeface="Times New Roman" panose="02020603050405020304" pitchFamily="18" charset="0"/>
-              </a:rPr>
-              <a:t>, </a:t>
-            </a:r>
-            <a:r>
-              <a:rPr lang="en-US" altLang="zh-CN" dirty="0">
-                <a:latin typeface="Times New Roman" panose="02020603050405020304" pitchFamily="18" charset="0"/>
-                <a:cs typeface="Times New Roman" panose="02020603050405020304" pitchFamily="18" charset="0"/>
+                  <a:srgbClr val="FF0000"/>
+                </a:solidFill>
+                <a:latin typeface="Times New Roman" charset="0"/>
+                <a:ea typeface="楷体_GB2312" panose="02010609030101010101" pitchFamily="49" charset="-122"/>
+              </a:rPr>
+              <a:t>现在需要从头到尾看一遍，找出第 </a:t>
+            </a:r>
+            <a:r>
+              <a:rPr kumimoji="1" lang="en-US" altLang="zh-CN" sz="2400" b="1" dirty="0">
+                <a:solidFill>
+                  <a:srgbClr val="FF0000"/>
+                </a:solidFill>
+                <a:latin typeface="Times New Roman" charset="0"/>
+                <a:ea typeface="楷体_GB2312" panose="02010609030101010101" pitchFamily="49" charset="-122"/>
               </a:rPr>
               <a:t>1</a:t>
             </a:r>
             <a:r>
-              <a:rPr lang="zh-CN" altLang="en-US" dirty="0">
-                <a:latin typeface="Times New Roman" panose="02020603050405020304" pitchFamily="18" charset="0"/>
-                <a:cs typeface="Times New Roman" panose="02020603050405020304" pitchFamily="18" charset="0"/>
-              </a:rPr>
-              <a:t>] </a:t>
-            </a:r>
-            <a:r>
-              <a:rPr lang="zh-CN" altLang="en-US" dirty="0"/>
-              <a:t>为例。</a:t>
-            </a:r>
-            <a:endParaRPr lang="en-US" altLang="zh-CN" dirty="0"/>
+              <a:rPr kumimoji="1" lang="zh-CN" altLang="en-US" sz="2400" b="1" dirty="0">
+                <a:solidFill>
+                  <a:srgbClr val="FF0000"/>
+                </a:solidFill>
+                <a:latin typeface="Times New Roman" charset="0"/>
+                <a:ea typeface="楷体_GB2312" panose="02010609030101010101" pitchFamily="49" charset="-122"/>
+              </a:rPr>
+              <a:t> 个“最不和谐”的元素的索引值 </a:t>
+            </a:r>
+            <a:r>
+              <a:rPr kumimoji="1" lang="en-US" altLang="zh-CN" sz="2400" b="1" dirty="0">
+                <a:solidFill>
+                  <a:srgbClr val="FF0000"/>
+                </a:solidFill>
+                <a:latin typeface="Times New Roman" charset="0"/>
+                <a:ea typeface="楷体_GB2312" panose="02010609030101010101" pitchFamily="49" charset="-122"/>
+              </a:rPr>
+              <a:t>+</a:t>
+            </a:r>
+            <a:r>
+              <a:rPr kumimoji="1" lang="zh-CN" altLang="en-US" sz="2400" b="1" dirty="0">
+                <a:solidFill>
+                  <a:srgbClr val="FF0000"/>
+                </a:solidFill>
+                <a:latin typeface="Times New Roman" charset="0"/>
+                <a:ea typeface="楷体_GB2312" panose="02010609030101010101" pitchFamily="49" charset="-122"/>
+              </a:rPr>
+              <a:t> </a:t>
+            </a:r>
+            <a:r>
+              <a:rPr kumimoji="1" lang="en-US" altLang="zh-CN" sz="2400" b="1" dirty="0">
+                <a:solidFill>
+                  <a:srgbClr val="FF0000"/>
+                </a:solidFill>
+                <a:latin typeface="Times New Roman" charset="0"/>
+                <a:ea typeface="楷体_GB2312" panose="02010609030101010101" pitchFamily="49" charset="-122"/>
+              </a:rPr>
+              <a:t>1</a:t>
+            </a:r>
+            <a:r>
+              <a:rPr kumimoji="1" lang="zh-CN" altLang="en-US" sz="2400" b="1" dirty="0">
+                <a:solidFill>
+                  <a:srgbClr val="FF0000"/>
+                </a:solidFill>
+                <a:latin typeface="Times New Roman" charset="0"/>
+                <a:ea typeface="楷体_GB2312" panose="02010609030101010101" pitchFamily="49" charset="-122"/>
+              </a:rPr>
+              <a:t> ，返回即可</a:t>
+            </a:r>
+            <a:r>
+              <a:rPr kumimoji="1" lang="zh-CN" altLang="en-US" sz="2400" dirty="0">
+                <a:latin typeface="Times New Roman" charset="0"/>
+                <a:ea typeface="楷体_GB2312" panose="02010609030101010101" pitchFamily="49" charset="-122"/>
+              </a:rPr>
+              <a:t>。</a:t>
+            </a:r>
+            <a:endParaRPr kumimoji="1" lang="en-US" altLang="zh-CN" sz="2400" dirty="0">
+              <a:latin typeface="Times New Roman" charset="0"/>
+              <a:ea typeface="楷体_GB2312" panose="02010609030101010101" pitchFamily="49" charset="-122"/>
+            </a:endParaRPr>
           </a:p>
         </p:txBody>
       </p:sp>
@@ -5024,8 +4997,8 @@
         </p:blipFill>
         <p:spPr>
           <a:xfrm>
-            <a:off x="4034008" y="3337766"/>
-            <a:ext cx="4775846" cy="1640558"/>
+            <a:off x="2880000" y="2880000"/>
+            <a:ext cx="7335999" cy="2520000"/>
           </a:xfrm>
           <a:prstGeom prst="rect">
             <a:avLst/>
@@ -5034,10 +5007,68 @@
       </p:pic>
       <p:sp>
         <p:nvSpPr>
-          <p:cNvPr id="11" name="矩形 10">
+          <p:cNvPr id="13" name="文本框 12">
             <a:extLst>
               <a:ext uri="{FF2B5EF4-FFF2-40B4-BE49-F238E27FC236}">
-                <a16:creationId xmlns:a16="http://schemas.microsoft.com/office/drawing/2014/main" id="{12EAB448-CFF1-9D46-9A0C-AADFF9B27B96}"/>
+                <a16:creationId xmlns:a16="http://schemas.microsoft.com/office/drawing/2014/main" id="{6B18320F-9042-864C-BD2F-CD8F729066CB}"/>
+              </a:ext>
+            </a:extLst>
+          </p:cNvPr>
+          <p:cNvSpPr txBox="1"/>
+          <p:nvPr/>
+        </p:nvSpPr>
+        <p:spPr>
+          <a:xfrm flipH="1">
+            <a:off x="804679" y="781316"/>
+            <a:ext cx="8474450" cy="461665"/>
+          </a:xfrm>
+          <a:prstGeom prst="rect">
+            <a:avLst/>
+          </a:prstGeom>
+          <a:solidFill>
+            <a:srgbClr val="FF0000"/>
+          </a:solidFill>
+          <a:ln>
+            <a:noFill/>
+          </a:ln>
+          <a:effectLst>
+            <a:outerShdw blurRad="50800" dist="38100" dir="2700000" algn="tl" rotWithShape="0">
+              <a:prstClr val="black">
+                <a:alpha val="40000"/>
+              </a:prstClr>
+            </a:outerShdw>
+          </a:effectLst>
+        </p:spPr>
+        <p:txBody>
+          <a:bodyPr wrap="square" rtlCol="0">
+            <a:spAutoFit/>
+          </a:bodyPr>
+          <a:lstStyle/>
+          <a:p>
+            <a:pPr marL="342900" indent="-342900">
+              <a:buFont typeface="Wingdings" pitchFamily="2" charset="2"/>
+              <a:buChar char="Ø"/>
+            </a:pPr>
+            <a:r>
+              <a:rPr kumimoji="1" lang="zh-CN" altLang="en-US" sz="2400" b="1" dirty="0">
+                <a:solidFill>
+                  <a:schemeClr val="bg1"/>
+                </a:solidFill>
+                <a:latin typeface="Times New Roman" panose="02020603050405020304" pitchFamily="18" charset="0"/>
+                <a:ea typeface="KaiTi_GB2312" panose="02010609030101010101" pitchFamily="49" charset="-122"/>
+                <a:cs typeface="Times New Roman" panose="02020603050405020304" pitchFamily="18" charset="0"/>
+              </a:rPr>
+              <a:t>思想：桶排序（一个萝卜一个坑）、抽屉原理、鸽巢原理。</a:t>
+            </a:r>
+          </a:p>
+        </p:txBody>
+      </p:sp>
+      <p:sp>
+        <p:nvSpPr>
+          <p:cNvPr id="15" name="下箭头 14">
+            <a:extLst>
+              <a:ext uri="{FF2B5EF4-FFF2-40B4-BE49-F238E27FC236}">
+                <a16:creationId xmlns:a16="http://schemas.microsoft.com/office/drawing/2014/main" id="{69D42F6C-6717-C040-9CB4-1C32744C67E2}"/>
               </a:ext>
             </a:extLst>
           </p:cNvPr>
@@ -5046,59 +5077,8 @@
         </p:nvSpPr>
         <p:spPr>
           <a:xfrm>
-            <a:off x="6283195" y="2286135"/>
-            <a:ext cx="5303631" cy="369332"/>
-          </a:xfrm>
-          <a:prstGeom prst="rect">
-            <a:avLst/>
-          </a:prstGeom>
-        </p:spPr>
-        <p:txBody>
-          <a:bodyPr wrap="square">
-            <a:spAutoFit/>
-          </a:bodyPr>
-          <a:lstStyle/>
-          <a:p>
-            <a:r>
-              <a:rPr kumimoji="1" lang="zh-CN" altLang="en-US" dirty="0">
-                <a:latin typeface="Times New Roman" charset="0"/>
-                <a:ea typeface="楷体_GB2312" panose="02010609030101010101" pitchFamily="49" charset="-122"/>
-              </a:rPr>
-              <a:t>接下来还看索引 </a:t>
-            </a:r>
-            <a:r>
-              <a:rPr kumimoji="1" lang="en-US" altLang="zh-CN" dirty="0">
-                <a:latin typeface="Times New Roman" charset="0"/>
-                <a:ea typeface="楷体_GB2312" panose="02010609030101010101" pitchFamily="49" charset="-122"/>
-              </a:rPr>
-              <a:t>3</a:t>
-            </a:r>
-            <a:r>
-              <a:rPr kumimoji="1" lang="zh-CN" altLang="en-US" dirty="0">
-                <a:latin typeface="Times New Roman" charset="0"/>
-                <a:ea typeface="楷体_GB2312" panose="02010609030101010101" pitchFamily="49" charset="-122"/>
-              </a:rPr>
-              <a:t> 上的数字。</a:t>
-            </a:r>
-          </a:p>
-        </p:txBody>
-      </p:sp>
-      <p:sp>
-        <p:nvSpPr>
-          <p:cNvPr id="12" name="下箭头 11">
-            <a:extLst>
-              <a:ext uri="{FF2B5EF4-FFF2-40B4-BE49-F238E27FC236}">
-                <a16:creationId xmlns:a16="http://schemas.microsoft.com/office/drawing/2014/main" id="{34CCDBB2-2236-294A-9C68-79F2E67CDEAE}"/>
-              </a:ext>
-            </a:extLst>
-          </p:cNvPr>
-          <p:cNvSpPr/>
-          <p:nvPr/>
-        </p:nvSpPr>
-        <p:spPr>
-          <a:xfrm>
-            <a:off x="8064573" y="2750545"/>
-            <a:ext cx="245470" cy="380245"/>
+            <a:off x="8809854" y="2318940"/>
+            <a:ext cx="1086096" cy="481742"/>
           </a:xfrm>
           <a:prstGeom prst="downArrow">
             <a:avLst/>
@@ -5132,6 +5112,180 @@
           <a:p>
             <a:pPr algn="ctr"/>
             <a:endParaRPr kumimoji="1" lang="zh-CN" altLang="en-US"/>
+          </a:p>
+        </p:txBody>
+      </p:sp>
+      <p:sp>
+        <p:nvSpPr>
+          <p:cNvPr id="16" name="矩形 15">
+            <a:extLst>
+              <a:ext uri="{FF2B5EF4-FFF2-40B4-BE49-F238E27FC236}">
+                <a16:creationId xmlns:a16="http://schemas.microsoft.com/office/drawing/2014/main" id="{EBC88EFD-DF0C-D44C-A8F2-9B8B403BC53A}"/>
+              </a:ext>
+            </a:extLst>
+          </p:cNvPr>
+          <p:cNvSpPr/>
+          <p:nvPr/>
+        </p:nvSpPr>
+        <p:spPr>
+          <a:xfrm>
+            <a:off x="8677730" y="1776127"/>
+            <a:ext cx="3234589" cy="400110"/>
+          </a:xfrm>
+          <a:prstGeom prst="rect">
+            <a:avLst/>
+          </a:prstGeom>
+        </p:spPr>
+        <p:txBody>
+          <a:bodyPr wrap="square">
+            <a:spAutoFit/>
+          </a:bodyPr>
+          <a:lstStyle/>
+          <a:p>
+            <a:r>
+              <a:rPr kumimoji="1" lang="zh-CN" altLang="en-US" sz="2000" dirty="0">
+                <a:latin typeface="Times New Roman" charset="0"/>
+                <a:ea typeface="楷体_GB2312" panose="02010609030101010101" pitchFamily="49" charset="-122"/>
+              </a:rPr>
+              <a:t>接下来看索引 </a:t>
+            </a:r>
+            <a:r>
+              <a:rPr kumimoji="1" lang="en-US" altLang="zh-CN" sz="2000" dirty="0">
+                <a:latin typeface="Times New Roman" charset="0"/>
+                <a:ea typeface="楷体_GB2312" panose="02010609030101010101" pitchFamily="49" charset="-122"/>
+              </a:rPr>
+              <a:t>3</a:t>
+            </a:r>
+            <a:r>
+              <a:rPr kumimoji="1" lang="zh-CN" altLang="en-US" sz="2000" dirty="0">
+                <a:latin typeface="Times New Roman" charset="0"/>
+                <a:ea typeface="楷体_GB2312" panose="02010609030101010101" pitchFamily="49" charset="-122"/>
+              </a:rPr>
+              <a:t> 上的数字。</a:t>
+            </a:r>
+          </a:p>
+        </p:txBody>
+      </p:sp>
+      <p:sp>
+        <p:nvSpPr>
+          <p:cNvPr id="9" name="矩形 8">
+            <a:extLst>
+              <a:ext uri="{FF2B5EF4-FFF2-40B4-BE49-F238E27FC236}">
+                <a16:creationId xmlns:a16="http://schemas.microsoft.com/office/drawing/2014/main" id="{D1E2631A-C674-2C4C-83E4-3D339DCDE26C}"/>
+              </a:ext>
+            </a:extLst>
+          </p:cNvPr>
+          <p:cNvSpPr/>
+          <p:nvPr/>
+        </p:nvSpPr>
+        <p:spPr>
+          <a:xfrm>
+            <a:off x="753897" y="1297746"/>
+            <a:ext cx="4578497" cy="461665"/>
+          </a:xfrm>
+          <a:prstGeom prst="rect">
+            <a:avLst/>
+          </a:prstGeom>
+        </p:spPr>
+        <p:txBody>
+          <a:bodyPr wrap="none">
+            <a:spAutoFit/>
+          </a:bodyPr>
+          <a:lstStyle/>
+          <a:p>
+            <a:r>
+              <a:rPr lang="zh-CN" altLang="en-US" sz="2400" dirty="0">
+                <a:latin typeface="Times New Roman" panose="02020603050405020304" pitchFamily="18" charset="0"/>
+                <a:ea typeface="KaiTi_GB2312" panose="02010609030101010101" pitchFamily="49" charset="-122"/>
+                <a:cs typeface="Times New Roman" panose="02020603050405020304" pitchFamily="18" charset="0"/>
+              </a:rPr>
+              <a:t>以示例 </a:t>
+            </a:r>
+            <a:r>
+              <a:rPr lang="en-US" altLang="zh-CN" sz="2400" dirty="0">
+                <a:latin typeface="Times New Roman" panose="02020603050405020304" pitchFamily="18" charset="0"/>
+                <a:ea typeface="KaiTi_GB2312" panose="02010609030101010101" pitchFamily="49" charset="-122"/>
+                <a:cs typeface="Times New Roman" panose="02020603050405020304" pitchFamily="18" charset="0"/>
+              </a:rPr>
+              <a:t>2</a:t>
+            </a:r>
+            <a:r>
+              <a:rPr lang="zh-CN" altLang="en-US" sz="2400" dirty="0">
+                <a:latin typeface="Times New Roman" panose="02020603050405020304" pitchFamily="18" charset="0"/>
+                <a:ea typeface="KaiTi_GB2312" panose="02010609030101010101" pitchFamily="49" charset="-122"/>
+                <a:cs typeface="Times New Roman" panose="02020603050405020304" pitchFamily="18" charset="0"/>
+              </a:rPr>
+              <a:t> 输入: [</a:t>
+            </a:r>
+            <a:r>
+              <a:rPr lang="en-US" altLang="zh-CN" sz="2400" dirty="0">
+                <a:latin typeface="Times New Roman" panose="02020603050405020304" pitchFamily="18" charset="0"/>
+                <a:ea typeface="KaiTi_GB2312" panose="02010609030101010101" pitchFamily="49" charset="-122"/>
+                <a:cs typeface="Times New Roman" panose="02020603050405020304" pitchFamily="18" charset="0"/>
+              </a:rPr>
+              <a:t>3</a:t>
+            </a:r>
+            <a:r>
+              <a:rPr lang="zh-CN" altLang="en-US" sz="2400" dirty="0">
+                <a:latin typeface="Times New Roman" panose="02020603050405020304" pitchFamily="18" charset="0"/>
+                <a:ea typeface="KaiTi_GB2312" panose="02010609030101010101" pitchFamily="49" charset="-122"/>
+                <a:cs typeface="Times New Roman" panose="02020603050405020304" pitchFamily="18" charset="0"/>
+              </a:rPr>
+              <a:t>, </a:t>
+            </a:r>
+            <a:r>
+              <a:rPr lang="en-US" altLang="zh-CN" sz="2400" dirty="0">
+                <a:latin typeface="Times New Roman" panose="02020603050405020304" pitchFamily="18" charset="0"/>
+                <a:ea typeface="KaiTi_GB2312" panose="02010609030101010101" pitchFamily="49" charset="-122"/>
+                <a:cs typeface="Times New Roman" panose="02020603050405020304" pitchFamily="18" charset="0"/>
+              </a:rPr>
+              <a:t>4</a:t>
+            </a:r>
+            <a:r>
+              <a:rPr lang="zh-CN" altLang="en-US" sz="2400" dirty="0">
+                <a:latin typeface="Times New Roman" panose="02020603050405020304" pitchFamily="18" charset="0"/>
+                <a:ea typeface="KaiTi_GB2312" panose="02010609030101010101" pitchFamily="49" charset="-122"/>
+                <a:cs typeface="Times New Roman" panose="02020603050405020304" pitchFamily="18" charset="0"/>
+              </a:rPr>
+              <a:t>, </a:t>
+            </a:r>
+            <a:r>
+              <a:rPr lang="en-US" altLang="zh-CN" sz="2400" dirty="0">
+                <a:latin typeface="Times New Roman" panose="02020603050405020304" pitchFamily="18" charset="0"/>
+                <a:ea typeface="KaiTi_GB2312" panose="02010609030101010101" pitchFamily="49" charset="-122"/>
+                <a:cs typeface="Times New Roman" panose="02020603050405020304" pitchFamily="18" charset="0"/>
+              </a:rPr>
+              <a:t>-1</a:t>
+            </a:r>
+            <a:r>
+              <a:rPr lang="zh-CN" altLang="en-US" sz="2400" dirty="0">
+                <a:latin typeface="Times New Roman" panose="02020603050405020304" pitchFamily="18" charset="0"/>
+                <a:ea typeface="KaiTi_GB2312" panose="02010609030101010101" pitchFamily="49" charset="-122"/>
+                <a:cs typeface="Times New Roman" panose="02020603050405020304" pitchFamily="18" charset="0"/>
+              </a:rPr>
+              <a:t>, </a:t>
+            </a:r>
+            <a:r>
+              <a:rPr lang="en-US" altLang="zh-CN" sz="2400" dirty="0">
+                <a:latin typeface="Times New Roman" panose="02020603050405020304" pitchFamily="18" charset="0"/>
+                <a:ea typeface="KaiTi_GB2312" panose="02010609030101010101" pitchFamily="49" charset="-122"/>
+                <a:cs typeface="Times New Roman" panose="02020603050405020304" pitchFamily="18" charset="0"/>
+              </a:rPr>
+              <a:t>1</a:t>
+            </a:r>
+            <a:r>
+              <a:rPr lang="zh-CN" altLang="en-US" sz="2400" dirty="0">
+                <a:latin typeface="Times New Roman" panose="02020603050405020304" pitchFamily="18" charset="0"/>
+                <a:ea typeface="KaiTi_GB2312" panose="02010609030101010101" pitchFamily="49" charset="-122"/>
+                <a:cs typeface="Times New Roman" panose="02020603050405020304" pitchFamily="18" charset="0"/>
+              </a:rPr>
+              <a:t>] 为例。</a:t>
+            </a:r>
+            <a:endParaRPr lang="en-US" altLang="zh-CN" sz="2400" dirty="0">
+              <a:latin typeface="Times New Roman" panose="02020603050405020304" pitchFamily="18" charset="0"/>
+              <a:ea typeface="KaiTi_GB2312" panose="02010609030101010101" pitchFamily="49" charset="-122"/>
+              <a:cs typeface="Times New Roman" panose="02020603050405020304" pitchFamily="18" charset="0"/>
+            </a:endParaRPr>
           </a:p>
         </p:txBody>
       </p:sp>
@@ -5165,6 +5319,36 @@
           <a:chExt cx="0" cy="0"/>
         </a:xfrm>
       </p:grpSpPr>
+      <p:pic>
+        <p:nvPicPr>
+          <p:cNvPr id="2" name="图片 1">
+            <a:extLst>
+              <a:ext uri="{FF2B5EF4-FFF2-40B4-BE49-F238E27FC236}">
+                <a16:creationId xmlns:a16="http://schemas.microsoft.com/office/drawing/2014/main" id="{A3969423-1581-234E-98B8-517E47C48CF5}"/>
+              </a:ext>
+            </a:extLst>
+          </p:cNvPr>
+          <p:cNvPicPr>
+            <a:picLocks noChangeAspect="1"/>
+          </p:cNvPicPr>
+          <p:nvPr/>
+        </p:nvPicPr>
+        <p:blipFill>
+          <a:blip r:embed="rId2"/>
+          <a:stretch>
+            <a:fillRect/>
+          </a:stretch>
+        </p:blipFill>
+        <p:spPr>
+          <a:xfrm>
+            <a:off x="2880000" y="2880000"/>
+            <a:ext cx="7335999" cy="2520000"/>
+          </a:xfrm>
+          <a:prstGeom prst="rect">
+            <a:avLst/>
+          </a:prstGeom>
+        </p:spPr>
+      </p:pic>
       <p:sp>
         <p:nvSpPr>
           <p:cNvPr id="5" name="矩形 4">
@@ -5275,8 +5459,8 @@
         </p:nvSpPr>
         <p:spPr>
           <a:xfrm>
-            <a:off x="4034008" y="2588722"/>
-            <a:ext cx="7580276" cy="369332"/>
+            <a:off x="2880000" y="2082600"/>
+            <a:ext cx="8181438" cy="400110"/>
           </a:xfrm>
           <a:prstGeom prst="rect">
             <a:avLst/>
@@ -5289,56 +5473,49 @@
           <a:lstStyle/>
           <a:p>
             <a:r>
-              <a:rPr kumimoji="1" lang="zh-CN" altLang="en-US">
-                <a:latin typeface="Times New Roman" charset="0"/>
-                <a:ea typeface="楷体_GB2312" panose="02010609030101010101" pitchFamily="49" charset="-122"/>
-              </a:rPr>
-              <a:t>最后从</a:t>
-            </a:r>
-            <a:r>
-              <a:rPr kumimoji="1" lang="zh-CN" altLang="en-US" dirty="0">
-                <a:latin typeface="Times New Roman" charset="0"/>
-                <a:ea typeface="楷体_GB2312" panose="02010609030101010101" pitchFamily="49" charset="-122"/>
-              </a:rPr>
-              <a:t>左到右看一遍，找到第 </a:t>
-            </a:r>
-            <a:r>
-              <a:rPr kumimoji="1" lang="en-US" altLang="zh-CN" dirty="0">
+              <a:rPr kumimoji="1" lang="zh-CN" altLang="en-US" sz="2000" dirty="0">
+                <a:latin typeface="Times New Roman" charset="0"/>
+                <a:ea typeface="楷体_GB2312" panose="02010609030101010101" pitchFamily="49" charset="-122"/>
+              </a:rPr>
+              <a:t>最后从左到右看一遍，找到第 </a:t>
+            </a:r>
+            <a:r>
+              <a:rPr kumimoji="1" lang="en-US" altLang="zh-CN" sz="2000" dirty="0">
                 <a:latin typeface="Times New Roman" charset="0"/>
                 <a:ea typeface="楷体_GB2312" panose="02010609030101010101" pitchFamily="49" charset="-122"/>
               </a:rPr>
               <a:t>1</a:t>
             </a:r>
             <a:r>
-              <a:rPr kumimoji="1" lang="zh-CN" altLang="en-US" dirty="0">
+              <a:rPr kumimoji="1" lang="zh-CN" altLang="en-US" sz="2000" dirty="0">
                 <a:latin typeface="Times New Roman" charset="0"/>
                 <a:ea typeface="楷体_GB2312" panose="02010609030101010101" pitchFamily="49" charset="-122"/>
               </a:rPr>
               <a:t> 个“最不和谐”的索引值 </a:t>
             </a:r>
             <a:r>
-              <a:rPr kumimoji="1" lang="en-US" altLang="zh-CN" dirty="0">
+              <a:rPr kumimoji="1" lang="en-US" altLang="zh-CN" sz="2000" dirty="0">
                 <a:latin typeface="Times New Roman" charset="0"/>
                 <a:ea typeface="楷体_GB2312" panose="02010609030101010101" pitchFamily="49" charset="-122"/>
               </a:rPr>
               <a:t>+</a:t>
             </a:r>
             <a:r>
-              <a:rPr kumimoji="1" lang="zh-CN" altLang="en-US" dirty="0">
+              <a:rPr kumimoji="1" lang="zh-CN" altLang="en-US" sz="2000" dirty="0">
                 <a:latin typeface="Times New Roman" charset="0"/>
                 <a:ea typeface="楷体_GB2312" panose="02010609030101010101" pitchFamily="49" charset="-122"/>
               </a:rPr>
               <a:t> </a:t>
             </a:r>
             <a:r>
-              <a:rPr kumimoji="1" lang="en-US" altLang="zh-CN" dirty="0">
+              <a:rPr kumimoji="1" lang="en-US" altLang="zh-CN" sz="2000" dirty="0">
                 <a:latin typeface="Times New Roman" charset="0"/>
                 <a:ea typeface="楷体_GB2312" panose="02010609030101010101" pitchFamily="49" charset="-122"/>
               </a:rPr>
               <a:t>1</a:t>
             </a:r>
             <a:r>
-              <a:rPr kumimoji="1" lang="zh-CN" altLang="en-US" dirty="0">
+              <a:rPr kumimoji="1" lang="zh-CN" altLang="en-US" sz="2000" dirty="0">
                 <a:latin typeface="Times New Roman" charset="0"/>
                 <a:ea typeface="楷体_GB2312" panose="02010609030101010101" pitchFamily="49" charset="-122"/>
               </a:rPr>
@@ -5361,18 +5538,39 @@
         </p:nvSpPr>
         <p:spPr>
           <a:xfrm rot="16200000">
-            <a:off x="6205178" y="2840459"/>
-            <a:ext cx="433505" cy="4775846"/>
+            <a:off x="6331248" y="1568646"/>
+            <a:ext cx="433505" cy="7336000"/>
           </a:xfrm>
           <a:prstGeom prst="downArrow">
             <a:avLst/>
           </a:prstGeom>
-          <a:solidFill>
-            <a:srgbClr val="FF0000"/>
-          </a:solidFill>
+          <a:gradFill>
+            <a:gsLst>
+              <a:gs pos="0">
+                <a:schemeClr val="bg1"/>
+              </a:gs>
+              <a:gs pos="74000">
+                <a:srgbClr val="FF0000"/>
+              </a:gs>
+              <a:gs pos="83000">
+                <a:srgbClr val="C00000"/>
+              </a:gs>
+              <a:gs pos="100000">
+                <a:srgbClr val="C00000"/>
+              </a:gs>
+            </a:gsLst>
+            <a:lin ang="5400000" scaled="1"/>
+          </a:gradFill>
           <a:ln>
             <a:noFill/>
           </a:ln>
+          <a:effectLst>
+            <a:outerShdw blurRad="50800" dist="38100" dir="13500000" algn="br" rotWithShape="0">
+              <a:prstClr val="black">
+                <a:alpha val="40000"/>
+              </a:prstClr>
+            </a:outerShdw>
+          </a:effectLst>
         </p:spPr>
         <p:style>
           <a:lnRef idx="2">
@@ -5413,8 +5611,8 @@
         </p:nvSpPr>
         <p:spPr>
           <a:xfrm>
-            <a:off x="4034007" y="5617750"/>
-            <a:ext cx="6200605" cy="646331"/>
+            <a:off x="405352" y="5872705"/>
+            <a:ext cx="11588564" cy="830997"/>
           </a:xfrm>
           <a:prstGeom prst="rect">
             <a:avLst/>
@@ -5426,84 +5624,88 @@
           </a:bodyPr>
           <a:lstStyle/>
           <a:p>
-            <a:r>
-              <a:rPr kumimoji="1" lang="zh-CN" altLang="en-US" dirty="0">
+            <a:pPr marL="342900" indent="-342900">
+              <a:buFont typeface="Wingdings" pitchFamily="2" charset="2"/>
+              <a:buChar char="l"/>
+            </a:pPr>
+            <a:r>
+              <a:rPr kumimoji="1" lang="zh-CN" altLang="en-US" sz="2400" dirty="0">
                 <a:latin typeface="Times New Roman" charset="0"/>
                 <a:ea typeface="楷体_GB2312" panose="02010609030101010101" pitchFamily="49" charset="-122"/>
               </a:rPr>
               <a:t>从左到右第 </a:t>
             </a:r>
             <a:r>
-              <a:rPr kumimoji="1" lang="en-US" altLang="zh-CN" dirty="0">
+              <a:rPr kumimoji="1" lang="en-US" altLang="zh-CN" sz="2400" dirty="0">
                 <a:latin typeface="Times New Roman" charset="0"/>
                 <a:ea typeface="楷体_GB2312" panose="02010609030101010101" pitchFamily="49" charset="-122"/>
               </a:rPr>
               <a:t>1</a:t>
             </a:r>
             <a:r>
-              <a:rPr kumimoji="1" lang="zh-CN" altLang="en-US" dirty="0">
+              <a:rPr kumimoji="1" lang="zh-CN" altLang="en-US" sz="2400" dirty="0">
                 <a:latin typeface="Times New Roman" charset="0"/>
                 <a:ea typeface="楷体_GB2312" panose="02010609030101010101" pitchFamily="49" charset="-122"/>
               </a:rPr>
               <a:t> 个不被标红的数是 </a:t>
             </a:r>
             <a:r>
-              <a:rPr kumimoji="1" lang="en-US" altLang="zh-CN" dirty="0">
+              <a:rPr kumimoji="1" lang="en-US" altLang="zh-CN" sz="2400" dirty="0">
                 <a:latin typeface="Times New Roman" charset="0"/>
                 <a:ea typeface="楷体_GB2312" panose="02010609030101010101" pitchFamily="49" charset="-122"/>
               </a:rPr>
               <a:t>-1</a:t>
             </a:r>
             <a:r>
-              <a:rPr kumimoji="1" lang="zh-CN" altLang="en-US" dirty="0">
+              <a:rPr kumimoji="1" lang="zh-CN" altLang="en-US" sz="2400" dirty="0">
                 <a:latin typeface="Times New Roman" charset="0"/>
                 <a:ea typeface="楷体_GB2312" panose="02010609030101010101" pitchFamily="49" charset="-122"/>
               </a:rPr>
               <a:t> ，它的索引是 </a:t>
             </a:r>
             <a:r>
-              <a:rPr kumimoji="1" lang="en-US" altLang="zh-CN" dirty="0">
+              <a:rPr kumimoji="1" lang="en-US" altLang="zh-CN" sz="2400" dirty="0">
                 <a:latin typeface="Times New Roman" charset="0"/>
                 <a:ea typeface="楷体_GB2312" panose="02010609030101010101" pitchFamily="49" charset="-122"/>
               </a:rPr>
               <a:t>1</a:t>
             </a:r>
             <a:r>
-              <a:rPr kumimoji="1" lang="zh-CN" altLang="en-US" dirty="0">
+              <a:rPr kumimoji="1" lang="zh-CN" altLang="en-US" sz="2400" dirty="0">
                 <a:latin typeface="Times New Roman" charset="0"/>
                 <a:ea typeface="楷体_GB2312" panose="02010609030101010101" pitchFamily="49" charset="-122"/>
               </a:rPr>
               <a:t> ，因此“缺失”的第 </a:t>
             </a:r>
             <a:r>
-              <a:rPr kumimoji="1" lang="en-US" altLang="zh-CN" dirty="0">
+              <a:rPr kumimoji="1" lang="en-US" altLang="zh-CN" sz="2400" dirty="0">
                 <a:latin typeface="Times New Roman" charset="0"/>
                 <a:ea typeface="楷体_GB2312" panose="02010609030101010101" pitchFamily="49" charset="-122"/>
               </a:rPr>
               <a:t>1</a:t>
             </a:r>
             <a:r>
-              <a:rPr kumimoji="1" lang="zh-CN" altLang="en-US" dirty="0">
+              <a:rPr kumimoji="1" lang="zh-CN" altLang="en-US" sz="2400" dirty="0">
                 <a:latin typeface="Times New Roman" charset="0"/>
                 <a:ea typeface="楷体_GB2312" panose="02010609030101010101" pitchFamily="49" charset="-122"/>
               </a:rPr>
               <a:t> 个数字就是 </a:t>
             </a:r>
             <a:r>
-              <a:rPr kumimoji="1" lang="en-US" altLang="zh-CN" dirty="0">
+              <a:rPr kumimoji="1" lang="en-US" altLang="zh-CN" sz="2400" dirty="0">
                 <a:latin typeface="Times New Roman" charset="0"/>
                 <a:ea typeface="楷体_GB2312" panose="02010609030101010101" pitchFamily="49" charset="-122"/>
               </a:rPr>
               <a:t>2</a:t>
             </a:r>
             <a:r>
-              <a:rPr kumimoji="1" lang="zh-CN" altLang="en-US" dirty="0">
+              <a:rPr kumimoji="1" lang="zh-CN" altLang="en-US" sz="2400" dirty="0">
                 <a:latin typeface="Times New Roman" charset="0"/>
                 <a:ea typeface="楷体_GB2312" panose="02010609030101010101" pitchFamily="49" charset="-122"/>
               </a:rPr>
               <a:t>。</a:t>
             </a:r>
-            <a:endParaRPr kumimoji="1" lang="en-US" altLang="zh-CN" dirty="0">
+            <a:endParaRPr kumimoji="1" lang="en-US" altLang="zh-CN" sz="2400" dirty="0">
               <a:latin typeface="Times New Roman" charset="0"/>
               <a:ea typeface="楷体_GB2312" panose="02010609030101010101" pitchFamily="49" charset="-122"/>
             </a:endParaRPr>
@@ -5512,10 +5714,10 @@
       </p:sp>
       <p:sp>
         <p:nvSpPr>
-          <p:cNvPr id="8" name="文本框 7">
+          <p:cNvPr id="11" name="文本框 10">
             <a:extLst>
               <a:ext uri="{FF2B5EF4-FFF2-40B4-BE49-F238E27FC236}">
-                <a16:creationId xmlns:a16="http://schemas.microsoft.com/office/drawing/2014/main" id="{BA205D4A-2848-CF42-9082-5F48B9F9EC2E}"/>
+                <a16:creationId xmlns:a16="http://schemas.microsoft.com/office/drawing/2014/main" id="{91359668-A21A-7748-9EDB-7B4D3986CC0E}"/>
               </a:ext>
             </a:extLst>
           </p:cNvPr>
@@ -5524,8 +5726,8 @@
         </p:nvSpPr>
         <p:spPr>
           <a:xfrm flipH="1">
-            <a:off x="804680" y="873508"/>
-            <a:ext cx="5011657" cy="461665"/>
+            <a:off x="804679" y="781316"/>
+            <a:ext cx="8474450" cy="461665"/>
           </a:xfrm>
           <a:prstGeom prst="rect">
             <a:avLst/>
@@ -5563,7 +5765,7 @@
                 <a:ea typeface="KaiTi_GB2312" panose="02010609030101010101" pitchFamily="49" charset="-122"/>
                 <a:cs typeface="Times New Roman" panose="02020603050405020304" pitchFamily="18" charset="0"/>
               </a:rPr>
-              <a:t>思想：桶排序，一个萝卜一个坑。</a:t>
+              <a:t>思想：桶排序（一个萝卜一个坑）、抽屉原理、鸽巢原理。</a:t>
             </a:r>
           </a:p>
         </p:txBody>
@@ -5573,7 +5775,7 @@
           <p:cNvPr id="9" name="矩形 8">
             <a:extLst>
               <a:ext uri="{FF2B5EF4-FFF2-40B4-BE49-F238E27FC236}">
-                <a16:creationId xmlns:a16="http://schemas.microsoft.com/office/drawing/2014/main" id="{84B01B3B-53AD-5F43-AAA2-479D78DEC917}"/>
+                <a16:creationId xmlns:a16="http://schemas.microsoft.com/office/drawing/2014/main" id="{A1053922-ADEB-394A-83A4-A9C4E933A464}"/>
               </a:ext>
             </a:extLst>
           </p:cNvPr>
@@ -5582,8 +5784,8 @@
         </p:nvSpPr>
         <p:spPr>
           <a:xfrm>
-            <a:off x="729875" y="1536242"/>
-            <a:ext cx="3490058" cy="369332"/>
+            <a:off x="753897" y="1297746"/>
+            <a:ext cx="4578497" cy="461665"/>
           </a:xfrm>
           <a:prstGeom prst="rect">
             <a:avLst/>
@@ -5596,151 +5798,101 @@
           <a:lstStyle/>
           <a:p>
             <a:r>
-              <a:rPr lang="zh-CN" altLang="en-US" dirty="0"/>
+              <a:rPr lang="zh-CN" altLang="en-US" sz="2400" dirty="0">
+                <a:latin typeface="Times New Roman" panose="02020603050405020304" pitchFamily="18" charset="0"/>
+                <a:ea typeface="KaiTi_GB2312" panose="02010609030101010101" pitchFamily="49" charset="-122"/>
+                <a:cs typeface="Times New Roman" panose="02020603050405020304" pitchFamily="18" charset="0"/>
+              </a:rPr>
               <a:t>以示例 </a:t>
             </a:r>
             <a:r>
-              <a:rPr lang="en-US" altLang="zh-CN" dirty="0">
-                <a:latin typeface="Times New Roman" panose="02020603050405020304" pitchFamily="18" charset="0"/>
+              <a:rPr lang="en-US" altLang="zh-CN" sz="2400" dirty="0">
+                <a:latin typeface="Times New Roman" panose="02020603050405020304" pitchFamily="18" charset="0"/>
+                <a:ea typeface="KaiTi_GB2312" panose="02010609030101010101" pitchFamily="49" charset="-122"/>
                 <a:cs typeface="Times New Roman" panose="02020603050405020304" pitchFamily="18" charset="0"/>
               </a:rPr>
               <a:t>2</a:t>
             </a:r>
             <a:r>
-              <a:rPr lang="zh-CN" altLang="en-US" dirty="0"/>
-              <a:t> 输入</a:t>
-            </a:r>
-            <a:r>
-              <a:rPr lang="zh-CN" altLang="en-US" dirty="0">
-                <a:latin typeface="Times New Roman" panose="02020603050405020304" pitchFamily="18" charset="0"/>
-                <a:cs typeface="Times New Roman" panose="02020603050405020304" pitchFamily="18" charset="0"/>
-              </a:rPr>
-              <a:t>: [</a:t>
-            </a:r>
-            <a:r>
-              <a:rPr lang="en-US" altLang="zh-CN" dirty="0">
-                <a:latin typeface="Times New Roman" panose="02020603050405020304" pitchFamily="18" charset="0"/>
+              <a:rPr lang="zh-CN" altLang="en-US" sz="2400" dirty="0">
+                <a:latin typeface="Times New Roman" panose="02020603050405020304" pitchFamily="18" charset="0"/>
+                <a:ea typeface="KaiTi_GB2312" panose="02010609030101010101" pitchFamily="49" charset="-122"/>
+                <a:cs typeface="Times New Roman" panose="02020603050405020304" pitchFamily="18" charset="0"/>
+              </a:rPr>
+              <a:t> 输入: [</a:t>
+            </a:r>
+            <a:r>
+              <a:rPr lang="en-US" altLang="zh-CN" sz="2400" dirty="0">
+                <a:latin typeface="Times New Roman" panose="02020603050405020304" pitchFamily="18" charset="0"/>
+                <a:ea typeface="KaiTi_GB2312" panose="02010609030101010101" pitchFamily="49" charset="-122"/>
                 <a:cs typeface="Times New Roman" panose="02020603050405020304" pitchFamily="18" charset="0"/>
               </a:rPr>
               <a:t>3</a:t>
             </a:r>
             <a:r>
-              <a:rPr lang="zh-CN" altLang="en-US" dirty="0">
-                <a:latin typeface="Times New Roman" panose="02020603050405020304" pitchFamily="18" charset="0"/>
+              <a:rPr lang="zh-CN" altLang="en-US" sz="2400" dirty="0">
+                <a:latin typeface="Times New Roman" panose="02020603050405020304" pitchFamily="18" charset="0"/>
+                <a:ea typeface="KaiTi_GB2312" panose="02010609030101010101" pitchFamily="49" charset="-122"/>
                 <a:cs typeface="Times New Roman" panose="02020603050405020304" pitchFamily="18" charset="0"/>
               </a:rPr>
               <a:t>, </a:t>
             </a:r>
             <a:r>
-              <a:rPr lang="en-US" altLang="zh-CN" dirty="0">
-                <a:latin typeface="Times New Roman" panose="02020603050405020304" pitchFamily="18" charset="0"/>
+              <a:rPr lang="en-US" altLang="zh-CN" sz="2400" dirty="0">
+                <a:latin typeface="Times New Roman" panose="02020603050405020304" pitchFamily="18" charset="0"/>
+                <a:ea typeface="KaiTi_GB2312" panose="02010609030101010101" pitchFamily="49" charset="-122"/>
                 <a:cs typeface="Times New Roman" panose="02020603050405020304" pitchFamily="18" charset="0"/>
               </a:rPr>
               <a:t>4</a:t>
             </a:r>
             <a:r>
-              <a:rPr lang="zh-CN" altLang="en-US" dirty="0">
-                <a:latin typeface="Times New Roman" panose="02020603050405020304" pitchFamily="18" charset="0"/>
+              <a:rPr lang="zh-CN" altLang="en-US" sz="2400" dirty="0">
+                <a:latin typeface="Times New Roman" panose="02020603050405020304" pitchFamily="18" charset="0"/>
+                <a:ea typeface="KaiTi_GB2312" panose="02010609030101010101" pitchFamily="49" charset="-122"/>
                 <a:cs typeface="Times New Roman" panose="02020603050405020304" pitchFamily="18" charset="0"/>
               </a:rPr>
               <a:t>, </a:t>
             </a:r>
             <a:r>
-              <a:rPr lang="en-US" altLang="zh-CN" dirty="0">
-                <a:latin typeface="Times New Roman" panose="02020603050405020304" pitchFamily="18" charset="0"/>
+              <a:rPr lang="en-US" altLang="zh-CN" sz="2400" dirty="0">
+                <a:latin typeface="Times New Roman" panose="02020603050405020304" pitchFamily="18" charset="0"/>
+                <a:ea typeface="KaiTi_GB2312" panose="02010609030101010101" pitchFamily="49" charset="-122"/>
                 <a:cs typeface="Times New Roman" panose="02020603050405020304" pitchFamily="18" charset="0"/>
               </a:rPr>
               <a:t>-1</a:t>
             </a:r>
             <a:r>
-              <a:rPr lang="zh-CN" altLang="en-US" dirty="0">
-                <a:latin typeface="Times New Roman" panose="02020603050405020304" pitchFamily="18" charset="0"/>
+              <a:rPr lang="zh-CN" altLang="en-US" sz="2400" dirty="0">
+                <a:latin typeface="Times New Roman" panose="02020603050405020304" pitchFamily="18" charset="0"/>
+                <a:ea typeface="KaiTi_GB2312" panose="02010609030101010101" pitchFamily="49" charset="-122"/>
                 <a:cs typeface="Times New Roman" panose="02020603050405020304" pitchFamily="18" charset="0"/>
               </a:rPr>
               <a:t>, </a:t>
             </a:r>
             <a:r>
-              <a:rPr lang="en-US" altLang="zh-CN" dirty="0">
-                <a:latin typeface="Times New Roman" panose="02020603050405020304" pitchFamily="18" charset="0"/>
+              <a:rPr lang="en-US" altLang="zh-CN" sz="2400" dirty="0">
+                <a:latin typeface="Times New Roman" panose="02020603050405020304" pitchFamily="18" charset="0"/>
+                <a:ea typeface="KaiTi_GB2312" panose="02010609030101010101" pitchFamily="49" charset="-122"/>
                 <a:cs typeface="Times New Roman" panose="02020603050405020304" pitchFamily="18" charset="0"/>
               </a:rPr>
               <a:t>1</a:t>
             </a:r>
             <a:r>
-              <a:rPr lang="zh-CN" altLang="en-US" dirty="0">
-                <a:latin typeface="Times New Roman" panose="02020603050405020304" pitchFamily="18" charset="0"/>
-                <a:cs typeface="Times New Roman" panose="02020603050405020304" pitchFamily="18" charset="0"/>
-              </a:rPr>
-              <a:t>] </a:t>
-            </a:r>
-            <a:r>
-              <a:rPr lang="zh-CN" altLang="en-US" dirty="0"/>
-              <a:t>为例。</a:t>
-            </a:r>
-            <a:endParaRPr lang="en-US" altLang="zh-CN" dirty="0"/>
+              <a:rPr lang="zh-CN" altLang="en-US" sz="2400" dirty="0">
+                <a:latin typeface="Times New Roman" panose="02020603050405020304" pitchFamily="18" charset="0"/>
+                <a:ea typeface="KaiTi_GB2312" panose="02010609030101010101" pitchFamily="49" charset="-122"/>
+                <a:cs typeface="Times New Roman" panose="02020603050405020304" pitchFamily="18" charset="0"/>
+              </a:rPr>
+              <a:t>] 为例。</a:t>
+            </a:r>
+            <a:endParaRPr lang="en-US" altLang="zh-CN" sz="2400" dirty="0">
+              <a:latin typeface="Times New Roman" panose="02020603050405020304" pitchFamily="18" charset="0"/>
+              <a:ea typeface="KaiTi_GB2312" panose="02010609030101010101" pitchFamily="49" charset="-122"/>
+              <a:cs typeface="Times New Roman" panose="02020603050405020304" pitchFamily="18" charset="0"/>
+            </a:endParaRPr>
           </a:p>
         </p:txBody>
       </p:sp>
-      <p:pic>
-        <p:nvPicPr>
-          <p:cNvPr id="10" name="图片 9">
-            <a:extLst>
-              <a:ext uri="{FF2B5EF4-FFF2-40B4-BE49-F238E27FC236}">
-                <a16:creationId xmlns:a16="http://schemas.microsoft.com/office/drawing/2014/main" id="{00821ECB-3A7A-4649-878F-29B3973D13AC}"/>
-              </a:ext>
-            </a:extLst>
-          </p:cNvPr>
-          <p:cNvPicPr>
-            <a:picLocks noChangeAspect="1"/>
-          </p:cNvPicPr>
-          <p:nvPr/>
-        </p:nvPicPr>
-        <p:blipFill>
-          <a:blip r:embed="rId2"/>
-          <a:stretch>
-            <a:fillRect/>
-          </a:stretch>
-        </p:blipFill>
-        <p:spPr>
-          <a:xfrm>
-            <a:off x="4034008" y="3337766"/>
-            <a:ext cx="4775846" cy="1640558"/>
-          </a:xfrm>
-          <a:prstGeom prst="rect">
-            <a:avLst/>
-          </a:prstGeom>
-        </p:spPr>
-      </p:pic>
-      <p:pic>
-        <p:nvPicPr>
-          <p:cNvPr id="2" name="图片 1">
-            <a:extLst>
-              <a:ext uri="{FF2B5EF4-FFF2-40B4-BE49-F238E27FC236}">
-                <a16:creationId xmlns:a16="http://schemas.microsoft.com/office/drawing/2014/main" id="{A3969423-1581-234E-98B8-517E47C48CF5}"/>
-              </a:ext>
-            </a:extLst>
-          </p:cNvPr>
-          <p:cNvPicPr>
-            <a:picLocks noChangeAspect="1"/>
-          </p:cNvPicPr>
-          <p:nvPr/>
-        </p:nvPicPr>
-        <p:blipFill>
-          <a:blip r:embed="rId3"/>
-          <a:stretch>
-            <a:fillRect/>
-          </a:stretch>
-        </p:blipFill>
-        <p:spPr>
-          <a:xfrm>
-            <a:off x="4034008" y="3371072"/>
-            <a:ext cx="4775846" cy="1640558"/>
-          </a:xfrm>
-          <a:prstGeom prst="rect">
-            <a:avLst/>
-          </a:prstGeom>
-        </p:spPr>
-      </p:pic>
     </p:spTree>
     <p:extLst>
       <p:ext uri="{BB962C8B-B14F-4D97-AF65-F5344CB8AC3E}">

</xml_diff>